<commit_message>
Added pix of different types of prints
</commit_message>
<xml_diff>
--- a/Introduction to 3D Printing.pptx
+++ b/Introduction to 3D Printing.pptx
@@ -24,7 +24,11 @@
     <p:sldId id="271" r:id="rId18"/>
     <p:sldId id="272" r:id="rId19"/>
     <p:sldId id="273" r:id="rId20"/>
-    <p:sldId id="274" r:id="rId21"/>
+    <p:sldId id="276" r:id="rId21"/>
+    <p:sldId id="274" r:id="rId22"/>
+    <p:sldId id="278" r:id="rId23"/>
+    <p:sldId id="277" r:id="rId24"/>
+    <p:sldId id="279" r:id="rId25"/>
   </p:sldIdLst>
   <p:sldSz cx="9144000" cy="6858000" type="screen4x3"/>
   <p:notesSz cx="6858000" cy="9144000"/>
@@ -307,7 +311,7 @@
           <a:p>
             <a:fld id="{03F24ECC-79A4-43A1-8C02-28912ED20E3E}" type="datetimeFigureOut">
               <a:rPr lang="en-US" smtClean="0"/>
-              <a:t>6/21/2015</a:t>
+              <a:t>6/23/2015</a:t>
             </a:fld>
             <a:endParaRPr lang="en-US"/>
           </a:p>
@@ -477,7 +481,7 @@
           <a:p>
             <a:fld id="{03F24ECC-79A4-43A1-8C02-28912ED20E3E}" type="datetimeFigureOut">
               <a:rPr lang="en-US" smtClean="0"/>
-              <a:t>6/21/2015</a:t>
+              <a:t>6/23/2015</a:t>
             </a:fld>
             <a:endParaRPr lang="en-US"/>
           </a:p>
@@ -657,7 +661,7 @@
           <a:p>
             <a:fld id="{03F24ECC-79A4-43A1-8C02-28912ED20E3E}" type="datetimeFigureOut">
               <a:rPr lang="en-US" smtClean="0"/>
-              <a:t>6/21/2015</a:t>
+              <a:t>6/23/2015</a:t>
             </a:fld>
             <a:endParaRPr lang="en-US"/>
           </a:p>
@@ -827,7 +831,7 @@
           <a:p>
             <a:fld id="{03F24ECC-79A4-43A1-8C02-28912ED20E3E}" type="datetimeFigureOut">
               <a:rPr lang="en-US" smtClean="0"/>
-              <a:t>6/21/2015</a:t>
+              <a:t>6/23/2015</a:t>
             </a:fld>
             <a:endParaRPr lang="en-US"/>
           </a:p>
@@ -1073,7 +1077,7 @@
           <a:p>
             <a:fld id="{03F24ECC-79A4-43A1-8C02-28912ED20E3E}" type="datetimeFigureOut">
               <a:rPr lang="en-US" smtClean="0"/>
-              <a:t>6/21/2015</a:t>
+              <a:t>6/23/2015</a:t>
             </a:fld>
             <a:endParaRPr lang="en-US"/>
           </a:p>
@@ -1361,7 +1365,7 @@
           <a:p>
             <a:fld id="{03F24ECC-79A4-43A1-8C02-28912ED20E3E}" type="datetimeFigureOut">
               <a:rPr lang="en-US" smtClean="0"/>
-              <a:t>6/21/2015</a:t>
+              <a:t>6/23/2015</a:t>
             </a:fld>
             <a:endParaRPr lang="en-US"/>
           </a:p>
@@ -1783,7 +1787,7 @@
           <a:p>
             <a:fld id="{03F24ECC-79A4-43A1-8C02-28912ED20E3E}" type="datetimeFigureOut">
               <a:rPr lang="en-US" smtClean="0"/>
-              <a:t>6/21/2015</a:t>
+              <a:t>6/23/2015</a:t>
             </a:fld>
             <a:endParaRPr lang="en-US"/>
           </a:p>
@@ -1901,7 +1905,7 @@
           <a:p>
             <a:fld id="{03F24ECC-79A4-43A1-8C02-28912ED20E3E}" type="datetimeFigureOut">
               <a:rPr lang="en-US" smtClean="0"/>
-              <a:t>6/21/2015</a:t>
+              <a:t>6/23/2015</a:t>
             </a:fld>
             <a:endParaRPr lang="en-US"/>
           </a:p>
@@ -1996,7 +2000,7 @@
           <a:p>
             <a:fld id="{03F24ECC-79A4-43A1-8C02-28912ED20E3E}" type="datetimeFigureOut">
               <a:rPr lang="en-US" smtClean="0"/>
-              <a:t>6/21/2015</a:t>
+              <a:t>6/23/2015</a:t>
             </a:fld>
             <a:endParaRPr lang="en-US"/>
           </a:p>
@@ -2273,7 +2277,7 @@
           <a:p>
             <a:fld id="{03F24ECC-79A4-43A1-8C02-28912ED20E3E}" type="datetimeFigureOut">
               <a:rPr lang="en-US" smtClean="0"/>
-              <a:t>6/21/2015</a:t>
+              <a:t>6/23/2015</a:t>
             </a:fld>
             <a:endParaRPr lang="en-US"/>
           </a:p>
@@ -2526,7 +2530,7 @@
           <a:p>
             <a:fld id="{03F24ECC-79A4-43A1-8C02-28912ED20E3E}" type="datetimeFigureOut">
               <a:rPr lang="en-US" smtClean="0"/>
-              <a:t>6/21/2015</a:t>
+              <a:t>6/23/2015</a:t>
             </a:fld>
             <a:endParaRPr lang="en-US"/>
           </a:p>
@@ -2739,7 +2743,7 @@
           <a:p>
             <a:fld id="{03F24ECC-79A4-43A1-8C02-28912ED20E3E}" type="datetimeFigureOut">
               <a:rPr lang="en-US" smtClean="0"/>
-              <a:t>6/21/2015</a:t>
+              <a:t>6/23/2015</a:t>
             </a:fld>
             <a:endParaRPr lang="en-US"/>
           </a:p>
@@ -4522,7 +4526,7 @@
           <a:p>
             <a:r>
               <a:rPr lang="en-US" dirty="0" smtClean="0"/>
-              <a:t>Terminology</a:t>
+              <a:t>Terminology / Settings</a:t>
             </a:r>
             <a:endParaRPr lang="en-US" dirty="0"/>
           </a:p>
@@ -4808,6 +4812,190 @@
           <a:p>
             <a:r>
               <a:rPr lang="en-US" dirty="0" smtClean="0"/>
+              <a:t>Infill</a:t>
+            </a:r>
+            <a:endParaRPr lang="en-US" dirty="0"/>
+          </a:p>
+        </p:txBody>
+      </p:sp>
+      <p:sp>
+        <p:nvSpPr>
+          <p:cNvPr id="11" name="TextBox 10"/>
+          <p:cNvSpPr txBox="1"/>
+          <p:nvPr/>
+        </p:nvSpPr>
+        <p:spPr>
+          <a:xfrm>
+            <a:off x="1905000" y="4803523"/>
+            <a:ext cx="1028700" cy="523220"/>
+          </a:xfrm>
+          <a:prstGeom prst="rect">
+            <a:avLst/>
+          </a:prstGeom>
+          <a:noFill/>
+        </p:spPr>
+        <p:txBody>
+          <a:bodyPr wrap="square" rtlCol="0">
+            <a:spAutoFit/>
+          </a:bodyPr>
+          <a:lstStyle/>
+          <a:p>
+            <a:r>
+              <a:rPr lang="en-US" sz="2800" dirty="0" smtClean="0"/>
+              <a:t>10%</a:t>
+            </a:r>
+            <a:endParaRPr lang="en-US" sz="2800" dirty="0"/>
+          </a:p>
+        </p:txBody>
+      </p:sp>
+      <p:sp>
+        <p:nvSpPr>
+          <p:cNvPr id="13" name="TextBox 12"/>
+          <p:cNvSpPr txBox="1"/>
+          <p:nvPr/>
+        </p:nvSpPr>
+        <p:spPr>
+          <a:xfrm>
+            <a:off x="6066064" y="4817332"/>
+            <a:ext cx="1447800" cy="523220"/>
+          </a:xfrm>
+          <a:prstGeom prst="rect">
+            <a:avLst/>
+          </a:prstGeom>
+          <a:noFill/>
+        </p:spPr>
+        <p:txBody>
+          <a:bodyPr wrap="square" rtlCol="0">
+            <a:spAutoFit/>
+          </a:bodyPr>
+          <a:lstStyle/>
+          <a:p>
+            <a:r>
+              <a:rPr lang="en-US" sz="2800" dirty="0" smtClean="0"/>
+              <a:t>40%</a:t>
+            </a:r>
+          </a:p>
+        </p:txBody>
+      </p:sp>
+      <p:pic>
+        <p:nvPicPr>
+          <p:cNvPr id="14" name="Picture 13"/>
+          <p:cNvPicPr>
+            <a:picLocks noChangeAspect="1"/>
+          </p:cNvPicPr>
+          <p:nvPr/>
+        </p:nvPicPr>
+        <p:blipFill>
+          <a:blip r:embed="rId2">
+            <a:extLst>
+              <a:ext uri="{28A0092B-C50C-407E-A947-70E740481C1C}">
+                <a14:useLocalDpi xmlns:a14="http://schemas.microsoft.com/office/drawing/2010/main" val="0"/>
+              </a:ext>
+            </a:extLst>
+          </a:blip>
+          <a:stretch>
+            <a:fillRect/>
+          </a:stretch>
+        </p:blipFill>
+        <p:spPr>
+          <a:xfrm>
+            <a:off x="457200" y="1143000"/>
+            <a:ext cx="4152900" cy="3451521"/>
+          </a:xfrm>
+          <a:prstGeom prst="rect">
+            <a:avLst/>
+          </a:prstGeom>
+        </p:spPr>
+      </p:pic>
+      <p:pic>
+        <p:nvPicPr>
+          <p:cNvPr id="15" name="Picture 14"/>
+          <p:cNvPicPr>
+            <a:picLocks noChangeAspect="1"/>
+          </p:cNvPicPr>
+          <p:nvPr/>
+        </p:nvPicPr>
+        <p:blipFill>
+          <a:blip r:embed="rId3">
+            <a:extLst>
+              <a:ext uri="{28A0092B-C50C-407E-A947-70E740481C1C}">
+                <a14:useLocalDpi xmlns:a14="http://schemas.microsoft.com/office/drawing/2010/main" val="0"/>
+              </a:ext>
+            </a:extLst>
+          </a:blip>
+          <a:stretch>
+            <a:fillRect/>
+          </a:stretch>
+        </p:blipFill>
+        <p:spPr>
+          <a:xfrm>
+            <a:off x="4800600" y="1143000"/>
+            <a:ext cx="3978729" cy="3470468"/>
+          </a:xfrm>
+          <a:prstGeom prst="rect">
+            <a:avLst/>
+          </a:prstGeom>
+        </p:spPr>
+      </p:pic>
+    </p:spTree>
+    <p:extLst>
+      <p:ext uri="{BB962C8B-B14F-4D97-AF65-F5344CB8AC3E}">
+        <p14:creationId xmlns:p14="http://schemas.microsoft.com/office/powerpoint/2010/main" val="3078402184"/>
+      </p:ext>
+    </p:extLst>
+  </p:cSld>
+  <p:clrMapOvr>
+    <a:masterClrMapping/>
+  </p:clrMapOvr>
+  <p:timing>
+    <p:tnLst>
+      <p:par>
+        <p:cTn id="1" dur="indefinite" restart="never" nodeType="tmRoot"/>
+      </p:par>
+    </p:tnLst>
+  </p:timing>
+</p:sld>
+</file>
+
+<file path=ppt/slides/slide21.xml><?xml version="1.0" encoding="utf-8"?>
+<p:sld xmlns:a="http://schemas.openxmlformats.org/drawingml/2006/main" xmlns:r="http://schemas.openxmlformats.org/officeDocument/2006/relationships" xmlns:p="http://schemas.openxmlformats.org/presentationml/2006/main">
+  <p:cSld>
+    <p:spTree>
+      <p:nvGrpSpPr>
+        <p:cNvPr id="1" name=""/>
+        <p:cNvGrpSpPr/>
+        <p:nvPr/>
+      </p:nvGrpSpPr>
+      <p:grpSpPr>
+        <a:xfrm>
+          <a:off x="0" y="0"/>
+          <a:ext cx="0" cy="0"/>
+          <a:chOff x="0" y="0"/>
+          <a:chExt cx="0" cy="0"/>
+        </a:xfrm>
+      </p:grpSpPr>
+      <p:sp>
+        <p:nvSpPr>
+          <p:cNvPr id="2" name="Title 1"/>
+          <p:cNvSpPr>
+            <a:spLocks noGrp="1"/>
+          </p:cNvSpPr>
+          <p:nvPr>
+            <p:ph type="title"/>
+          </p:nvPr>
+        </p:nvSpPr>
+        <p:spPr>
+          <a:xfrm>
+            <a:off x="457200" y="0"/>
+            <a:ext cx="8229600" cy="1143000"/>
+          </a:xfrm>
+        </p:spPr>
+        <p:txBody>
+          <a:bodyPr/>
+          <a:lstStyle/>
+          <a:p>
+            <a:r>
+              <a:rPr lang="en-US" dirty="0" smtClean="0"/>
               <a:t>Support</a:t>
             </a:r>
             <a:endParaRPr lang="en-US" dirty="0"/>
@@ -4846,10 +5034,1633 @@
           </a:p>
         </p:txBody>
       </p:sp>
+      <p:pic>
+        <p:nvPicPr>
+          <p:cNvPr id="4" name="Picture 3"/>
+          <p:cNvPicPr/>
+          <p:nvPr/>
+        </p:nvPicPr>
+        <p:blipFill>
+          <a:blip r:embed="rId2"/>
+          <a:stretch>
+            <a:fillRect/>
+          </a:stretch>
+        </p:blipFill>
+        <p:spPr>
+          <a:xfrm>
+            <a:off x="567644" y="1600200"/>
+            <a:ext cx="3318556" cy="3485079"/>
+          </a:xfrm>
+          <a:prstGeom prst="rect">
+            <a:avLst/>
+          </a:prstGeom>
+        </p:spPr>
+      </p:pic>
+      <p:pic>
+        <p:nvPicPr>
+          <p:cNvPr id="5" name="Picture 4"/>
+          <p:cNvPicPr/>
+          <p:nvPr/>
+        </p:nvPicPr>
+        <p:blipFill>
+          <a:blip r:embed="rId3"/>
+          <a:stretch>
+            <a:fillRect/>
+          </a:stretch>
+        </p:blipFill>
+        <p:spPr>
+          <a:xfrm>
+            <a:off x="4724400" y="1524000"/>
+            <a:ext cx="2971800" cy="3578047"/>
+          </a:xfrm>
+          <a:prstGeom prst="rect">
+            <a:avLst/>
+          </a:prstGeom>
+        </p:spPr>
+      </p:pic>
     </p:spTree>
     <p:extLst>
       <p:ext uri="{BB962C8B-B14F-4D97-AF65-F5344CB8AC3E}">
         <p14:creationId xmlns:p14="http://schemas.microsoft.com/office/powerpoint/2010/main" val="2809639533"/>
+      </p:ext>
+    </p:extLst>
+  </p:cSld>
+  <p:clrMapOvr>
+    <a:masterClrMapping/>
+  </p:clrMapOvr>
+  <p:timing>
+    <p:tnLst>
+      <p:par>
+        <p:cTn id="1" dur="indefinite" restart="never" nodeType="tmRoot"/>
+      </p:par>
+    </p:tnLst>
+  </p:timing>
+</p:sld>
+</file>
+
+<file path=ppt/slides/slide22.xml><?xml version="1.0" encoding="utf-8"?>
+<p:sld xmlns:a="http://schemas.openxmlformats.org/drawingml/2006/main" xmlns:r="http://schemas.openxmlformats.org/officeDocument/2006/relationships" xmlns:p="http://schemas.openxmlformats.org/presentationml/2006/main">
+  <p:cSld>
+    <p:spTree>
+      <p:nvGrpSpPr>
+        <p:cNvPr id="1" name=""/>
+        <p:cNvGrpSpPr/>
+        <p:nvPr/>
+      </p:nvGrpSpPr>
+      <p:grpSpPr>
+        <a:xfrm>
+          <a:off x="0" y="0"/>
+          <a:ext cx="0" cy="0"/>
+          <a:chOff x="0" y="0"/>
+          <a:chExt cx="0" cy="0"/>
+        </a:xfrm>
+      </p:grpSpPr>
+      <p:sp>
+        <p:nvSpPr>
+          <p:cNvPr id="2" name="Title 1"/>
+          <p:cNvSpPr>
+            <a:spLocks noGrp="1"/>
+          </p:cNvSpPr>
+          <p:nvPr>
+            <p:ph type="title"/>
+          </p:nvPr>
+        </p:nvSpPr>
+        <p:spPr>
+          <a:xfrm>
+            <a:off x="457200" y="0"/>
+            <a:ext cx="8229600" cy="1143000"/>
+          </a:xfrm>
+        </p:spPr>
+        <p:txBody>
+          <a:bodyPr/>
+          <a:lstStyle/>
+          <a:p>
+            <a:r>
+              <a:rPr lang="en-US" dirty="0" smtClean="0"/>
+              <a:t>Raft</a:t>
+            </a:r>
+            <a:endParaRPr lang="en-US" dirty="0"/>
+          </a:p>
+        </p:txBody>
+      </p:sp>
+      <p:pic>
+        <p:nvPicPr>
+          <p:cNvPr id="9" name="Picture 8"/>
+          <p:cNvPicPr>
+            <a:picLocks noChangeAspect="1"/>
+          </p:cNvPicPr>
+          <p:nvPr/>
+        </p:nvPicPr>
+        <p:blipFill>
+          <a:blip r:embed="rId2">
+            <a:extLst>
+              <a:ext uri="{28A0092B-C50C-407E-A947-70E740481C1C}">
+                <a14:useLocalDpi xmlns:a14="http://schemas.microsoft.com/office/drawing/2010/main" val="0"/>
+              </a:ext>
+            </a:extLst>
+          </a:blip>
+          <a:stretch>
+            <a:fillRect/>
+          </a:stretch>
+        </p:blipFill>
+        <p:spPr>
+          <a:xfrm>
+            <a:off x="228600" y="1371600"/>
+            <a:ext cx="4590197" cy="3661229"/>
+          </a:xfrm>
+          <a:prstGeom prst="rect">
+            <a:avLst/>
+          </a:prstGeom>
+        </p:spPr>
+      </p:pic>
+      <p:pic>
+        <p:nvPicPr>
+          <p:cNvPr id="10" name="Picture 9"/>
+          <p:cNvPicPr>
+            <a:picLocks noChangeAspect="1"/>
+          </p:cNvPicPr>
+          <p:nvPr/>
+        </p:nvPicPr>
+        <p:blipFill>
+          <a:blip r:embed="rId3">
+            <a:extLst>
+              <a:ext uri="{28A0092B-C50C-407E-A947-70E740481C1C}">
+                <a14:useLocalDpi xmlns:a14="http://schemas.microsoft.com/office/drawing/2010/main" val="0"/>
+              </a:ext>
+            </a:extLst>
+          </a:blip>
+          <a:stretch>
+            <a:fillRect/>
+          </a:stretch>
+        </p:blipFill>
+        <p:spPr>
+          <a:xfrm>
+            <a:off x="4953000" y="1479593"/>
+            <a:ext cx="4070557" cy="3445242"/>
+          </a:xfrm>
+          <a:prstGeom prst="rect">
+            <a:avLst/>
+          </a:prstGeom>
+        </p:spPr>
+      </p:pic>
+      <p:sp>
+        <p:nvSpPr>
+          <p:cNvPr id="11" name="TextBox 10"/>
+          <p:cNvSpPr txBox="1"/>
+          <p:nvPr/>
+        </p:nvSpPr>
+        <p:spPr>
+          <a:xfrm>
+            <a:off x="1905000" y="5326743"/>
+            <a:ext cx="1028700" cy="523220"/>
+          </a:xfrm>
+          <a:prstGeom prst="rect">
+            <a:avLst/>
+          </a:prstGeom>
+          <a:noFill/>
+        </p:spPr>
+        <p:txBody>
+          <a:bodyPr wrap="square" rtlCol="0">
+            <a:spAutoFit/>
+          </a:bodyPr>
+          <a:lstStyle/>
+          <a:p>
+            <a:r>
+              <a:rPr lang="en-US" sz="2800" dirty="0" smtClean="0"/>
+              <a:t>Top</a:t>
+            </a:r>
+            <a:endParaRPr lang="en-US" sz="2800" dirty="0"/>
+          </a:p>
+        </p:txBody>
+      </p:sp>
+      <p:sp>
+        <p:nvSpPr>
+          <p:cNvPr id="13" name="TextBox 12"/>
+          <p:cNvSpPr txBox="1"/>
+          <p:nvPr/>
+        </p:nvSpPr>
+        <p:spPr>
+          <a:xfrm>
+            <a:off x="5715000" y="5471886"/>
+            <a:ext cx="1447800" cy="523220"/>
+          </a:xfrm>
+          <a:prstGeom prst="rect">
+            <a:avLst/>
+          </a:prstGeom>
+          <a:noFill/>
+        </p:spPr>
+        <p:txBody>
+          <a:bodyPr wrap="square" rtlCol="0">
+            <a:spAutoFit/>
+          </a:bodyPr>
+          <a:lstStyle/>
+          <a:p>
+            <a:r>
+              <a:rPr lang="en-US" sz="2800" dirty="0" smtClean="0"/>
+              <a:t>Bottom</a:t>
+            </a:r>
+            <a:endParaRPr lang="en-US" sz="2800" dirty="0"/>
+          </a:p>
+        </p:txBody>
+      </p:sp>
+    </p:spTree>
+    <p:extLst>
+      <p:ext uri="{BB962C8B-B14F-4D97-AF65-F5344CB8AC3E}">
+        <p14:creationId xmlns:p14="http://schemas.microsoft.com/office/powerpoint/2010/main" val="1167614816"/>
+      </p:ext>
+    </p:extLst>
+  </p:cSld>
+  <p:clrMapOvr>
+    <a:masterClrMapping/>
+  </p:clrMapOvr>
+  <p:timing>
+    <p:tnLst>
+      <p:par>
+        <p:cTn id="1" dur="indefinite" restart="never" nodeType="tmRoot"/>
+      </p:par>
+    </p:tnLst>
+  </p:timing>
+</p:sld>
+</file>
+
+<file path=ppt/slides/slide23.xml><?xml version="1.0" encoding="utf-8"?>
+<p:sld xmlns:a="http://schemas.openxmlformats.org/drawingml/2006/main" xmlns:r="http://schemas.openxmlformats.org/officeDocument/2006/relationships" xmlns:p="http://schemas.openxmlformats.org/presentationml/2006/main">
+  <p:cSld>
+    <p:spTree>
+      <p:nvGrpSpPr>
+        <p:cNvPr id="1" name=""/>
+        <p:cNvGrpSpPr/>
+        <p:nvPr/>
+      </p:nvGrpSpPr>
+      <p:grpSpPr>
+        <a:xfrm>
+          <a:off x="0" y="0"/>
+          <a:ext cx="0" cy="0"/>
+          <a:chOff x="0" y="0"/>
+          <a:chExt cx="0" cy="0"/>
+        </a:xfrm>
+      </p:grpSpPr>
+      <p:sp>
+        <p:nvSpPr>
+          <p:cNvPr id="2" name="Title 1"/>
+          <p:cNvSpPr>
+            <a:spLocks noGrp="1"/>
+          </p:cNvSpPr>
+          <p:nvPr>
+            <p:ph type="title"/>
+          </p:nvPr>
+        </p:nvSpPr>
+        <p:spPr>
+          <a:xfrm>
+            <a:off x="457200" y="0"/>
+            <a:ext cx="8229600" cy="1143000"/>
+          </a:xfrm>
+        </p:spPr>
+        <p:txBody>
+          <a:bodyPr/>
+          <a:lstStyle/>
+          <a:p>
+            <a:r>
+              <a:rPr lang="en-US" dirty="0" smtClean="0"/>
+              <a:t>Skirt / Brim</a:t>
+            </a:r>
+            <a:endParaRPr lang="en-US" dirty="0"/>
+          </a:p>
+        </p:txBody>
+      </p:sp>
+      <p:sp>
+        <p:nvSpPr>
+          <p:cNvPr id="11" name="TextBox 10"/>
+          <p:cNvSpPr txBox="1"/>
+          <p:nvPr/>
+        </p:nvSpPr>
+        <p:spPr>
+          <a:xfrm>
+            <a:off x="1897743" y="5094162"/>
+            <a:ext cx="1028700" cy="523220"/>
+          </a:xfrm>
+          <a:prstGeom prst="rect">
+            <a:avLst/>
+          </a:prstGeom>
+          <a:noFill/>
+        </p:spPr>
+        <p:txBody>
+          <a:bodyPr wrap="square" rtlCol="0">
+            <a:spAutoFit/>
+          </a:bodyPr>
+          <a:lstStyle/>
+          <a:p>
+            <a:r>
+              <a:rPr lang="en-US" sz="2800" dirty="0" smtClean="0"/>
+              <a:t>Top</a:t>
+            </a:r>
+            <a:endParaRPr lang="en-US" sz="2800" dirty="0"/>
+          </a:p>
+        </p:txBody>
+      </p:sp>
+      <p:sp>
+        <p:nvSpPr>
+          <p:cNvPr id="13" name="TextBox 12"/>
+          <p:cNvSpPr txBox="1"/>
+          <p:nvPr/>
+        </p:nvSpPr>
+        <p:spPr>
+          <a:xfrm>
+            <a:off x="5687805" y="5094162"/>
+            <a:ext cx="1447800" cy="523220"/>
+          </a:xfrm>
+          <a:prstGeom prst="rect">
+            <a:avLst/>
+          </a:prstGeom>
+          <a:noFill/>
+        </p:spPr>
+        <p:txBody>
+          <a:bodyPr wrap="square" rtlCol="0">
+            <a:spAutoFit/>
+          </a:bodyPr>
+          <a:lstStyle/>
+          <a:p>
+            <a:r>
+              <a:rPr lang="en-US" sz="2800" dirty="0" smtClean="0"/>
+              <a:t>Bottom</a:t>
+            </a:r>
+            <a:endParaRPr lang="en-US" sz="2800" dirty="0"/>
+          </a:p>
+        </p:txBody>
+      </p:sp>
+      <p:pic>
+        <p:nvPicPr>
+          <p:cNvPr id="3" name="Picture 2"/>
+          <p:cNvPicPr>
+            <a:picLocks noChangeAspect="1"/>
+          </p:cNvPicPr>
+          <p:nvPr/>
+        </p:nvPicPr>
+        <p:blipFill>
+          <a:blip r:embed="rId2">
+            <a:extLst>
+              <a:ext uri="{28A0092B-C50C-407E-A947-70E740481C1C}">
+                <a14:useLocalDpi xmlns:a14="http://schemas.microsoft.com/office/drawing/2010/main" val="0"/>
+              </a:ext>
+            </a:extLst>
+          </a:blip>
+          <a:stretch>
+            <a:fillRect/>
+          </a:stretch>
+        </p:blipFill>
+        <p:spPr>
+          <a:xfrm>
+            <a:off x="21771" y="1219200"/>
+            <a:ext cx="4286250" cy="3604194"/>
+          </a:xfrm>
+          <a:prstGeom prst="rect">
+            <a:avLst/>
+          </a:prstGeom>
+        </p:spPr>
+      </p:pic>
+      <p:pic>
+        <p:nvPicPr>
+          <p:cNvPr id="4" name="Picture 3"/>
+          <p:cNvPicPr>
+            <a:picLocks noChangeAspect="1"/>
+          </p:cNvPicPr>
+          <p:nvPr/>
+        </p:nvPicPr>
+        <p:blipFill>
+          <a:blip r:embed="rId3">
+            <a:extLst>
+              <a:ext uri="{28A0092B-C50C-407E-A947-70E740481C1C}">
+                <a14:useLocalDpi xmlns:a14="http://schemas.microsoft.com/office/drawing/2010/main" val="0"/>
+              </a:ext>
+            </a:extLst>
+          </a:blip>
+          <a:stretch>
+            <a:fillRect/>
+          </a:stretch>
+        </p:blipFill>
+        <p:spPr>
+          <a:xfrm>
+            <a:off x="4495800" y="1219200"/>
+            <a:ext cx="4510352" cy="3719286"/>
+          </a:xfrm>
+          <a:prstGeom prst="rect">
+            <a:avLst/>
+          </a:prstGeom>
+        </p:spPr>
+      </p:pic>
+    </p:spTree>
+    <p:extLst>
+      <p:ext uri="{BB962C8B-B14F-4D97-AF65-F5344CB8AC3E}">
+        <p14:creationId xmlns:p14="http://schemas.microsoft.com/office/powerpoint/2010/main" val="81158189"/>
+      </p:ext>
+    </p:extLst>
+  </p:cSld>
+  <p:clrMapOvr>
+    <a:masterClrMapping/>
+  </p:clrMapOvr>
+  <p:timing>
+    <p:tnLst>
+      <p:par>
+        <p:cTn id="1" dur="indefinite" restart="never" nodeType="tmRoot"/>
+      </p:par>
+    </p:tnLst>
+  </p:timing>
+</p:sld>
+</file>
+
+<file path=ppt/slides/slide24.xml><?xml version="1.0" encoding="utf-8"?>
+<p:sld xmlns:a="http://schemas.openxmlformats.org/drawingml/2006/main" xmlns:r="http://schemas.openxmlformats.org/officeDocument/2006/relationships" xmlns:p="http://schemas.openxmlformats.org/presentationml/2006/main">
+  <p:cSld>
+    <p:spTree>
+      <p:nvGrpSpPr>
+        <p:cNvPr id="1" name=""/>
+        <p:cNvGrpSpPr/>
+        <p:nvPr/>
+      </p:nvGrpSpPr>
+      <p:grpSpPr>
+        <a:xfrm>
+          <a:off x="0" y="0"/>
+          <a:ext cx="0" cy="0"/>
+          <a:chOff x="0" y="0"/>
+          <a:chExt cx="0" cy="0"/>
+        </a:xfrm>
+      </p:grpSpPr>
+      <p:sp>
+        <p:nvSpPr>
+          <p:cNvPr id="2" name="Title 1"/>
+          <p:cNvSpPr>
+            <a:spLocks noGrp="1"/>
+          </p:cNvSpPr>
+          <p:nvPr>
+            <p:ph type="title"/>
+          </p:nvPr>
+        </p:nvSpPr>
+        <p:spPr>
+          <a:xfrm>
+            <a:off x="457200" y="0"/>
+            <a:ext cx="8229600" cy="1143000"/>
+          </a:xfrm>
+        </p:spPr>
+        <p:txBody>
+          <a:bodyPr/>
+          <a:lstStyle/>
+          <a:p>
+            <a:r>
+              <a:rPr lang="en-US" dirty="0" smtClean="0"/>
+              <a:t>Danger! Danger! Will Robinson!</a:t>
+            </a:r>
+            <a:endParaRPr lang="en-US" dirty="0"/>
+          </a:p>
+        </p:txBody>
+      </p:sp>
+      <p:sp>
+        <p:nvSpPr>
+          <p:cNvPr id="11" name="TextBox 10"/>
+          <p:cNvSpPr txBox="1"/>
+          <p:nvPr/>
+        </p:nvSpPr>
+        <p:spPr>
+          <a:xfrm>
+            <a:off x="1897743" y="5094162"/>
+            <a:ext cx="1028700" cy="523220"/>
+          </a:xfrm>
+          <a:prstGeom prst="rect">
+            <a:avLst/>
+          </a:prstGeom>
+          <a:noFill/>
+        </p:spPr>
+        <p:txBody>
+          <a:bodyPr wrap="square" rtlCol="0">
+            <a:spAutoFit/>
+          </a:bodyPr>
+          <a:lstStyle/>
+          <a:p>
+            <a:r>
+              <a:rPr lang="en-US" sz="2800" dirty="0" smtClean="0"/>
+              <a:t>Top</a:t>
+            </a:r>
+            <a:endParaRPr lang="en-US" sz="2800" dirty="0"/>
+          </a:p>
+        </p:txBody>
+      </p:sp>
+      <p:sp>
+        <p:nvSpPr>
+          <p:cNvPr id="13" name="TextBox 12"/>
+          <p:cNvSpPr txBox="1"/>
+          <p:nvPr/>
+        </p:nvSpPr>
+        <p:spPr>
+          <a:xfrm>
+            <a:off x="5687805" y="5094162"/>
+            <a:ext cx="1447800" cy="523220"/>
+          </a:xfrm>
+          <a:prstGeom prst="rect">
+            <a:avLst/>
+          </a:prstGeom>
+          <a:noFill/>
+        </p:spPr>
+        <p:txBody>
+          <a:bodyPr wrap="square" rtlCol="0">
+            <a:spAutoFit/>
+          </a:bodyPr>
+          <a:lstStyle/>
+          <a:p>
+            <a:r>
+              <a:rPr lang="en-US" sz="2800" dirty="0" smtClean="0"/>
+              <a:t>Bottom</a:t>
+            </a:r>
+            <a:endParaRPr lang="en-US" sz="2800" dirty="0"/>
+          </a:p>
+        </p:txBody>
+      </p:sp>
+      <p:graphicFrame>
+        <p:nvGraphicFramePr>
+          <p:cNvPr id="5" name="Table 4"/>
+          <p:cNvGraphicFramePr>
+            <a:graphicFrameLocks noGrp="1"/>
+          </p:cNvGraphicFramePr>
+          <p:nvPr>
+            <p:extLst>
+              <p:ext uri="{D42A27DB-BD31-4B8C-83A1-F6EECF244321}">
+                <p14:modId xmlns:p14="http://schemas.microsoft.com/office/powerpoint/2010/main" val="2266855097"/>
+              </p:ext>
+            </p:extLst>
+          </p:nvPr>
+        </p:nvGraphicFramePr>
+        <p:xfrm>
+          <a:off x="457200" y="1143000"/>
+          <a:ext cx="8382000" cy="2540640"/>
+        </p:xfrm>
+        <a:graphic>
+          <a:graphicData uri="http://schemas.openxmlformats.org/drawingml/2006/table">
+            <a:tbl>
+              <a:tblPr firstRow="1" bandRow="1">
+                <a:tableStyleId>{2D5ABB26-0587-4C30-8999-92F81FD0307C}</a:tableStyleId>
+              </a:tblPr>
+              <a:tblGrid>
+                <a:gridCol w="1676400"/>
+                <a:gridCol w="1676400"/>
+                <a:gridCol w="1676400"/>
+                <a:gridCol w="1676400"/>
+                <a:gridCol w="1676400"/>
+              </a:tblGrid>
+              <a:tr h="609600">
+                <a:tc rowSpan="2">
+                  <a:txBody>
+                    <a:bodyPr/>
+                    <a:lstStyle/>
+                    <a:p>
+                      <a:pPr algn="ctr"/>
+                      <a:r>
+                        <a:rPr lang="en-US" sz="2800" b="1" dirty="0" smtClean="0"/>
+                        <a:t>Plastic</a:t>
+                      </a:r>
+                      <a:endParaRPr lang="en-US" sz="2800" b="1" dirty="0"/>
+                    </a:p>
+                  </a:txBody>
+                  <a:tcPr>
+                    <a:lnL w="12700" cap="flat" cmpd="sng" algn="ctr">
+                      <a:solidFill>
+                        <a:schemeClr val="tx1"/>
+                      </a:solidFill>
+                      <a:prstDash val="solid"/>
+                      <a:round/>
+                      <a:headEnd type="none" w="med" len="med"/>
+                      <a:tailEnd type="none" w="med" len="med"/>
+                    </a:lnL>
+                    <a:lnR w="12700" cap="flat" cmpd="sng" algn="ctr">
+                      <a:solidFill>
+                        <a:schemeClr val="tx1"/>
+                      </a:solidFill>
+                      <a:prstDash val="solid"/>
+                      <a:round/>
+                      <a:headEnd type="none" w="med" len="med"/>
+                      <a:tailEnd type="none" w="med" len="med"/>
+                    </a:lnR>
+                    <a:lnT w="12700" cap="flat" cmpd="sng" algn="ctr">
+                      <a:solidFill>
+                        <a:schemeClr val="tx1"/>
+                      </a:solidFill>
+                      <a:prstDash val="solid"/>
+                      <a:round/>
+                      <a:headEnd type="none" w="med" len="med"/>
+                      <a:tailEnd type="none" w="med" len="med"/>
+                    </a:lnT>
+                    <a:lnB w="12700" cap="flat" cmpd="sng" algn="ctr">
+                      <a:solidFill>
+                        <a:schemeClr val="tx1"/>
+                      </a:solidFill>
+                      <a:prstDash val="solid"/>
+                      <a:round/>
+                      <a:headEnd type="none" w="med" len="med"/>
+                      <a:tailEnd type="none" w="med" len="med"/>
+                    </a:lnB>
+                  </a:tcPr>
+                </a:tc>
+                <a:tc gridSpan="2">
+                  <a:txBody>
+                    <a:bodyPr/>
+                    <a:lstStyle/>
+                    <a:p>
+                      <a:pPr algn="ctr"/>
+                      <a:r>
+                        <a:rPr lang="en-US" sz="2800" b="1" dirty="0" smtClean="0"/>
+                        <a:t>Bed / Table</a:t>
+                      </a:r>
+                      <a:endParaRPr lang="en-US" sz="2800" b="1" dirty="0"/>
+                    </a:p>
+                  </a:txBody>
+                  <a:tcPr>
+                    <a:lnL w="12700" cap="flat" cmpd="sng" algn="ctr">
+                      <a:solidFill>
+                        <a:schemeClr val="tx1"/>
+                      </a:solidFill>
+                      <a:prstDash val="solid"/>
+                      <a:round/>
+                      <a:headEnd type="none" w="med" len="med"/>
+                      <a:tailEnd type="none" w="med" len="med"/>
+                    </a:lnL>
+                    <a:lnR w="12700" cap="flat" cmpd="sng" algn="ctr">
+                      <a:solidFill>
+                        <a:schemeClr val="tx1"/>
+                      </a:solidFill>
+                      <a:prstDash val="solid"/>
+                      <a:round/>
+                      <a:headEnd type="none" w="med" len="med"/>
+                      <a:tailEnd type="none" w="med" len="med"/>
+                    </a:lnR>
+                    <a:lnT w="12700" cap="flat" cmpd="sng" algn="ctr">
+                      <a:solidFill>
+                        <a:schemeClr val="tx1"/>
+                      </a:solidFill>
+                      <a:prstDash val="solid"/>
+                      <a:round/>
+                      <a:headEnd type="none" w="med" len="med"/>
+                      <a:tailEnd type="none" w="med" len="med"/>
+                    </a:lnT>
+                    <a:lnB w="12700" cap="flat" cmpd="sng" algn="ctr">
+                      <a:solidFill>
+                        <a:schemeClr val="tx1"/>
+                      </a:solidFill>
+                      <a:prstDash val="solid"/>
+                      <a:round/>
+                      <a:headEnd type="none" w="med" len="med"/>
+                      <a:tailEnd type="none" w="med" len="med"/>
+                    </a:lnB>
+                  </a:tcPr>
+                </a:tc>
+                <a:tc hMerge="1">
+                  <a:txBody>
+                    <a:bodyPr/>
+                    <a:lstStyle/>
+                    <a:p>
+                      <a:endParaRPr lang="en-US" dirty="0"/>
+                    </a:p>
+                  </a:txBody>
+                  <a:tcPr>
+                    <a:lnL w="12700" cap="flat" cmpd="sng" algn="ctr">
+                      <a:solidFill>
+                        <a:schemeClr val="tx1"/>
+                      </a:solidFill>
+                      <a:prstDash val="solid"/>
+                      <a:round/>
+                      <a:headEnd type="none" w="med" len="med"/>
+                      <a:tailEnd type="none" w="med" len="med"/>
+                    </a:lnL>
+                    <a:lnR w="12700" cap="flat" cmpd="sng" algn="ctr">
+                      <a:solidFill>
+                        <a:schemeClr val="tx1"/>
+                      </a:solidFill>
+                      <a:prstDash val="solid"/>
+                      <a:round/>
+                      <a:headEnd type="none" w="med" len="med"/>
+                      <a:tailEnd type="none" w="med" len="med"/>
+                    </a:lnR>
+                    <a:lnT w="12700" cap="flat" cmpd="sng" algn="ctr">
+                      <a:solidFill>
+                        <a:schemeClr val="tx1"/>
+                      </a:solidFill>
+                      <a:prstDash val="solid"/>
+                      <a:round/>
+                      <a:headEnd type="none" w="med" len="med"/>
+                      <a:tailEnd type="none" w="med" len="med"/>
+                    </a:lnT>
+                    <a:lnB w="12700" cap="flat" cmpd="sng" algn="ctr">
+                      <a:solidFill>
+                        <a:schemeClr val="tx1"/>
+                      </a:solidFill>
+                      <a:prstDash val="solid"/>
+                      <a:round/>
+                      <a:headEnd type="none" w="med" len="med"/>
+                      <a:tailEnd type="none" w="med" len="med"/>
+                    </a:lnB>
+                  </a:tcPr>
+                </a:tc>
+                <a:tc gridSpan="2">
+                  <a:txBody>
+                    <a:bodyPr/>
+                    <a:lstStyle/>
+                    <a:p>
+                      <a:pPr algn="ctr"/>
+                      <a:r>
+                        <a:rPr lang="en-US" sz="2800" b="1" dirty="0" smtClean="0"/>
+                        <a:t>Nozzle</a:t>
+                      </a:r>
+                      <a:endParaRPr lang="en-US" sz="2800" b="1" dirty="0"/>
+                    </a:p>
+                  </a:txBody>
+                  <a:tcPr>
+                    <a:lnL w="12700" cap="flat" cmpd="sng" algn="ctr">
+                      <a:solidFill>
+                        <a:schemeClr val="tx1"/>
+                      </a:solidFill>
+                      <a:prstDash val="solid"/>
+                      <a:round/>
+                      <a:headEnd type="none" w="med" len="med"/>
+                      <a:tailEnd type="none" w="med" len="med"/>
+                    </a:lnL>
+                    <a:lnR w="12700" cap="flat" cmpd="sng" algn="ctr">
+                      <a:solidFill>
+                        <a:schemeClr val="tx1"/>
+                      </a:solidFill>
+                      <a:prstDash val="solid"/>
+                      <a:round/>
+                      <a:headEnd type="none" w="med" len="med"/>
+                      <a:tailEnd type="none" w="med" len="med"/>
+                    </a:lnR>
+                    <a:lnT w="12700" cap="flat" cmpd="sng" algn="ctr">
+                      <a:solidFill>
+                        <a:schemeClr val="tx1"/>
+                      </a:solidFill>
+                      <a:prstDash val="solid"/>
+                      <a:round/>
+                      <a:headEnd type="none" w="med" len="med"/>
+                      <a:tailEnd type="none" w="med" len="med"/>
+                    </a:lnT>
+                    <a:lnB w="12700" cap="flat" cmpd="sng" algn="ctr">
+                      <a:solidFill>
+                        <a:schemeClr val="tx1"/>
+                      </a:solidFill>
+                      <a:prstDash val="solid"/>
+                      <a:round/>
+                      <a:headEnd type="none" w="med" len="med"/>
+                      <a:tailEnd type="none" w="med" len="med"/>
+                    </a:lnB>
+                  </a:tcPr>
+                </a:tc>
+                <a:tc hMerge="1">
+                  <a:txBody>
+                    <a:bodyPr/>
+                    <a:lstStyle/>
+                    <a:p>
+                      <a:endParaRPr lang="en-US" dirty="0"/>
+                    </a:p>
+                  </a:txBody>
+                  <a:tcPr>
+                    <a:lnL w="12700" cap="flat" cmpd="sng" algn="ctr">
+                      <a:solidFill>
+                        <a:schemeClr val="tx1"/>
+                      </a:solidFill>
+                      <a:prstDash val="solid"/>
+                      <a:round/>
+                      <a:headEnd type="none" w="med" len="med"/>
+                      <a:tailEnd type="none" w="med" len="med"/>
+                    </a:lnL>
+                    <a:lnR w="12700" cap="flat" cmpd="sng" algn="ctr">
+                      <a:solidFill>
+                        <a:schemeClr val="tx1"/>
+                      </a:solidFill>
+                      <a:prstDash val="solid"/>
+                      <a:round/>
+                      <a:headEnd type="none" w="med" len="med"/>
+                      <a:tailEnd type="none" w="med" len="med"/>
+                    </a:lnR>
+                    <a:lnT w="12700" cap="flat" cmpd="sng" algn="ctr">
+                      <a:solidFill>
+                        <a:schemeClr val="tx1"/>
+                      </a:solidFill>
+                      <a:prstDash val="solid"/>
+                      <a:round/>
+                      <a:headEnd type="none" w="med" len="med"/>
+                      <a:tailEnd type="none" w="med" len="med"/>
+                    </a:lnT>
+                    <a:lnB w="12700" cap="flat" cmpd="sng" algn="ctr">
+                      <a:solidFill>
+                        <a:schemeClr val="tx1"/>
+                      </a:solidFill>
+                      <a:prstDash val="solid"/>
+                      <a:round/>
+                      <a:headEnd type="none" w="med" len="med"/>
+                      <a:tailEnd type="none" w="med" len="med"/>
+                    </a:lnB>
+                  </a:tcPr>
+                </a:tc>
+              </a:tr>
+              <a:tr h="533400">
+                <a:tc vMerge="1">
+                  <a:txBody>
+                    <a:bodyPr/>
+                    <a:lstStyle/>
+                    <a:p>
+                      <a:endParaRPr lang="en-US" dirty="0"/>
+                    </a:p>
+                  </a:txBody>
+                  <a:tcPr>
+                    <a:lnL w="12700" cap="flat" cmpd="sng" algn="ctr">
+                      <a:solidFill>
+                        <a:schemeClr val="tx1"/>
+                      </a:solidFill>
+                      <a:prstDash val="solid"/>
+                      <a:round/>
+                      <a:headEnd type="none" w="med" len="med"/>
+                      <a:tailEnd type="none" w="med" len="med"/>
+                    </a:lnL>
+                    <a:lnR w="12700" cap="flat" cmpd="sng" algn="ctr">
+                      <a:solidFill>
+                        <a:schemeClr val="tx1"/>
+                      </a:solidFill>
+                      <a:prstDash val="solid"/>
+                      <a:round/>
+                      <a:headEnd type="none" w="med" len="med"/>
+                      <a:tailEnd type="none" w="med" len="med"/>
+                    </a:lnR>
+                    <a:lnT w="12700" cap="flat" cmpd="sng" algn="ctr">
+                      <a:solidFill>
+                        <a:schemeClr val="tx1"/>
+                      </a:solidFill>
+                      <a:prstDash val="solid"/>
+                      <a:round/>
+                      <a:headEnd type="none" w="med" len="med"/>
+                      <a:tailEnd type="none" w="med" len="med"/>
+                    </a:lnT>
+                    <a:lnB w="12700" cap="flat" cmpd="sng" algn="ctr">
+                      <a:solidFill>
+                        <a:schemeClr val="tx1"/>
+                      </a:solidFill>
+                      <a:prstDash val="solid"/>
+                      <a:round/>
+                      <a:headEnd type="none" w="med" len="med"/>
+                      <a:tailEnd type="none" w="med" len="med"/>
+                    </a:lnB>
+                  </a:tcPr>
+                </a:tc>
+                <a:tc>
+                  <a:txBody>
+                    <a:bodyPr/>
+                    <a:lstStyle/>
+                    <a:p>
+                      <a:pPr algn="ctr"/>
+                      <a:r>
+                        <a:rPr lang="en-US" sz="2800" b="1" dirty="0" smtClean="0"/>
+                        <a:t>C</a:t>
+                      </a:r>
+                      <a:endParaRPr lang="en-US" sz="2800" b="1" dirty="0"/>
+                    </a:p>
+                  </a:txBody>
+                  <a:tcPr>
+                    <a:lnL w="12700" cap="flat" cmpd="sng" algn="ctr">
+                      <a:solidFill>
+                        <a:schemeClr val="tx1"/>
+                      </a:solidFill>
+                      <a:prstDash val="solid"/>
+                      <a:round/>
+                      <a:headEnd type="none" w="med" len="med"/>
+                      <a:tailEnd type="none" w="med" len="med"/>
+                    </a:lnL>
+                    <a:lnR w="12700" cap="flat" cmpd="sng" algn="ctr">
+                      <a:solidFill>
+                        <a:schemeClr val="tx1"/>
+                      </a:solidFill>
+                      <a:prstDash val="solid"/>
+                      <a:round/>
+                      <a:headEnd type="none" w="med" len="med"/>
+                      <a:tailEnd type="none" w="med" len="med"/>
+                    </a:lnR>
+                    <a:lnT w="12700" cap="flat" cmpd="sng" algn="ctr">
+                      <a:solidFill>
+                        <a:schemeClr val="tx1"/>
+                      </a:solidFill>
+                      <a:prstDash val="solid"/>
+                      <a:round/>
+                      <a:headEnd type="none" w="med" len="med"/>
+                      <a:tailEnd type="none" w="med" len="med"/>
+                    </a:lnT>
+                    <a:lnB w="12700" cap="flat" cmpd="sng" algn="ctr">
+                      <a:solidFill>
+                        <a:schemeClr val="tx1"/>
+                      </a:solidFill>
+                      <a:prstDash val="solid"/>
+                      <a:round/>
+                      <a:headEnd type="none" w="med" len="med"/>
+                      <a:tailEnd type="none" w="med" len="med"/>
+                    </a:lnB>
+                  </a:tcPr>
+                </a:tc>
+                <a:tc>
+                  <a:txBody>
+                    <a:bodyPr/>
+                    <a:lstStyle/>
+                    <a:p>
+                      <a:pPr algn="ctr"/>
+                      <a:r>
+                        <a:rPr lang="en-US" sz="2800" b="1" dirty="0" smtClean="0"/>
+                        <a:t>F</a:t>
+                      </a:r>
+                      <a:endParaRPr lang="en-US" sz="2800" b="1" dirty="0"/>
+                    </a:p>
+                  </a:txBody>
+                  <a:tcPr>
+                    <a:lnL w="12700" cap="flat" cmpd="sng" algn="ctr">
+                      <a:solidFill>
+                        <a:schemeClr val="tx1"/>
+                      </a:solidFill>
+                      <a:prstDash val="solid"/>
+                      <a:round/>
+                      <a:headEnd type="none" w="med" len="med"/>
+                      <a:tailEnd type="none" w="med" len="med"/>
+                    </a:lnL>
+                    <a:lnR w="12700" cap="flat" cmpd="sng" algn="ctr">
+                      <a:solidFill>
+                        <a:schemeClr val="tx1"/>
+                      </a:solidFill>
+                      <a:prstDash val="solid"/>
+                      <a:round/>
+                      <a:headEnd type="none" w="med" len="med"/>
+                      <a:tailEnd type="none" w="med" len="med"/>
+                    </a:lnR>
+                    <a:lnT w="12700" cap="flat" cmpd="sng" algn="ctr">
+                      <a:solidFill>
+                        <a:schemeClr val="tx1"/>
+                      </a:solidFill>
+                      <a:prstDash val="solid"/>
+                      <a:round/>
+                      <a:headEnd type="none" w="med" len="med"/>
+                      <a:tailEnd type="none" w="med" len="med"/>
+                    </a:lnT>
+                    <a:lnB w="12700" cap="flat" cmpd="sng" algn="ctr">
+                      <a:solidFill>
+                        <a:schemeClr val="tx1"/>
+                      </a:solidFill>
+                      <a:prstDash val="solid"/>
+                      <a:round/>
+                      <a:headEnd type="none" w="med" len="med"/>
+                      <a:tailEnd type="none" w="med" len="med"/>
+                    </a:lnB>
+                    <a:solidFill>
+                      <a:srgbClr val="FFC000"/>
+                    </a:solidFill>
+                  </a:tcPr>
+                </a:tc>
+                <a:tc>
+                  <a:txBody>
+                    <a:bodyPr/>
+                    <a:lstStyle/>
+                    <a:p>
+                      <a:pPr algn="ctr"/>
+                      <a:r>
+                        <a:rPr lang="en-US" sz="2800" b="1" dirty="0" smtClean="0"/>
+                        <a:t>C</a:t>
+                      </a:r>
+                      <a:endParaRPr lang="en-US" sz="2800" b="1" dirty="0"/>
+                    </a:p>
+                  </a:txBody>
+                  <a:tcPr>
+                    <a:lnL w="12700" cap="flat" cmpd="sng" algn="ctr">
+                      <a:solidFill>
+                        <a:schemeClr val="tx1"/>
+                      </a:solidFill>
+                      <a:prstDash val="solid"/>
+                      <a:round/>
+                      <a:headEnd type="none" w="med" len="med"/>
+                      <a:tailEnd type="none" w="med" len="med"/>
+                    </a:lnL>
+                    <a:lnR w="12700" cap="flat" cmpd="sng" algn="ctr">
+                      <a:solidFill>
+                        <a:schemeClr val="tx1"/>
+                      </a:solidFill>
+                      <a:prstDash val="solid"/>
+                      <a:round/>
+                      <a:headEnd type="none" w="med" len="med"/>
+                      <a:tailEnd type="none" w="med" len="med"/>
+                    </a:lnR>
+                    <a:lnT w="12700" cap="flat" cmpd="sng" algn="ctr">
+                      <a:solidFill>
+                        <a:schemeClr val="tx1"/>
+                      </a:solidFill>
+                      <a:prstDash val="solid"/>
+                      <a:round/>
+                      <a:headEnd type="none" w="med" len="med"/>
+                      <a:tailEnd type="none" w="med" len="med"/>
+                    </a:lnT>
+                    <a:lnB w="12700" cap="flat" cmpd="sng" algn="ctr">
+                      <a:solidFill>
+                        <a:schemeClr val="tx1"/>
+                      </a:solidFill>
+                      <a:prstDash val="solid"/>
+                      <a:round/>
+                      <a:headEnd type="none" w="med" len="med"/>
+                      <a:tailEnd type="none" w="med" len="med"/>
+                    </a:lnB>
+                  </a:tcPr>
+                </a:tc>
+                <a:tc>
+                  <a:txBody>
+                    <a:bodyPr/>
+                    <a:lstStyle/>
+                    <a:p>
+                      <a:pPr algn="ctr"/>
+                      <a:r>
+                        <a:rPr lang="en-US" sz="2800" b="1" dirty="0" smtClean="0"/>
+                        <a:t>F</a:t>
+                      </a:r>
+                      <a:endParaRPr lang="en-US" sz="2800" b="1" dirty="0"/>
+                    </a:p>
+                  </a:txBody>
+                  <a:tcPr>
+                    <a:lnL w="12700" cap="flat" cmpd="sng" algn="ctr">
+                      <a:solidFill>
+                        <a:schemeClr val="tx1"/>
+                      </a:solidFill>
+                      <a:prstDash val="solid"/>
+                      <a:round/>
+                      <a:headEnd type="none" w="med" len="med"/>
+                      <a:tailEnd type="none" w="med" len="med"/>
+                    </a:lnL>
+                    <a:lnR w="12700" cap="flat" cmpd="sng" algn="ctr">
+                      <a:solidFill>
+                        <a:schemeClr val="tx1"/>
+                      </a:solidFill>
+                      <a:prstDash val="solid"/>
+                      <a:round/>
+                      <a:headEnd type="none" w="med" len="med"/>
+                      <a:tailEnd type="none" w="med" len="med"/>
+                    </a:lnR>
+                    <a:lnT w="12700" cap="flat" cmpd="sng" algn="ctr">
+                      <a:solidFill>
+                        <a:schemeClr val="tx1"/>
+                      </a:solidFill>
+                      <a:prstDash val="solid"/>
+                      <a:round/>
+                      <a:headEnd type="none" w="med" len="med"/>
+                      <a:tailEnd type="none" w="med" len="med"/>
+                    </a:lnT>
+                    <a:lnB w="12700" cap="flat" cmpd="sng" algn="ctr">
+                      <a:solidFill>
+                        <a:schemeClr val="tx1"/>
+                      </a:solidFill>
+                      <a:prstDash val="solid"/>
+                      <a:round/>
+                      <a:headEnd type="none" w="med" len="med"/>
+                      <a:tailEnd type="none" w="med" len="med"/>
+                    </a:lnB>
+                    <a:solidFill>
+                      <a:srgbClr val="FFC000"/>
+                    </a:solidFill>
+                  </a:tcPr>
+                </a:tc>
+              </a:tr>
+              <a:tr h="698820">
+                <a:tc>
+                  <a:txBody>
+                    <a:bodyPr/>
+                    <a:lstStyle/>
+                    <a:p>
+                      <a:r>
+                        <a:rPr lang="en-US" sz="2800" dirty="0" smtClean="0"/>
+                        <a:t>PLA</a:t>
+                      </a:r>
+                      <a:endParaRPr lang="en-US" sz="2800" dirty="0"/>
+                    </a:p>
+                  </a:txBody>
+                  <a:tcPr>
+                    <a:lnL w="12700" cap="flat" cmpd="sng" algn="ctr">
+                      <a:solidFill>
+                        <a:schemeClr val="tx1"/>
+                      </a:solidFill>
+                      <a:prstDash val="solid"/>
+                      <a:round/>
+                      <a:headEnd type="none" w="med" len="med"/>
+                      <a:tailEnd type="none" w="med" len="med"/>
+                    </a:lnL>
+                    <a:lnR w="12700" cap="flat" cmpd="sng" algn="ctr">
+                      <a:solidFill>
+                        <a:schemeClr val="tx1"/>
+                      </a:solidFill>
+                      <a:prstDash val="solid"/>
+                      <a:round/>
+                      <a:headEnd type="none" w="med" len="med"/>
+                      <a:tailEnd type="none" w="med" len="med"/>
+                    </a:lnR>
+                    <a:lnT w="12700" cap="flat" cmpd="sng" algn="ctr">
+                      <a:solidFill>
+                        <a:schemeClr val="tx1"/>
+                      </a:solidFill>
+                      <a:prstDash val="solid"/>
+                      <a:round/>
+                      <a:headEnd type="none" w="med" len="med"/>
+                      <a:tailEnd type="none" w="med" len="med"/>
+                    </a:lnT>
+                    <a:lnB w="12700" cap="flat" cmpd="sng" algn="ctr">
+                      <a:solidFill>
+                        <a:schemeClr val="tx1"/>
+                      </a:solidFill>
+                      <a:prstDash val="solid"/>
+                      <a:round/>
+                      <a:headEnd type="none" w="med" len="med"/>
+                      <a:tailEnd type="none" w="med" len="med"/>
+                    </a:lnB>
+                  </a:tcPr>
+                </a:tc>
+                <a:tc>
+                  <a:txBody>
+                    <a:bodyPr/>
+                    <a:lstStyle/>
+                    <a:p>
+                      <a:r>
+                        <a:rPr lang="en-US" sz="2800" dirty="0" smtClean="0"/>
+                        <a:t>0 – 65</a:t>
+                      </a:r>
+                      <a:endParaRPr lang="en-US" sz="2800" dirty="0"/>
+                    </a:p>
+                  </a:txBody>
+                  <a:tcPr>
+                    <a:lnL w="12700" cap="flat" cmpd="sng" algn="ctr">
+                      <a:solidFill>
+                        <a:schemeClr val="tx1"/>
+                      </a:solidFill>
+                      <a:prstDash val="solid"/>
+                      <a:round/>
+                      <a:headEnd type="none" w="med" len="med"/>
+                      <a:tailEnd type="none" w="med" len="med"/>
+                    </a:lnL>
+                    <a:lnR w="12700" cap="flat" cmpd="sng" algn="ctr">
+                      <a:solidFill>
+                        <a:schemeClr val="tx1"/>
+                      </a:solidFill>
+                      <a:prstDash val="solid"/>
+                      <a:round/>
+                      <a:headEnd type="none" w="med" len="med"/>
+                      <a:tailEnd type="none" w="med" len="med"/>
+                    </a:lnR>
+                    <a:lnT w="12700" cap="flat" cmpd="sng" algn="ctr">
+                      <a:solidFill>
+                        <a:schemeClr val="tx1"/>
+                      </a:solidFill>
+                      <a:prstDash val="solid"/>
+                      <a:round/>
+                      <a:headEnd type="none" w="med" len="med"/>
+                      <a:tailEnd type="none" w="med" len="med"/>
+                    </a:lnT>
+                    <a:lnB w="12700" cap="flat" cmpd="sng" algn="ctr">
+                      <a:solidFill>
+                        <a:schemeClr val="tx1"/>
+                      </a:solidFill>
+                      <a:prstDash val="solid"/>
+                      <a:round/>
+                      <a:headEnd type="none" w="med" len="med"/>
+                      <a:tailEnd type="none" w="med" len="med"/>
+                    </a:lnB>
+                  </a:tcPr>
+                </a:tc>
+                <a:tc>
+                  <a:txBody>
+                    <a:bodyPr/>
+                    <a:lstStyle/>
+                    <a:p>
+                      <a:r>
+                        <a:rPr lang="en-US" sz="2800" dirty="0" smtClean="0"/>
+                        <a:t>0</a:t>
+                      </a:r>
+                      <a:r>
+                        <a:rPr lang="en-US" sz="2800" baseline="0" dirty="0" smtClean="0"/>
+                        <a:t> - </a:t>
+                      </a:r>
+                      <a:r>
+                        <a:rPr lang="en-US" sz="2800" dirty="0" smtClean="0"/>
+                        <a:t>149</a:t>
+                      </a:r>
+                      <a:endParaRPr lang="en-US" sz="2800" dirty="0"/>
+                    </a:p>
+                  </a:txBody>
+                  <a:tcPr>
+                    <a:lnL w="12700" cap="flat" cmpd="sng" algn="ctr">
+                      <a:solidFill>
+                        <a:schemeClr val="tx1"/>
+                      </a:solidFill>
+                      <a:prstDash val="solid"/>
+                      <a:round/>
+                      <a:headEnd type="none" w="med" len="med"/>
+                      <a:tailEnd type="none" w="med" len="med"/>
+                    </a:lnL>
+                    <a:lnR w="12700" cap="flat" cmpd="sng" algn="ctr">
+                      <a:solidFill>
+                        <a:schemeClr val="tx1"/>
+                      </a:solidFill>
+                      <a:prstDash val="solid"/>
+                      <a:round/>
+                      <a:headEnd type="none" w="med" len="med"/>
+                      <a:tailEnd type="none" w="med" len="med"/>
+                    </a:lnR>
+                    <a:lnT w="12700" cap="flat" cmpd="sng" algn="ctr">
+                      <a:solidFill>
+                        <a:schemeClr val="tx1"/>
+                      </a:solidFill>
+                      <a:prstDash val="solid"/>
+                      <a:round/>
+                      <a:headEnd type="none" w="med" len="med"/>
+                      <a:tailEnd type="none" w="med" len="med"/>
+                    </a:lnT>
+                    <a:lnB w="12700" cap="flat" cmpd="sng" algn="ctr">
+                      <a:solidFill>
+                        <a:schemeClr val="tx1"/>
+                      </a:solidFill>
+                      <a:prstDash val="solid"/>
+                      <a:round/>
+                      <a:headEnd type="none" w="med" len="med"/>
+                      <a:tailEnd type="none" w="med" len="med"/>
+                    </a:lnB>
+                    <a:solidFill>
+                      <a:srgbClr val="FFC000"/>
+                    </a:solidFill>
+                  </a:tcPr>
+                </a:tc>
+                <a:tc>
+                  <a:txBody>
+                    <a:bodyPr/>
+                    <a:lstStyle/>
+                    <a:p>
+                      <a:r>
+                        <a:rPr lang="en-US" sz="2800" dirty="0" smtClean="0"/>
+                        <a:t>200 - 210</a:t>
+                      </a:r>
+                      <a:endParaRPr lang="en-US" sz="2800" dirty="0"/>
+                    </a:p>
+                  </a:txBody>
+                  <a:tcPr>
+                    <a:lnL w="12700" cap="flat" cmpd="sng" algn="ctr">
+                      <a:solidFill>
+                        <a:schemeClr val="tx1"/>
+                      </a:solidFill>
+                      <a:prstDash val="solid"/>
+                      <a:round/>
+                      <a:headEnd type="none" w="med" len="med"/>
+                      <a:tailEnd type="none" w="med" len="med"/>
+                    </a:lnL>
+                    <a:lnR w="12700" cap="flat" cmpd="sng" algn="ctr">
+                      <a:solidFill>
+                        <a:schemeClr val="tx1"/>
+                      </a:solidFill>
+                      <a:prstDash val="solid"/>
+                      <a:round/>
+                      <a:headEnd type="none" w="med" len="med"/>
+                      <a:tailEnd type="none" w="med" len="med"/>
+                    </a:lnR>
+                    <a:lnT w="12700" cap="flat" cmpd="sng" algn="ctr">
+                      <a:solidFill>
+                        <a:schemeClr val="tx1"/>
+                      </a:solidFill>
+                      <a:prstDash val="solid"/>
+                      <a:round/>
+                      <a:headEnd type="none" w="med" len="med"/>
+                      <a:tailEnd type="none" w="med" len="med"/>
+                    </a:lnT>
+                    <a:lnB w="12700" cap="flat" cmpd="sng" algn="ctr">
+                      <a:solidFill>
+                        <a:schemeClr val="tx1"/>
+                      </a:solidFill>
+                      <a:prstDash val="solid"/>
+                      <a:round/>
+                      <a:headEnd type="none" w="med" len="med"/>
+                      <a:tailEnd type="none" w="med" len="med"/>
+                    </a:lnB>
+                  </a:tcPr>
+                </a:tc>
+                <a:tc>
+                  <a:txBody>
+                    <a:bodyPr/>
+                    <a:lstStyle/>
+                    <a:p>
+                      <a:r>
+                        <a:rPr lang="en-US" sz="2800" dirty="0" smtClean="0"/>
+                        <a:t>392 – 410</a:t>
+                      </a:r>
+                      <a:endParaRPr lang="en-US" sz="2800" dirty="0"/>
+                    </a:p>
+                  </a:txBody>
+                  <a:tcPr>
+                    <a:lnL w="12700" cap="flat" cmpd="sng" algn="ctr">
+                      <a:solidFill>
+                        <a:schemeClr val="tx1"/>
+                      </a:solidFill>
+                      <a:prstDash val="solid"/>
+                      <a:round/>
+                      <a:headEnd type="none" w="med" len="med"/>
+                      <a:tailEnd type="none" w="med" len="med"/>
+                    </a:lnL>
+                    <a:lnR w="12700" cap="flat" cmpd="sng" algn="ctr">
+                      <a:solidFill>
+                        <a:schemeClr val="tx1"/>
+                      </a:solidFill>
+                      <a:prstDash val="solid"/>
+                      <a:round/>
+                      <a:headEnd type="none" w="med" len="med"/>
+                      <a:tailEnd type="none" w="med" len="med"/>
+                    </a:lnR>
+                    <a:lnT w="12700" cap="flat" cmpd="sng" algn="ctr">
+                      <a:solidFill>
+                        <a:schemeClr val="tx1"/>
+                      </a:solidFill>
+                      <a:prstDash val="solid"/>
+                      <a:round/>
+                      <a:headEnd type="none" w="med" len="med"/>
+                      <a:tailEnd type="none" w="med" len="med"/>
+                    </a:lnT>
+                    <a:lnB w="12700" cap="flat" cmpd="sng" algn="ctr">
+                      <a:solidFill>
+                        <a:schemeClr val="tx1"/>
+                      </a:solidFill>
+                      <a:prstDash val="solid"/>
+                      <a:round/>
+                      <a:headEnd type="none" w="med" len="med"/>
+                      <a:tailEnd type="none" w="med" len="med"/>
+                    </a:lnB>
+                    <a:solidFill>
+                      <a:srgbClr val="FFC000"/>
+                    </a:solidFill>
+                  </a:tcPr>
+                </a:tc>
+              </a:tr>
+              <a:tr h="698820">
+                <a:tc>
+                  <a:txBody>
+                    <a:bodyPr/>
+                    <a:lstStyle/>
+                    <a:p>
+                      <a:r>
+                        <a:rPr lang="en-US" sz="2800" dirty="0" smtClean="0"/>
+                        <a:t>ABS</a:t>
+                      </a:r>
+                      <a:endParaRPr lang="en-US" sz="2800" dirty="0"/>
+                    </a:p>
+                  </a:txBody>
+                  <a:tcPr>
+                    <a:lnL w="12700" cap="flat" cmpd="sng" algn="ctr">
+                      <a:solidFill>
+                        <a:schemeClr val="tx1"/>
+                      </a:solidFill>
+                      <a:prstDash val="solid"/>
+                      <a:round/>
+                      <a:headEnd type="none" w="med" len="med"/>
+                      <a:tailEnd type="none" w="med" len="med"/>
+                    </a:lnL>
+                    <a:lnR w="12700" cap="flat" cmpd="sng" algn="ctr">
+                      <a:solidFill>
+                        <a:schemeClr val="tx1"/>
+                      </a:solidFill>
+                      <a:prstDash val="solid"/>
+                      <a:round/>
+                      <a:headEnd type="none" w="med" len="med"/>
+                      <a:tailEnd type="none" w="med" len="med"/>
+                    </a:lnR>
+                    <a:lnT w="12700" cap="flat" cmpd="sng" algn="ctr">
+                      <a:solidFill>
+                        <a:schemeClr val="tx1"/>
+                      </a:solidFill>
+                      <a:prstDash val="solid"/>
+                      <a:round/>
+                      <a:headEnd type="none" w="med" len="med"/>
+                      <a:tailEnd type="none" w="med" len="med"/>
+                    </a:lnT>
+                    <a:lnB w="12700" cap="flat" cmpd="sng" algn="ctr">
+                      <a:solidFill>
+                        <a:schemeClr val="tx1"/>
+                      </a:solidFill>
+                      <a:prstDash val="solid"/>
+                      <a:round/>
+                      <a:headEnd type="none" w="med" len="med"/>
+                      <a:tailEnd type="none" w="med" len="med"/>
+                    </a:lnB>
+                  </a:tcPr>
+                </a:tc>
+                <a:tc>
+                  <a:txBody>
+                    <a:bodyPr/>
+                    <a:lstStyle/>
+                    <a:p>
+                      <a:r>
+                        <a:rPr lang="en-US" sz="2800" dirty="0" smtClean="0"/>
+                        <a:t>110 – 115</a:t>
+                      </a:r>
+                      <a:endParaRPr lang="en-US" sz="2800" dirty="0"/>
+                    </a:p>
+                  </a:txBody>
+                  <a:tcPr>
+                    <a:lnL w="12700" cap="flat" cmpd="sng" algn="ctr">
+                      <a:solidFill>
+                        <a:schemeClr val="tx1"/>
+                      </a:solidFill>
+                      <a:prstDash val="solid"/>
+                      <a:round/>
+                      <a:headEnd type="none" w="med" len="med"/>
+                      <a:tailEnd type="none" w="med" len="med"/>
+                    </a:lnL>
+                    <a:lnR w="12700" cap="flat" cmpd="sng" algn="ctr">
+                      <a:solidFill>
+                        <a:schemeClr val="tx1"/>
+                      </a:solidFill>
+                      <a:prstDash val="solid"/>
+                      <a:round/>
+                      <a:headEnd type="none" w="med" len="med"/>
+                      <a:tailEnd type="none" w="med" len="med"/>
+                    </a:lnR>
+                    <a:lnT w="12700" cap="flat" cmpd="sng" algn="ctr">
+                      <a:solidFill>
+                        <a:schemeClr val="tx1"/>
+                      </a:solidFill>
+                      <a:prstDash val="solid"/>
+                      <a:round/>
+                      <a:headEnd type="none" w="med" len="med"/>
+                      <a:tailEnd type="none" w="med" len="med"/>
+                    </a:lnT>
+                    <a:lnB w="12700" cap="flat" cmpd="sng" algn="ctr">
+                      <a:solidFill>
+                        <a:schemeClr val="tx1"/>
+                      </a:solidFill>
+                      <a:prstDash val="solid"/>
+                      <a:round/>
+                      <a:headEnd type="none" w="med" len="med"/>
+                      <a:tailEnd type="none" w="med" len="med"/>
+                    </a:lnB>
+                  </a:tcPr>
+                </a:tc>
+                <a:tc>
+                  <a:txBody>
+                    <a:bodyPr/>
+                    <a:lstStyle/>
+                    <a:p>
+                      <a:r>
+                        <a:rPr lang="en-US" sz="2800" dirty="0" smtClean="0"/>
+                        <a:t>230 - 239</a:t>
+                      </a:r>
+                      <a:endParaRPr lang="en-US" sz="2800" dirty="0"/>
+                    </a:p>
+                  </a:txBody>
+                  <a:tcPr>
+                    <a:lnL w="12700" cap="flat" cmpd="sng" algn="ctr">
+                      <a:solidFill>
+                        <a:schemeClr val="tx1"/>
+                      </a:solidFill>
+                      <a:prstDash val="solid"/>
+                      <a:round/>
+                      <a:headEnd type="none" w="med" len="med"/>
+                      <a:tailEnd type="none" w="med" len="med"/>
+                    </a:lnL>
+                    <a:lnR w="12700" cap="flat" cmpd="sng" algn="ctr">
+                      <a:solidFill>
+                        <a:schemeClr val="tx1"/>
+                      </a:solidFill>
+                      <a:prstDash val="solid"/>
+                      <a:round/>
+                      <a:headEnd type="none" w="med" len="med"/>
+                      <a:tailEnd type="none" w="med" len="med"/>
+                    </a:lnR>
+                    <a:lnT w="12700" cap="flat" cmpd="sng" algn="ctr">
+                      <a:solidFill>
+                        <a:schemeClr val="tx1"/>
+                      </a:solidFill>
+                      <a:prstDash val="solid"/>
+                      <a:round/>
+                      <a:headEnd type="none" w="med" len="med"/>
+                      <a:tailEnd type="none" w="med" len="med"/>
+                    </a:lnT>
+                    <a:lnB w="12700" cap="flat" cmpd="sng" algn="ctr">
+                      <a:solidFill>
+                        <a:schemeClr val="tx1"/>
+                      </a:solidFill>
+                      <a:prstDash val="solid"/>
+                      <a:round/>
+                      <a:headEnd type="none" w="med" len="med"/>
+                      <a:tailEnd type="none" w="med" len="med"/>
+                    </a:lnB>
+                    <a:solidFill>
+                      <a:srgbClr val="FFC000"/>
+                    </a:solidFill>
+                  </a:tcPr>
+                </a:tc>
+                <a:tc>
+                  <a:txBody>
+                    <a:bodyPr/>
+                    <a:lstStyle/>
+                    <a:p>
+                      <a:r>
+                        <a:rPr lang="en-US" sz="2800" dirty="0" smtClean="0"/>
+                        <a:t>225 - 235</a:t>
+                      </a:r>
+                      <a:endParaRPr lang="en-US" sz="2800" dirty="0"/>
+                    </a:p>
+                  </a:txBody>
+                  <a:tcPr>
+                    <a:lnL w="12700" cap="flat" cmpd="sng" algn="ctr">
+                      <a:solidFill>
+                        <a:schemeClr val="tx1"/>
+                      </a:solidFill>
+                      <a:prstDash val="solid"/>
+                      <a:round/>
+                      <a:headEnd type="none" w="med" len="med"/>
+                      <a:tailEnd type="none" w="med" len="med"/>
+                    </a:lnL>
+                    <a:lnR w="12700" cap="flat" cmpd="sng" algn="ctr">
+                      <a:solidFill>
+                        <a:schemeClr val="tx1"/>
+                      </a:solidFill>
+                      <a:prstDash val="solid"/>
+                      <a:round/>
+                      <a:headEnd type="none" w="med" len="med"/>
+                      <a:tailEnd type="none" w="med" len="med"/>
+                    </a:lnR>
+                    <a:lnT w="12700" cap="flat" cmpd="sng" algn="ctr">
+                      <a:solidFill>
+                        <a:schemeClr val="tx1"/>
+                      </a:solidFill>
+                      <a:prstDash val="solid"/>
+                      <a:round/>
+                      <a:headEnd type="none" w="med" len="med"/>
+                      <a:tailEnd type="none" w="med" len="med"/>
+                    </a:lnT>
+                    <a:lnB w="12700" cap="flat" cmpd="sng" algn="ctr">
+                      <a:solidFill>
+                        <a:schemeClr val="tx1"/>
+                      </a:solidFill>
+                      <a:prstDash val="solid"/>
+                      <a:round/>
+                      <a:headEnd type="none" w="med" len="med"/>
+                      <a:tailEnd type="none" w="med" len="med"/>
+                    </a:lnB>
+                  </a:tcPr>
+                </a:tc>
+                <a:tc>
+                  <a:txBody>
+                    <a:bodyPr/>
+                    <a:lstStyle/>
+                    <a:p>
+                      <a:r>
+                        <a:rPr lang="en-US" sz="2800" dirty="0" smtClean="0"/>
+                        <a:t>437 - 455</a:t>
+                      </a:r>
+                      <a:endParaRPr lang="en-US" sz="2800" dirty="0"/>
+                    </a:p>
+                  </a:txBody>
+                  <a:tcPr>
+                    <a:lnL w="12700" cap="flat" cmpd="sng" algn="ctr">
+                      <a:solidFill>
+                        <a:schemeClr val="tx1"/>
+                      </a:solidFill>
+                      <a:prstDash val="solid"/>
+                      <a:round/>
+                      <a:headEnd type="none" w="med" len="med"/>
+                      <a:tailEnd type="none" w="med" len="med"/>
+                    </a:lnL>
+                    <a:lnR w="12700" cap="flat" cmpd="sng" algn="ctr">
+                      <a:solidFill>
+                        <a:schemeClr val="tx1"/>
+                      </a:solidFill>
+                      <a:prstDash val="solid"/>
+                      <a:round/>
+                      <a:headEnd type="none" w="med" len="med"/>
+                      <a:tailEnd type="none" w="med" len="med"/>
+                    </a:lnR>
+                    <a:lnT w="12700" cap="flat" cmpd="sng" algn="ctr">
+                      <a:solidFill>
+                        <a:schemeClr val="tx1"/>
+                      </a:solidFill>
+                      <a:prstDash val="solid"/>
+                      <a:round/>
+                      <a:headEnd type="none" w="med" len="med"/>
+                      <a:tailEnd type="none" w="med" len="med"/>
+                    </a:lnT>
+                    <a:lnB w="12700" cap="flat" cmpd="sng" algn="ctr">
+                      <a:solidFill>
+                        <a:schemeClr val="tx1"/>
+                      </a:solidFill>
+                      <a:prstDash val="solid"/>
+                      <a:round/>
+                      <a:headEnd type="none" w="med" len="med"/>
+                      <a:tailEnd type="none" w="med" len="med"/>
+                    </a:lnB>
+                    <a:solidFill>
+                      <a:srgbClr val="FFC000"/>
+                    </a:solidFill>
+                  </a:tcPr>
+                </a:tc>
+              </a:tr>
+            </a:tbl>
+          </a:graphicData>
+        </a:graphic>
+      </p:graphicFrame>
+    </p:spTree>
+    <p:extLst>
+      <p:ext uri="{BB962C8B-B14F-4D97-AF65-F5344CB8AC3E}">
+        <p14:creationId xmlns:p14="http://schemas.microsoft.com/office/powerpoint/2010/main" val="3864236231"/>
       </p:ext>
     </p:extLst>
   </p:cSld>
@@ -4955,15 +6766,7 @@
                   <a:srgbClr val="7030A0"/>
                 </a:solidFill>
               </a:rPr>
-              <a:t>Favorite </a:t>
-            </a:r>
-            <a:r>
-              <a:rPr lang="en-US" dirty="0" smtClean="0">
-                <a:solidFill>
-                  <a:srgbClr val="7030A0"/>
-                </a:solidFill>
-              </a:rPr>
-              <a:t>ice cream </a:t>
+              <a:t>Favorite ice cream </a:t>
             </a:r>
             <a:r>
               <a:rPr lang="en-US" smtClean="0">

</xml_diff>

<commit_message>
Final slides with .pdf version
</commit_message>
<xml_diff>
--- a/Introduction to 3D Printing.pptx
+++ b/Introduction to 3D Printing.pptx
@@ -5,36 +5,36 @@
     <p:sldMasterId id="2147483648" r:id="rId1"/>
   </p:sldMasterIdLst>
   <p:sldIdLst>
-    <p:sldId id="280" r:id="rId2"/>
-    <p:sldId id="256" r:id="rId3"/>
-    <p:sldId id="258" r:id="rId4"/>
-    <p:sldId id="275" r:id="rId5"/>
-    <p:sldId id="281" r:id="rId6"/>
-    <p:sldId id="282" r:id="rId7"/>
-    <p:sldId id="259" r:id="rId8"/>
-    <p:sldId id="269" r:id="rId9"/>
-    <p:sldId id="261" r:id="rId10"/>
-    <p:sldId id="262" r:id="rId11"/>
-    <p:sldId id="257" r:id="rId12"/>
-    <p:sldId id="263" r:id="rId13"/>
-    <p:sldId id="260" r:id="rId14"/>
-    <p:sldId id="264" r:id="rId15"/>
-    <p:sldId id="265" r:id="rId16"/>
-    <p:sldId id="266" r:id="rId17"/>
-    <p:sldId id="267" r:id="rId18"/>
-    <p:sldId id="268" r:id="rId19"/>
-    <p:sldId id="270" r:id="rId20"/>
-    <p:sldId id="271" r:id="rId21"/>
-    <p:sldId id="272" r:id="rId22"/>
-    <p:sldId id="273" r:id="rId23"/>
-    <p:sldId id="276" r:id="rId24"/>
-    <p:sldId id="274" r:id="rId25"/>
-    <p:sldId id="277" r:id="rId26"/>
-    <p:sldId id="278" r:id="rId27"/>
-    <p:sldId id="279" r:id="rId28"/>
-    <p:sldId id="283" r:id="rId29"/>
-    <p:sldId id="284" r:id="rId30"/>
-    <p:sldId id="285" r:id="rId31"/>
+    <p:sldId id="256" r:id="rId2"/>
+    <p:sldId id="258" r:id="rId3"/>
+    <p:sldId id="275" r:id="rId4"/>
+    <p:sldId id="281" r:id="rId5"/>
+    <p:sldId id="282" r:id="rId6"/>
+    <p:sldId id="259" r:id="rId7"/>
+    <p:sldId id="269" r:id="rId8"/>
+    <p:sldId id="261" r:id="rId9"/>
+    <p:sldId id="262" r:id="rId10"/>
+    <p:sldId id="257" r:id="rId11"/>
+    <p:sldId id="263" r:id="rId12"/>
+    <p:sldId id="260" r:id="rId13"/>
+    <p:sldId id="264" r:id="rId14"/>
+    <p:sldId id="265" r:id="rId15"/>
+    <p:sldId id="266" r:id="rId16"/>
+    <p:sldId id="267" r:id="rId17"/>
+    <p:sldId id="268" r:id="rId18"/>
+    <p:sldId id="270" r:id="rId19"/>
+    <p:sldId id="271" r:id="rId20"/>
+    <p:sldId id="272" r:id="rId21"/>
+    <p:sldId id="273" r:id="rId22"/>
+    <p:sldId id="276" r:id="rId23"/>
+    <p:sldId id="274" r:id="rId24"/>
+    <p:sldId id="277" r:id="rId25"/>
+    <p:sldId id="278" r:id="rId26"/>
+    <p:sldId id="279" r:id="rId27"/>
+    <p:sldId id="283" r:id="rId28"/>
+    <p:sldId id="284" r:id="rId29"/>
+    <p:sldId id="285" r:id="rId30"/>
+    <p:sldId id="286" r:id="rId31"/>
   </p:sldIdLst>
   <p:sldSz cx="9144000" cy="6858000" type="screen4x3"/>
   <p:notesSz cx="6858000" cy="9144000"/>
@@ -317,7 +317,7 @@
           <a:p>
             <a:fld id="{03F24ECC-79A4-43A1-8C02-28912ED20E3E}" type="datetimeFigureOut">
               <a:rPr lang="en-US" smtClean="0"/>
-              <a:t>6/24/2015</a:t>
+              <a:t>6/25/2015</a:t>
             </a:fld>
             <a:endParaRPr lang="en-US"/>
           </a:p>
@@ -487,7 +487,7 @@
           <a:p>
             <a:fld id="{03F24ECC-79A4-43A1-8C02-28912ED20E3E}" type="datetimeFigureOut">
               <a:rPr lang="en-US" smtClean="0"/>
-              <a:t>6/24/2015</a:t>
+              <a:t>6/25/2015</a:t>
             </a:fld>
             <a:endParaRPr lang="en-US"/>
           </a:p>
@@ -667,7 +667,7 @@
           <a:p>
             <a:fld id="{03F24ECC-79A4-43A1-8C02-28912ED20E3E}" type="datetimeFigureOut">
               <a:rPr lang="en-US" smtClean="0"/>
-              <a:t>6/24/2015</a:t>
+              <a:t>6/25/2015</a:t>
             </a:fld>
             <a:endParaRPr lang="en-US"/>
           </a:p>
@@ -837,7 +837,7 @@
           <a:p>
             <a:fld id="{03F24ECC-79A4-43A1-8C02-28912ED20E3E}" type="datetimeFigureOut">
               <a:rPr lang="en-US" smtClean="0"/>
-              <a:t>6/24/2015</a:t>
+              <a:t>6/25/2015</a:t>
             </a:fld>
             <a:endParaRPr lang="en-US"/>
           </a:p>
@@ -1083,7 +1083,7 @@
           <a:p>
             <a:fld id="{03F24ECC-79A4-43A1-8C02-28912ED20E3E}" type="datetimeFigureOut">
               <a:rPr lang="en-US" smtClean="0"/>
-              <a:t>6/24/2015</a:t>
+              <a:t>6/25/2015</a:t>
             </a:fld>
             <a:endParaRPr lang="en-US"/>
           </a:p>
@@ -1371,7 +1371,7 @@
           <a:p>
             <a:fld id="{03F24ECC-79A4-43A1-8C02-28912ED20E3E}" type="datetimeFigureOut">
               <a:rPr lang="en-US" smtClean="0"/>
-              <a:t>6/24/2015</a:t>
+              <a:t>6/25/2015</a:t>
             </a:fld>
             <a:endParaRPr lang="en-US"/>
           </a:p>
@@ -1793,7 +1793,7 @@
           <a:p>
             <a:fld id="{03F24ECC-79A4-43A1-8C02-28912ED20E3E}" type="datetimeFigureOut">
               <a:rPr lang="en-US" smtClean="0"/>
-              <a:t>6/24/2015</a:t>
+              <a:t>6/25/2015</a:t>
             </a:fld>
             <a:endParaRPr lang="en-US"/>
           </a:p>
@@ -1911,7 +1911,7 @@
           <a:p>
             <a:fld id="{03F24ECC-79A4-43A1-8C02-28912ED20E3E}" type="datetimeFigureOut">
               <a:rPr lang="en-US" smtClean="0"/>
-              <a:t>6/24/2015</a:t>
+              <a:t>6/25/2015</a:t>
             </a:fld>
             <a:endParaRPr lang="en-US"/>
           </a:p>
@@ -2006,7 +2006,7 @@
           <a:p>
             <a:fld id="{03F24ECC-79A4-43A1-8C02-28912ED20E3E}" type="datetimeFigureOut">
               <a:rPr lang="en-US" smtClean="0"/>
-              <a:t>6/24/2015</a:t>
+              <a:t>6/25/2015</a:t>
             </a:fld>
             <a:endParaRPr lang="en-US"/>
           </a:p>
@@ -2283,7 +2283,7 @@
           <a:p>
             <a:fld id="{03F24ECC-79A4-43A1-8C02-28912ED20E3E}" type="datetimeFigureOut">
               <a:rPr lang="en-US" smtClean="0"/>
-              <a:t>6/24/2015</a:t>
+              <a:t>6/25/2015</a:t>
             </a:fld>
             <a:endParaRPr lang="en-US"/>
           </a:p>
@@ -2536,7 +2536,7 @@
           <a:p>
             <a:fld id="{03F24ECC-79A4-43A1-8C02-28912ED20E3E}" type="datetimeFigureOut">
               <a:rPr lang="en-US" smtClean="0"/>
-              <a:t>6/24/2015</a:t>
+              <a:t>6/25/2015</a:t>
             </a:fld>
             <a:endParaRPr lang="en-US"/>
           </a:p>
@@ -2749,7 +2749,7 @@
           <a:p>
             <a:fld id="{03F24ECC-79A4-43A1-8C02-28912ED20E3E}" type="datetimeFigureOut">
               <a:rPr lang="en-US" smtClean="0"/>
-              <a:t>6/24/2015</a:t>
+              <a:t>6/25/2015</a:t>
             </a:fld>
             <a:endParaRPr lang="en-US"/>
           </a:p>
@@ -3131,17 +3131,22 @@
             <a:spLocks noGrp="1"/>
           </p:cNvSpPr>
           <p:nvPr>
-            <p:ph type="title"/>
-          </p:nvPr>
-        </p:nvSpPr>
-        <p:spPr/>
+            <p:ph type="ctrTitle"/>
+          </p:nvPr>
+        </p:nvSpPr>
+        <p:spPr>
+          <a:xfrm>
+            <a:off x="533400" y="457200"/>
+            <a:ext cx="7772400" cy="1470025"/>
+          </a:xfrm>
+        </p:spPr>
         <p:txBody>
           <a:bodyPr/>
           <a:lstStyle/>
           <a:p>
             <a:r>
               <a:rPr lang="en-US" dirty="0" smtClean="0"/>
-              <a:t>Upcoming GDI Events at Trailhead</a:t>
+              <a:t>Introduction to 3D Printing</a:t>
             </a:r>
             <a:endParaRPr lang="en-US" dirty="0"/>
           </a:p>
@@ -3149,18 +3154,18 @@
       </p:sp>
       <p:sp>
         <p:nvSpPr>
-          <p:cNvPr id="3" name="Content Placeholder 2"/>
-          <p:cNvSpPr>
-            <a:spLocks noGrp="1"/>
-          </p:cNvSpPr>
-          <p:nvPr>
-            <p:ph idx="1"/>
-          </p:nvPr>
-        </p:nvSpPr>
-        <p:spPr>
-          <a:xfrm>
-            <a:off x="228600" y="1600200"/>
-            <a:ext cx="8763000" cy="4525963"/>
+          <p:cNvPr id="3" name="Subtitle 2"/>
+          <p:cNvSpPr>
+            <a:spLocks noGrp="1"/>
+          </p:cNvSpPr>
+          <p:nvPr>
+            <p:ph type="subTitle" idx="1"/>
+          </p:nvPr>
+        </p:nvSpPr>
+        <p:spPr>
+          <a:xfrm>
+            <a:off x="228600" y="2212975"/>
+            <a:ext cx="8458200" cy="1752600"/>
           </a:xfrm>
         </p:spPr>
         <p:txBody>
@@ -3169,26 +3174,36 @@
           <a:p>
             <a:r>
               <a:rPr lang="en-US" dirty="0" smtClean="0"/>
-              <a:t>July 12, 1:00 – 3:00 pm Code &amp; Coffee</a:t>
-            </a:r>
-          </a:p>
-          <a:p>
-            <a:r>
-              <a:rPr lang="en-US" dirty="0" smtClean="0"/>
-              <a:t>July 15, 5:30 – 7:30 pm Intro to Databases &amp; </a:t>
-            </a:r>
-            <a:r>
-              <a:rPr lang="en-US" dirty="0" smtClean="0"/>
-              <a:t>SQL</a:t>
-            </a:r>
-            <a:endParaRPr lang="en-US" dirty="0" smtClean="0"/>
+              <a:t>“</a:t>
+            </a:r>
+            <a:r>
+              <a:rPr lang="en-US" dirty="0"/>
+              <a:t> I want to say one word to you. Just one word</a:t>
+            </a:r>
+            <a:r>
+              <a:rPr lang="en-US" dirty="0" smtClean="0"/>
+              <a:t>.…</a:t>
+            </a:r>
+          </a:p>
+          <a:p>
+            <a:r>
+              <a:rPr lang="en-US" dirty="0" smtClean="0"/>
+              <a:t>Plastics”</a:t>
+            </a:r>
+          </a:p>
+          <a:p>
+            <a:r>
+              <a:rPr lang="en-US" dirty="0" smtClean="0"/>
+              <a:t>The Graduate - 1967</a:t>
+            </a:r>
+            <a:endParaRPr lang="en-US" dirty="0"/>
           </a:p>
         </p:txBody>
       </p:sp>
     </p:spTree>
     <p:extLst>
       <p:ext uri="{BB962C8B-B14F-4D97-AF65-F5344CB8AC3E}">
-        <p14:creationId xmlns:p14="http://schemas.microsoft.com/office/powerpoint/2010/main" val="2209440606"/>
+        <p14:creationId xmlns:p14="http://schemas.microsoft.com/office/powerpoint/2010/main" val="2666580265"/>
       </p:ext>
     </p:extLst>
   </p:cSld>
@@ -3234,7 +3249,7 @@
         </p:nvSpPr>
         <p:spPr>
           <a:xfrm>
-            <a:off x="457200" y="0"/>
+            <a:off x="419100" y="0"/>
             <a:ext cx="8229600" cy="1143000"/>
           </a:xfrm>
         </p:spPr>
@@ -3244,7 +3259,7 @@
           <a:p>
             <a:r>
               <a:rPr lang="en-US" dirty="0" smtClean="0"/>
-              <a:t>Delta</a:t>
+              <a:t>Delta Style Printer (video)</a:t>
             </a:r>
             <a:endParaRPr lang="en-US" dirty="0"/>
           </a:p>
@@ -3252,38 +3267,86 @@
       </p:sp>
       <p:pic>
         <p:nvPicPr>
-          <p:cNvPr id="7" name="Picture 6"/>
+          <p:cNvPr id="4" name="zQxa920YGaU"/>
           <p:cNvPicPr>
-            <a:picLocks noChangeAspect="1"/>
+            <a:picLocks noRot="1" noChangeAspect="1"/>
           </p:cNvPicPr>
-          <p:nvPr/>
+          <p:nvPr>
+            <a:videoFile r:link="rId1"/>
+          </p:nvPr>
         </p:nvPicPr>
         <p:blipFill>
-          <a:blip r:embed="rId2">
-            <a:extLst>
-              <a:ext uri="{28A0092B-C50C-407E-A947-70E740481C1C}">
-                <a14:useLocalDpi xmlns:a14="http://schemas.microsoft.com/office/drawing/2010/main" val="0"/>
-              </a:ext>
-            </a:extLst>
-          </a:blip>
+          <a:blip r:embed="rId3"/>
           <a:stretch>
             <a:fillRect/>
           </a:stretch>
         </p:blipFill>
         <p:spPr>
           <a:xfrm>
-            <a:off x="2057400" y="1047108"/>
-            <a:ext cx="4710731" cy="4648200"/>
+            <a:off x="1524000" y="1219200"/>
+            <a:ext cx="6019800" cy="3386138"/>
           </a:xfrm>
           <a:prstGeom prst="rect">
             <a:avLst/>
           </a:prstGeom>
         </p:spPr>
       </p:pic>
+      <p:sp>
+        <p:nvSpPr>
+          <p:cNvPr id="3" name="TextBox 2"/>
+          <p:cNvSpPr txBox="1"/>
+          <p:nvPr/>
+        </p:nvSpPr>
+        <p:spPr>
+          <a:xfrm>
+            <a:off x="762000" y="4953000"/>
+            <a:ext cx="7848600" cy="369332"/>
+          </a:xfrm>
+          <a:prstGeom prst="rect">
+            <a:avLst/>
+          </a:prstGeom>
+          <a:noFill/>
+        </p:spPr>
+        <p:txBody>
+          <a:bodyPr wrap="square" rtlCol="0">
+            <a:spAutoFit/>
+          </a:bodyPr>
+          <a:lstStyle/>
+          <a:p>
+            <a:r>
+              <a:rPr lang="en-US" dirty="0" smtClean="0"/>
+              <a:t>(</a:t>
+            </a:r>
+            <a:r>
+              <a:rPr lang="en-US" dirty="0" smtClean="0">
+                <a:hlinkClick r:id="rId4"/>
+              </a:rPr>
+              <a:t>https</a:t>
+            </a:r>
+            <a:r>
+              <a:rPr lang="en-US" dirty="0">
+                <a:hlinkClick r:id="rId4"/>
+              </a:rPr>
+              <a:t>://</a:t>
+            </a:r>
+            <a:r>
+              <a:rPr lang="en-US" dirty="0" smtClean="0">
+                <a:hlinkClick r:id="rId4"/>
+              </a:rPr>
+              <a:t>www.youtube.com/watch?feature=player_embedded&amp;v=zQxa920YGaU</a:t>
+            </a:r>
+            <a:r>
+              <a:rPr lang="en-US" dirty="0" smtClean="0"/>
+              <a:t> )</a:t>
+            </a:r>
+            <a:endParaRPr lang="en-US" dirty="0"/>
+          </a:p>
+        </p:txBody>
+      </p:sp>
     </p:spTree>
     <p:extLst>
       <p:ext uri="{BB962C8B-B14F-4D97-AF65-F5344CB8AC3E}">
-        <p14:creationId xmlns:p14="http://schemas.microsoft.com/office/powerpoint/2010/main" val="838563812"/>
+        <p14:creationId xmlns:p14="http://schemas.microsoft.com/office/powerpoint/2010/main" val="1380890633"/>
       </p:ext>
     </p:extLst>
   </p:cSld>
@@ -3329,7 +3392,7 @@
         </p:nvSpPr>
         <p:spPr>
           <a:xfrm>
-            <a:off x="419100" y="0"/>
+            <a:off x="457200" y="0"/>
             <a:ext cx="8229600" cy="1143000"/>
           </a:xfrm>
         </p:spPr>
@@ -3339,7 +3402,7 @@
           <a:p>
             <a:r>
               <a:rPr lang="en-US" dirty="0" smtClean="0"/>
-              <a:t>Delta Style Printer (video)</a:t>
+              <a:t>DLP</a:t>
             </a:r>
             <a:endParaRPr lang="en-US" dirty="0"/>
           </a:p>
@@ -3347,24 +3410,28 @@
       </p:sp>
       <p:pic>
         <p:nvPicPr>
-          <p:cNvPr id="4" name="zQxa920YGaU"/>
+          <p:cNvPr id="8" name="Picture 7"/>
           <p:cNvPicPr>
-            <a:picLocks noRot="1" noChangeAspect="1"/>
+            <a:picLocks noChangeAspect="1"/>
           </p:cNvPicPr>
-          <p:nvPr>
-            <a:videoFile r:link="rId1"/>
-          </p:nvPr>
+          <p:nvPr/>
         </p:nvPicPr>
         <p:blipFill>
-          <a:blip r:embed="rId3"/>
+          <a:blip r:embed="rId2">
+            <a:extLst>
+              <a:ext uri="{28A0092B-C50C-407E-A947-70E740481C1C}">
+                <a14:useLocalDpi xmlns:a14="http://schemas.microsoft.com/office/drawing/2010/main" val="0"/>
+              </a:ext>
+            </a:extLst>
+          </a:blip>
           <a:stretch>
             <a:fillRect/>
           </a:stretch>
         </p:blipFill>
         <p:spPr>
           <a:xfrm>
-            <a:off x="1524000" y="1219200"/>
-            <a:ext cx="6019800" cy="3386138"/>
+            <a:off x="1524000" y="990600"/>
+            <a:ext cx="6248400" cy="3749040"/>
           </a:xfrm>
           <a:prstGeom prst="rect">
             <a:avLst/>
@@ -3374,7 +3441,7 @@
     </p:spTree>
     <p:extLst>
       <p:ext uri="{BB962C8B-B14F-4D97-AF65-F5344CB8AC3E}">
-        <p14:creationId xmlns:p14="http://schemas.microsoft.com/office/powerpoint/2010/main" val="1380890633"/>
+        <p14:creationId xmlns:p14="http://schemas.microsoft.com/office/powerpoint/2010/main" val="3843722854"/>
       </p:ext>
     </p:extLst>
   </p:cSld>
@@ -3430,7 +3497,7 @@
           <a:p>
             <a:r>
               <a:rPr lang="en-US" dirty="0" smtClean="0"/>
-              <a:t>DLP</a:t>
+              <a:t>DLP Style Printer</a:t>
             </a:r>
             <a:endParaRPr lang="en-US" dirty="0"/>
           </a:p>
@@ -3438,38 +3505,81 @@
       </p:sp>
       <p:pic>
         <p:nvPicPr>
-          <p:cNvPr id="8" name="Picture 7"/>
+          <p:cNvPr id="4" name="nxhUjPmxrP0"/>
           <p:cNvPicPr>
-            <a:picLocks noChangeAspect="1"/>
+            <a:picLocks noGrp="1" noRot="1" noChangeAspect="1"/>
           </p:cNvPicPr>
-          <p:nvPr/>
+          <p:nvPr>
+            <p:ph idx="1"/>
+            <a:videoFile r:link="rId1"/>
+          </p:nvPr>
         </p:nvPicPr>
         <p:blipFill>
-          <a:blip r:embed="rId2">
-            <a:extLst>
-              <a:ext uri="{28A0092B-C50C-407E-A947-70E740481C1C}">
-                <a14:useLocalDpi xmlns:a14="http://schemas.microsoft.com/office/drawing/2010/main" val="0"/>
-              </a:ext>
-            </a:extLst>
-          </a:blip>
+          <a:blip r:embed="rId3"/>
           <a:stretch>
             <a:fillRect/>
           </a:stretch>
         </p:blipFill>
         <p:spPr>
           <a:xfrm>
-            <a:off x="1524000" y="990600"/>
-            <a:ext cx="6248400" cy="3749040"/>
+            <a:off x="1447800" y="1143000"/>
+            <a:ext cx="6477000" cy="3643313"/>
           </a:xfrm>
           <a:prstGeom prst="rect">
             <a:avLst/>
           </a:prstGeom>
         </p:spPr>
       </p:pic>
+      <p:sp>
+        <p:nvSpPr>
+          <p:cNvPr id="3" name="TextBox 2"/>
+          <p:cNvSpPr txBox="1"/>
+          <p:nvPr/>
+        </p:nvSpPr>
+        <p:spPr>
+          <a:xfrm>
+            <a:off x="566057" y="5149334"/>
+            <a:ext cx="7848600" cy="369332"/>
+          </a:xfrm>
+          <a:prstGeom prst="rect">
+            <a:avLst/>
+          </a:prstGeom>
+          <a:noFill/>
+        </p:spPr>
+        <p:txBody>
+          <a:bodyPr wrap="square" rtlCol="0">
+            <a:spAutoFit/>
+          </a:bodyPr>
+          <a:lstStyle/>
+          <a:p>
+            <a:r>
+              <a:rPr lang="en-US" dirty="0"/>
+              <a:t>(</a:t>
+            </a:r>
+            <a:r>
+              <a:rPr lang="en-US" dirty="0">
+                <a:hlinkClick r:id="rId4"/>
+              </a:rPr>
+              <a:t>https://</a:t>
+            </a:r>
+            <a:r>
+              <a:rPr lang="en-US" dirty="0" smtClean="0">
+                <a:hlinkClick r:id="rId4"/>
+              </a:rPr>
+              <a:t>www.youtube.com/watch?feature=player_embedded&amp;v=nxhUjPmxrP0</a:t>
+            </a:r>
+            <a:r>
+              <a:rPr lang="en-US" dirty="0" smtClean="0"/>
+              <a:t> )</a:t>
+            </a:r>
+            <a:endParaRPr lang="en-US" dirty="0"/>
+          </a:p>
+        </p:txBody>
+      </p:sp>
     </p:spTree>
     <p:extLst>
       <p:ext uri="{BB962C8B-B14F-4D97-AF65-F5344CB8AC3E}">
-        <p14:creationId xmlns:p14="http://schemas.microsoft.com/office/powerpoint/2010/main" val="3843722854"/>
+        <p14:creationId xmlns:p14="http://schemas.microsoft.com/office/powerpoint/2010/main" val="3948974908"/>
       </p:ext>
     </p:extLst>
   </p:cSld>
@@ -3525,43 +3635,56 @@
           <a:p>
             <a:r>
               <a:rPr lang="en-US" dirty="0" smtClean="0"/>
-              <a:t>DLP Style Printer</a:t>
+              <a:t>Money, Money, Money</a:t>
             </a:r>
             <a:endParaRPr lang="en-US" dirty="0"/>
           </a:p>
         </p:txBody>
       </p:sp>
-      <p:pic>
-        <p:nvPicPr>
-          <p:cNvPr id="4" name="nxhUjPmxrP0"/>
-          <p:cNvPicPr>
-            <a:picLocks noGrp="1" noRot="1" noChangeAspect="1"/>
-          </p:cNvPicPr>
+      <p:sp>
+        <p:nvSpPr>
+          <p:cNvPr id="3" name="Content Placeholder 2"/>
+          <p:cNvSpPr>
+            <a:spLocks noGrp="1"/>
+          </p:cNvSpPr>
           <p:nvPr>
             <p:ph idx="1"/>
-            <a:videoFile r:link="rId1"/>
-          </p:nvPr>
-        </p:nvPicPr>
-        <p:blipFill>
-          <a:blip r:embed="rId3"/>
-          <a:stretch>
-            <a:fillRect/>
-          </a:stretch>
-        </p:blipFill>
-        <p:spPr>
-          <a:xfrm>
-            <a:off x="1447800" y="1143000"/>
-            <a:ext cx="6477000" cy="3643313"/>
-          </a:xfrm>
-          <a:prstGeom prst="rect">
-            <a:avLst/>
-          </a:prstGeom>
-        </p:spPr>
-      </p:pic>
+          </p:nvPr>
+        </p:nvSpPr>
+        <p:spPr>
+          <a:xfrm>
+            <a:off x="457200" y="1219200"/>
+            <a:ext cx="8229600" cy="4525963"/>
+          </a:xfrm>
+        </p:spPr>
+        <p:txBody>
+          <a:bodyPr/>
+          <a:lstStyle/>
+          <a:p>
+            <a:r>
+              <a:rPr lang="en-US" dirty="0" smtClean="0"/>
+              <a:t>Overall price range $500 - $2500+</a:t>
+            </a:r>
+          </a:p>
+          <a:p>
+            <a:r>
+              <a:rPr lang="en-US" dirty="0" smtClean="0"/>
+              <a:t>Why the difference?</a:t>
+            </a:r>
+          </a:p>
+          <a:p>
+            <a:r>
+              <a:rPr lang="en-US" dirty="0" smtClean="0"/>
+              <a:t>Technology (type) and build volume.</a:t>
+            </a:r>
+            <a:endParaRPr lang="en-US" dirty="0"/>
+          </a:p>
+        </p:txBody>
+      </p:sp>
     </p:spTree>
     <p:extLst>
       <p:ext uri="{BB962C8B-B14F-4D97-AF65-F5344CB8AC3E}">
-        <p14:creationId xmlns:p14="http://schemas.microsoft.com/office/powerpoint/2010/main" val="3948974908"/>
+        <p14:creationId xmlns:p14="http://schemas.microsoft.com/office/powerpoint/2010/main" val="2106186704"/>
       </p:ext>
     </p:extLst>
   </p:cSld>
@@ -3617,7 +3740,7 @@
           <a:p>
             <a:r>
               <a:rPr lang="en-US" dirty="0" smtClean="0"/>
-              <a:t>Money, Money, Money</a:t>
+              <a:t>Differences</a:t>
             </a:r>
             <a:endParaRPr lang="en-US" dirty="0"/>
           </a:p>
@@ -3640,33 +3763,64 @@
           </a:xfrm>
         </p:spPr>
         <p:txBody>
-          <a:bodyPr/>
-          <a:lstStyle/>
-          <a:p>
-            <a:r>
-              <a:rPr lang="en-US" dirty="0" smtClean="0"/>
-              <a:t>Overall price range $500 - $2500+</a:t>
-            </a:r>
-          </a:p>
-          <a:p>
-            <a:r>
-              <a:rPr lang="en-US" dirty="0" smtClean="0"/>
-              <a:t>Why the difference?</a:t>
-            </a:r>
-          </a:p>
-          <a:p>
-            <a:r>
-              <a:rPr lang="en-US" dirty="0" smtClean="0"/>
-              <a:t>Technology (type) and build volume.</a:t>
-            </a:r>
-            <a:endParaRPr lang="en-US" dirty="0"/>
+          <a:bodyPr>
+            <a:normAutofit/>
+          </a:bodyPr>
+          <a:lstStyle/>
+          <a:p>
+            <a:r>
+              <a:rPr lang="en-US" dirty="0" smtClean="0"/>
+              <a:t>Technology (material)</a:t>
+            </a:r>
+          </a:p>
+          <a:p>
+            <a:pPr lvl="1"/>
+            <a:r>
+              <a:rPr lang="en-US" dirty="0" smtClean="0"/>
+              <a:t>Filament</a:t>
+            </a:r>
+          </a:p>
+          <a:p>
+            <a:pPr lvl="2"/>
+            <a:r>
+              <a:rPr lang="en-US" dirty="0" smtClean="0"/>
+              <a:t>PLA ($500 kit)</a:t>
+            </a:r>
+          </a:p>
+          <a:p>
+            <a:pPr lvl="2"/>
+            <a:r>
+              <a:rPr lang="en-US" dirty="0" smtClean="0"/>
+              <a:t>ABS (heated bed) (+$100)</a:t>
+            </a:r>
+          </a:p>
+          <a:p>
+            <a:pPr lvl="2"/>
+            <a:r>
+              <a:rPr lang="en-US" dirty="0" smtClean="0"/>
+              <a:t>Assembled (+$150)</a:t>
+            </a:r>
+          </a:p>
+          <a:p>
+            <a:pPr lvl="2"/>
+            <a:r>
+              <a:rPr lang="en-US" dirty="0" smtClean="0"/>
+              <a:t>Dual Head (+$200)</a:t>
+            </a:r>
+          </a:p>
+          <a:p>
+            <a:pPr lvl="1"/>
+            <a:r>
+              <a:rPr lang="en-US" dirty="0" smtClean="0"/>
+              <a:t>Resin (DLP)</a:t>
+            </a:r>
           </a:p>
         </p:txBody>
       </p:sp>
     </p:spTree>
     <p:extLst>
       <p:ext uri="{BB962C8B-B14F-4D97-AF65-F5344CB8AC3E}">
-        <p14:creationId xmlns:p14="http://schemas.microsoft.com/office/powerpoint/2010/main" val="2106186704"/>
+        <p14:creationId xmlns:p14="http://schemas.microsoft.com/office/powerpoint/2010/main" val="3867764672"/>
       </p:ext>
     </p:extLst>
   </p:cSld>
@@ -3752,57 +3906,37 @@
           <a:p>
             <a:r>
               <a:rPr lang="en-US" dirty="0" smtClean="0"/>
-              <a:t>Technology (material)</a:t>
+              <a:t>Build Volume</a:t>
             </a:r>
           </a:p>
           <a:p>
             <a:pPr lvl="1"/>
             <a:r>
               <a:rPr lang="en-US" dirty="0" smtClean="0"/>
-              <a:t>Filament</a:t>
-            </a:r>
-          </a:p>
-          <a:p>
-            <a:pPr lvl="2"/>
-            <a:r>
-              <a:rPr lang="en-US" dirty="0" smtClean="0"/>
-              <a:t>PLA ($500 kit)</a:t>
-            </a:r>
-          </a:p>
-          <a:p>
-            <a:pPr lvl="2"/>
-            <a:r>
-              <a:rPr lang="en-US" dirty="0" smtClean="0"/>
-              <a:t>ABS (heated bed) (+$100)</a:t>
-            </a:r>
-          </a:p>
-          <a:p>
-            <a:pPr lvl="2"/>
-            <a:r>
-              <a:rPr lang="en-US" dirty="0" smtClean="0"/>
-              <a:t>Assembled (+$150)</a:t>
-            </a:r>
-          </a:p>
-          <a:p>
-            <a:pPr lvl="2"/>
-            <a:r>
-              <a:rPr lang="en-US" dirty="0" smtClean="0"/>
-              <a:t>Dual Head (+$200)</a:t>
+              <a:t>4” x 4” x 4” ($400)</a:t>
             </a:r>
           </a:p>
           <a:p>
             <a:pPr lvl="1"/>
             <a:r>
               <a:rPr lang="en-US" dirty="0" smtClean="0"/>
-              <a:t>Resin (DLP)</a:t>
-            </a:r>
+              <a:t>10” x 10” x 10” ($1000+)</a:t>
+            </a:r>
+          </a:p>
+          <a:p>
+            <a:pPr lvl="1"/>
+            <a:r>
+              <a:rPr lang="en-US" dirty="0" smtClean="0"/>
+              <a:t>7” x 15” x 7” DLP ($2500+)</a:t>
+            </a:r>
+            <a:endParaRPr lang="en-US" dirty="0"/>
           </a:p>
         </p:txBody>
       </p:sp>
     </p:spTree>
     <p:extLst>
       <p:ext uri="{BB962C8B-B14F-4D97-AF65-F5344CB8AC3E}">
-        <p14:creationId xmlns:p14="http://schemas.microsoft.com/office/powerpoint/2010/main" val="3867764672"/>
+        <p14:creationId xmlns:p14="http://schemas.microsoft.com/office/powerpoint/2010/main" val="1343839109"/>
       </p:ext>
     </p:extLst>
   </p:cSld>
@@ -3858,7 +3992,7 @@
           <a:p>
             <a:r>
               <a:rPr lang="en-US" dirty="0" smtClean="0"/>
-              <a:t>Differences</a:t>
+              <a:t>Filament</a:t>
             </a:r>
             <a:endParaRPr lang="en-US" dirty="0"/>
           </a:p>
@@ -3888,28 +4022,34 @@
           <a:p>
             <a:r>
               <a:rPr lang="en-US" dirty="0" smtClean="0"/>
-              <a:t>Build Volume</a:t>
+              <a:t>Size 1.75mm (standard) &amp; 3.00mm (old)</a:t>
+            </a:r>
+          </a:p>
+          <a:p>
+            <a:r>
+              <a:rPr lang="en-US" dirty="0" smtClean="0"/>
+              <a:t>Material</a:t>
             </a:r>
           </a:p>
           <a:p>
             <a:pPr lvl="1"/>
             <a:r>
               <a:rPr lang="en-US" dirty="0" smtClean="0"/>
-              <a:t>4” x 4” x 4” ($400)</a:t>
+              <a:t>PLA (Strong, stiff, fast print)</a:t>
             </a:r>
           </a:p>
           <a:p>
             <a:pPr lvl="1"/>
             <a:r>
               <a:rPr lang="en-US" dirty="0" smtClean="0"/>
-              <a:t>10” x 10” x 10” ($1000+)</a:t>
+              <a:t>ABS (Heated bed, higher temp, slight flex)</a:t>
             </a:r>
           </a:p>
           <a:p>
             <a:pPr lvl="1"/>
             <a:r>
               <a:rPr lang="en-US" dirty="0" smtClean="0"/>
-              <a:t>7” x 15” x 7” DLP ($2500+)</a:t>
+              <a:t>Flex (rubber like)</a:t>
             </a:r>
             <a:endParaRPr lang="en-US" dirty="0"/>
           </a:p>
@@ -3918,7 +4058,7 @@
     </p:spTree>
     <p:extLst>
       <p:ext uri="{BB962C8B-B14F-4D97-AF65-F5344CB8AC3E}">
-        <p14:creationId xmlns:p14="http://schemas.microsoft.com/office/powerpoint/2010/main" val="1343839109"/>
+        <p14:creationId xmlns:p14="http://schemas.microsoft.com/office/powerpoint/2010/main" val="3026335734"/>
       </p:ext>
     </p:extLst>
   </p:cSld>
@@ -3974,7 +4114,7 @@
           <a:p>
             <a:r>
               <a:rPr lang="en-US" dirty="0" smtClean="0"/>
-              <a:t>Filament</a:t>
+              <a:t>Filament Exotics</a:t>
             </a:r>
             <a:endParaRPr lang="en-US" dirty="0"/>
           </a:p>
@@ -4004,12 +4144,6 @@
           <a:p>
             <a:r>
               <a:rPr lang="en-US" dirty="0" smtClean="0"/>
-              <a:t>Size 1.75mm (standard) &amp; 3.00mm (old)</a:t>
-            </a:r>
-          </a:p>
-          <a:p>
-            <a:r>
-              <a:rPr lang="en-US" dirty="0" smtClean="0"/>
               <a:t>Material</a:t>
             </a:r>
           </a:p>
@@ -4017,21 +4151,47 @@
             <a:pPr lvl="1"/>
             <a:r>
               <a:rPr lang="en-US" dirty="0" smtClean="0"/>
-              <a:t>PLA (Strong, stiff, fast print)</a:t>
+              <a:t>Nylon (Very Strong, very high print temp)</a:t>
             </a:r>
           </a:p>
           <a:p>
             <a:pPr lvl="1"/>
             <a:r>
               <a:rPr lang="en-US" dirty="0" smtClean="0"/>
-              <a:t>ABS (Heated bed, higher temp, slight flex)</a:t>
+              <a:t>Wood</a:t>
             </a:r>
           </a:p>
           <a:p>
             <a:pPr lvl="1"/>
             <a:r>
               <a:rPr lang="en-US" dirty="0" smtClean="0"/>
-              <a:t>Flex (rubber like)</a:t>
+              <a:t>Conductive</a:t>
+            </a:r>
+          </a:p>
+          <a:p>
+            <a:pPr lvl="1"/>
+            <a:r>
+              <a:rPr lang="en-US" dirty="0" err="1" smtClean="0"/>
+              <a:t>Metalic</a:t>
+            </a:r>
+            <a:r>
+              <a:rPr lang="en-US" dirty="0" smtClean="0"/>
+              <a:t> (bronze, iron, </a:t>
+            </a:r>
+            <a:r>
+              <a:rPr lang="en-US" dirty="0" err="1" smtClean="0"/>
+              <a:t>etc</a:t>
+            </a:r>
+            <a:r>
+              <a:rPr lang="en-US" dirty="0" smtClean="0"/>
+              <a:t>)</a:t>
+            </a:r>
+          </a:p>
+          <a:p>
+            <a:pPr lvl="1"/>
+            <a:r>
+              <a:rPr lang="en-US" dirty="0" smtClean="0"/>
+              <a:t>Ceramic</a:t>
             </a:r>
             <a:endParaRPr lang="en-US" dirty="0"/>
           </a:p>
@@ -4040,7 +4200,7 @@
     </p:spTree>
     <p:extLst>
       <p:ext uri="{BB962C8B-B14F-4D97-AF65-F5344CB8AC3E}">
-        <p14:creationId xmlns:p14="http://schemas.microsoft.com/office/powerpoint/2010/main" val="3026335734"/>
+        <p14:creationId xmlns:p14="http://schemas.microsoft.com/office/powerpoint/2010/main" val="3618842773"/>
       </p:ext>
     </p:extLst>
   </p:cSld>
@@ -4096,7 +4256,7 @@
           <a:p>
             <a:r>
               <a:rPr lang="en-US" dirty="0" smtClean="0"/>
-              <a:t>Filament Exotics</a:t>
+              <a:t>What to Print?</a:t>
             </a:r>
             <a:endParaRPr lang="en-US" dirty="0"/>
           </a:p>
@@ -4126,63 +4286,94 @@
           <a:p>
             <a:r>
               <a:rPr lang="en-US" dirty="0" smtClean="0"/>
-              <a:t>Material</a:t>
+              <a:t>You need a 3D model (.</a:t>
+            </a:r>
+            <a:r>
+              <a:rPr lang="en-US" dirty="0" err="1" smtClean="0"/>
+              <a:t>stl</a:t>
+            </a:r>
+            <a:r>
+              <a:rPr lang="en-US" dirty="0" smtClean="0"/>
+              <a:t> file)</a:t>
             </a:r>
           </a:p>
           <a:p>
             <a:pPr lvl="1"/>
             <a:r>
               <a:rPr lang="en-US" dirty="0" smtClean="0"/>
-              <a:t>Nylon (Very Strong, very high print temp)</a:t>
-            </a:r>
+              <a:t>Use an existing model </a:t>
+            </a:r>
+          </a:p>
+          <a:p>
+            <a:pPr lvl="2"/>
+            <a:r>
+              <a:rPr lang="en-US" dirty="0" smtClean="0">
+                <a:hlinkClick r:id="rId2"/>
+              </a:rPr>
+              <a:t>www.thingiverse.com</a:t>
+            </a:r>
+            <a:endParaRPr lang="en-US" dirty="0" smtClean="0"/>
           </a:p>
           <a:p>
             <a:pPr lvl="1"/>
             <a:r>
               <a:rPr lang="en-US" dirty="0" smtClean="0"/>
-              <a:t>Wood</a:t>
-            </a:r>
-          </a:p>
-          <a:p>
-            <a:pPr lvl="1"/>
-            <a:r>
-              <a:rPr lang="en-US" dirty="0" smtClean="0"/>
-              <a:t>Conductive</a:t>
-            </a:r>
-          </a:p>
-          <a:p>
-            <a:pPr lvl="1"/>
+              <a:t>Make your own model</a:t>
+            </a:r>
+          </a:p>
+          <a:p>
+            <a:pPr lvl="2"/>
             <a:r>
               <a:rPr lang="en-US" dirty="0" err="1" smtClean="0"/>
-              <a:t>Metalic</a:t>
-            </a:r>
-            <a:r>
-              <a:rPr lang="en-US" dirty="0" smtClean="0"/>
-              <a:t> (bronze, iron, </a:t>
-            </a:r>
+              <a:t>Tinkercad</a:t>
+            </a:r>
+            <a:r>
+              <a:rPr lang="en-US" dirty="0" smtClean="0"/>
+              <a:t> (web based </a:t>
+            </a:r>
+            <a:r>
+              <a:rPr lang="en-US" dirty="0" smtClean="0">
+                <a:hlinkClick r:id="rId3"/>
+              </a:rPr>
+              <a:t>www.tinkercad.com</a:t>
+            </a:r>
+            <a:r>
+              <a:rPr lang="en-US" dirty="0" smtClean="0"/>
+              <a:t> )</a:t>
+            </a:r>
+          </a:p>
+          <a:p>
+            <a:pPr lvl="2"/>
             <a:r>
               <a:rPr lang="en-US" dirty="0" err="1" smtClean="0"/>
-              <a:t>etc</a:t>
-            </a:r>
-            <a:r>
-              <a:rPr lang="en-US" dirty="0" smtClean="0"/>
-              <a:t>)</a:t>
-            </a:r>
-          </a:p>
-          <a:p>
-            <a:pPr lvl="1"/>
-            <a:r>
-              <a:rPr lang="en-US" dirty="0" smtClean="0"/>
-              <a:t>Ceramic</a:t>
-            </a:r>
-            <a:endParaRPr lang="en-US" dirty="0"/>
+              <a:t>Meshmixer</a:t>
+            </a:r>
+            <a:endParaRPr lang="en-US" dirty="0" smtClean="0"/>
+          </a:p>
+          <a:p>
+            <a:pPr lvl="2"/>
+            <a:r>
+              <a:rPr lang="en-US" dirty="0" smtClean="0"/>
+              <a:t>Blender (open source)</a:t>
+            </a:r>
+          </a:p>
+          <a:p>
+            <a:pPr lvl="2"/>
+            <a:r>
+              <a:rPr lang="en-US" dirty="0" err="1" smtClean="0"/>
+              <a:t>Autocad</a:t>
+            </a:r>
+            <a:r>
+              <a:rPr lang="en-US" dirty="0" smtClean="0"/>
+              <a:t> 123D Design</a:t>
+            </a:r>
           </a:p>
         </p:txBody>
       </p:sp>
     </p:spTree>
     <p:extLst>
       <p:ext uri="{BB962C8B-B14F-4D97-AF65-F5344CB8AC3E}">
-        <p14:creationId xmlns:p14="http://schemas.microsoft.com/office/powerpoint/2010/main" val="3618842773"/>
+        <p14:creationId xmlns:p14="http://schemas.microsoft.com/office/powerpoint/2010/main" val="1551500598"/>
       </p:ext>
     </p:extLst>
   </p:cSld>
@@ -4238,7 +4429,7 @@
           <a:p>
             <a:r>
               <a:rPr lang="en-US" dirty="0" smtClean="0"/>
-              <a:t>What to Print?</a:t>
+              <a:t>How to Print?</a:t>
             </a:r>
             <a:endParaRPr lang="en-US" dirty="0"/>
           </a:p>
@@ -4256,8 +4447,8 @@
         </p:nvSpPr>
         <p:spPr>
           <a:xfrm>
-            <a:off x="457200" y="1219200"/>
-            <a:ext cx="8229600" cy="4525963"/>
+            <a:off x="437909" y="914400"/>
+            <a:ext cx="8229600" cy="1219200"/>
           </a:xfrm>
         </p:spPr>
         <p:txBody>
@@ -4268,94 +4459,149 @@
           <a:p>
             <a:r>
               <a:rPr lang="en-US" dirty="0" smtClean="0"/>
-              <a:t>You need a 3D model (.</a:t>
+              <a:t>3D printers use </a:t>
             </a:r>
             <a:r>
               <a:rPr lang="en-US" dirty="0" err="1" smtClean="0"/>
-              <a:t>stl</a:t>
-            </a:r>
-            <a:r>
-              <a:rPr lang="en-US" dirty="0" smtClean="0"/>
-              <a:t> file)</a:t>
-            </a:r>
+              <a:t>GCode</a:t>
+            </a:r>
+            <a:endParaRPr lang="en-US" dirty="0" smtClean="0"/>
           </a:p>
           <a:p>
             <a:pPr lvl="1"/>
             <a:r>
               <a:rPr lang="en-US" dirty="0" smtClean="0"/>
-              <a:t>Use an existing model </a:t>
-            </a:r>
-          </a:p>
-          <a:p>
-            <a:pPr lvl="2"/>
-            <a:r>
-              <a:rPr lang="en-US" dirty="0" smtClean="0">
-                <a:hlinkClick r:id="rId2"/>
-              </a:rPr>
-              <a:t>www.thingiverse.com</a:t>
-            </a:r>
-            <a:endParaRPr lang="en-US" dirty="0" smtClean="0"/>
-          </a:p>
-          <a:p>
-            <a:pPr lvl="1"/>
-            <a:r>
-              <a:rPr lang="en-US" dirty="0" smtClean="0"/>
-              <a:t>Make your own model</a:t>
-            </a:r>
-          </a:p>
-          <a:p>
-            <a:pPr lvl="2"/>
+              <a:t>Set of instructions (movement, speed, temp, </a:t>
+            </a:r>
             <a:r>
               <a:rPr lang="en-US" dirty="0" err="1" smtClean="0"/>
-              <a:t>Tinkercad</a:t>
-            </a:r>
-            <a:r>
-              <a:rPr lang="en-US" dirty="0" smtClean="0"/>
-              <a:t> (web based </a:t>
-            </a:r>
-            <a:r>
-              <a:rPr lang="en-US" dirty="0" smtClean="0">
-                <a:hlinkClick r:id="rId3"/>
-              </a:rPr>
-              <a:t>www.tinkercad.com</a:t>
-            </a:r>
-            <a:r>
-              <a:rPr lang="en-US" dirty="0" smtClean="0"/>
-              <a:t> )</a:t>
-            </a:r>
-          </a:p>
-          <a:p>
-            <a:pPr lvl="2"/>
+              <a:t>etc</a:t>
+            </a:r>
+            <a:r>
+              <a:rPr lang="en-US" dirty="0" smtClean="0"/>
+              <a:t>)</a:t>
+            </a:r>
+          </a:p>
+        </p:txBody>
+      </p:sp>
+      <p:sp>
+        <p:nvSpPr>
+          <p:cNvPr id="4" name="TextBox 3"/>
+          <p:cNvSpPr txBox="1"/>
+          <p:nvPr/>
+        </p:nvSpPr>
+        <p:spPr>
+          <a:xfrm>
+            <a:off x="514109" y="2057400"/>
+            <a:ext cx="8153400" cy="3693319"/>
+          </a:xfrm>
+          <a:prstGeom prst="rect">
+            <a:avLst/>
+          </a:prstGeom>
+          <a:noFill/>
+        </p:spPr>
+        <p:txBody>
+          <a:bodyPr wrap="square" rtlCol="0">
+            <a:spAutoFit/>
+          </a:bodyPr>
+          <a:lstStyle/>
+          <a:p>
+            <a:r>
+              <a:rPr lang="en-US" dirty="0" smtClean="0"/>
+              <a:t>(**** </a:t>
+            </a:r>
             <a:r>
               <a:rPr lang="en-US" dirty="0" err="1" smtClean="0"/>
-              <a:t>Meshmixer</a:t>
-            </a:r>
-            <a:endParaRPr lang="en-US" dirty="0" smtClean="0"/>
-          </a:p>
-          <a:p>
-            <a:pPr lvl="2"/>
-            <a:r>
-              <a:rPr lang="en-US" dirty="0" smtClean="0"/>
-              <a:t>Blender (open source)</a:t>
-            </a:r>
-          </a:p>
-          <a:p>
-            <a:pPr lvl="2"/>
+              <a:t>start.gcode</a:t>
+            </a:r>
+            <a:r>
+              <a:rPr lang="en-US" dirty="0" smtClean="0"/>
+              <a:t> for The Replicator, dual head ****)</a:t>
+            </a:r>
+          </a:p>
+          <a:p>
+            <a:r>
+              <a:rPr lang="en-US" dirty="0" smtClean="0"/>
+              <a:t>M103 (disable RPM)</a:t>
+            </a:r>
+          </a:p>
+          <a:p>
+            <a:r>
+              <a:rPr lang="en-US" dirty="0" smtClean="0"/>
+              <a:t>M73 P0 (enable build progress)</a:t>
+            </a:r>
+          </a:p>
+          <a:p>
+            <a:r>
+              <a:rPr lang="en-US" dirty="0" smtClean="0"/>
+              <a:t>G21 (set units to mm)</a:t>
+            </a:r>
+          </a:p>
+          <a:p>
+            <a:r>
+              <a:rPr lang="en-US" dirty="0" smtClean="0"/>
+              <a:t>G90 (set positioning to absolute)</a:t>
+            </a:r>
+          </a:p>
+          <a:p>
+            <a:r>
+              <a:rPr lang="en-US" dirty="0" smtClean="0"/>
+              <a:t>M109 S065 T0 (set HBP temperature)</a:t>
+            </a:r>
+          </a:p>
+          <a:p>
+            <a:r>
+              <a:rPr lang="en-US" dirty="0" smtClean="0"/>
+              <a:t>M104 S220 T0 (set extruder temperature) (temp updated by </a:t>
+            </a:r>
             <a:r>
               <a:rPr lang="en-US" dirty="0" err="1" smtClean="0"/>
-              <a:t>Autocad</a:t>
-            </a:r>
-            <a:r>
-              <a:rPr lang="en-US" dirty="0" smtClean="0"/>
-              <a:t> 123D Design</a:t>
-            </a:r>
+              <a:t>printOMatic</a:t>
+            </a:r>
+            <a:r>
+              <a:rPr lang="en-US" dirty="0" smtClean="0"/>
+              <a:t>)</a:t>
+            </a:r>
+          </a:p>
+          <a:p>
+            <a:r>
+              <a:rPr lang="en-US" dirty="0" smtClean="0"/>
+              <a:t>…</a:t>
+            </a:r>
+          </a:p>
+          <a:p>
+            <a:r>
+              <a:rPr lang="en-US" dirty="0" smtClean="0"/>
+              <a:t>G1 X-29.91 Y-29.91 Z0.1 F1080.0 E1.0</a:t>
+            </a:r>
+          </a:p>
+          <a:p>
+            <a:r>
+              <a:rPr lang="en-US" dirty="0" smtClean="0"/>
+              <a:t>G1 X-23.5 Y-35.17 Z0.1 F1080.0 E1.3</a:t>
+            </a:r>
+          </a:p>
+          <a:p>
+            <a:r>
+              <a:rPr lang="en-US" dirty="0" smtClean="0"/>
+              <a:t>G1 X-16.19 Y-39.08 Z0.1 F1080.0 E1.6</a:t>
+            </a:r>
+          </a:p>
+          <a:p>
+            <a:r>
+              <a:rPr lang="en-US" dirty="0" smtClean="0"/>
+              <a:t>G1 X-8.25 Y-41.49 Z0.1 F1080.0 E1.9</a:t>
+            </a:r>
+          </a:p>
+          <a:p>
+            <a:endParaRPr lang="en-US" dirty="0"/>
           </a:p>
         </p:txBody>
       </p:sp>
     </p:spTree>
     <p:extLst>
       <p:ext uri="{BB962C8B-B14F-4D97-AF65-F5344CB8AC3E}">
-        <p14:creationId xmlns:p14="http://schemas.microsoft.com/office/powerpoint/2010/main" val="1551500598"/>
+        <p14:creationId xmlns:p14="http://schemas.microsoft.com/office/powerpoint/2010/main" val="2291998744"/>
       </p:ext>
     </p:extLst>
   </p:cSld>
@@ -4396,71 +4642,117 @@
             <a:spLocks noGrp="1"/>
           </p:cNvSpPr>
           <p:nvPr>
-            <p:ph type="ctrTitle"/>
-          </p:nvPr>
-        </p:nvSpPr>
-        <p:spPr>
-          <a:xfrm>
-            <a:off x="533400" y="457200"/>
-            <a:ext cx="7772400" cy="1470025"/>
-          </a:xfrm>
-        </p:spPr>
-        <p:txBody>
-          <a:bodyPr/>
-          <a:lstStyle/>
-          <a:p>
-            <a:r>
-              <a:rPr lang="en-US" dirty="0" smtClean="0"/>
-              <a:t>Introduction to 3D Printing</a:t>
-            </a:r>
-            <a:endParaRPr lang="en-US" dirty="0"/>
-          </a:p>
-        </p:txBody>
-      </p:sp>
-      <p:sp>
-        <p:nvSpPr>
-          <p:cNvPr id="3" name="Subtitle 2"/>
-          <p:cNvSpPr>
-            <a:spLocks noGrp="1"/>
-          </p:cNvSpPr>
-          <p:nvPr>
-            <p:ph type="subTitle" idx="1"/>
-          </p:nvPr>
-        </p:nvSpPr>
-        <p:spPr>
-          <a:xfrm>
-            <a:off x="228600" y="2212975"/>
-            <a:ext cx="8458200" cy="1752600"/>
-          </a:xfrm>
-        </p:spPr>
-        <p:txBody>
-          <a:bodyPr/>
-          <a:lstStyle/>
-          <a:p>
-            <a:r>
-              <a:rPr lang="en-US" dirty="0" smtClean="0"/>
-              <a:t>“</a:t>
+            <p:ph type="title"/>
+          </p:nvPr>
+        </p:nvSpPr>
+        <p:spPr>
+          <a:xfrm>
+            <a:off x="457200" y="0"/>
+            <a:ext cx="8229600" cy="762000"/>
+          </a:xfrm>
+        </p:spPr>
+        <p:txBody>
+          <a:bodyPr>
+            <a:normAutofit/>
+          </a:bodyPr>
+          <a:lstStyle/>
+          <a:p>
+            <a:r>
+              <a:rPr lang="en-US" b="1" cap="all" dirty="0">
+                <a:solidFill>
+                  <a:srgbClr val="C00000"/>
+                </a:solidFill>
+              </a:rPr>
+              <a:t>WELCOME</a:t>
+            </a:r>
+            <a:r>
+              <a:rPr lang="en-US" b="1" cap="all" dirty="0" smtClean="0">
+                <a:solidFill>
+                  <a:srgbClr val="C00000"/>
+                </a:solidFill>
+              </a:rPr>
+              <a:t>!</a:t>
+            </a:r>
+            <a:endParaRPr lang="en-US" dirty="0">
+              <a:solidFill>
+                <a:srgbClr val="C00000"/>
+              </a:solidFill>
+            </a:endParaRPr>
+          </a:p>
+        </p:txBody>
+      </p:sp>
+      <p:sp>
+        <p:nvSpPr>
+          <p:cNvPr id="3" name="Content Placeholder 2"/>
+          <p:cNvSpPr>
+            <a:spLocks noGrp="1"/>
+          </p:cNvSpPr>
+          <p:nvPr>
+            <p:ph idx="1"/>
+          </p:nvPr>
+        </p:nvSpPr>
+        <p:spPr>
+          <a:xfrm>
+            <a:off x="457200" y="762000"/>
+            <a:ext cx="8229600" cy="4525963"/>
+          </a:xfrm>
+        </p:spPr>
+        <p:txBody>
+          <a:bodyPr>
+            <a:normAutofit/>
+          </a:bodyPr>
+          <a:lstStyle/>
+          <a:p>
+            <a:pPr marL="0" indent="0" fontAlgn="base">
+              <a:buNone/>
+            </a:pPr>
+            <a:r>
+              <a:rPr lang="en-US" dirty="0" smtClean="0"/>
+              <a:t>Girl </a:t>
             </a:r>
             <a:r>
               <a:rPr lang="en-US" dirty="0"/>
-              <a:t> I want to say one word to you. Just one word</a:t>
-            </a:r>
-            <a:r>
-              <a:rPr lang="en-US" dirty="0" smtClean="0"/>
-              <a:t>.…</a:t>
-            </a:r>
-          </a:p>
-          <a:p>
-            <a:r>
-              <a:rPr lang="en-US" dirty="0" smtClean="0"/>
-              <a:t>Plastics”</a:t>
-            </a:r>
-          </a:p>
-          <a:p>
-            <a:r>
-              <a:rPr lang="en-US" dirty="0" smtClean="0"/>
-              <a:t>The Graduate - 1967</a:t>
-            </a:r>
+              <a:t>Develop It is here to provide affordable and accessible programs to learn software through mentorship and hands-on instruction.</a:t>
+            </a:r>
+          </a:p>
+          <a:p>
+            <a:pPr marL="0" indent="0" fontAlgn="base">
+              <a:buNone/>
+            </a:pPr>
+            <a:r>
+              <a:rPr lang="en-US" dirty="0"/>
+              <a:t>Some "rules"</a:t>
+            </a:r>
+          </a:p>
+          <a:p>
+            <a:pPr fontAlgn="base"/>
+            <a:r>
+              <a:rPr lang="en-US" dirty="0"/>
+              <a:t>We are here for you!</a:t>
+            </a:r>
+          </a:p>
+          <a:p>
+            <a:pPr fontAlgn="base"/>
+            <a:r>
+              <a:rPr lang="en-US" dirty="0"/>
+              <a:t>Every question is important</a:t>
+            </a:r>
+          </a:p>
+          <a:p>
+            <a:pPr fontAlgn="base"/>
+            <a:r>
+              <a:rPr lang="en-US" dirty="0"/>
+              <a:t>Help each other</a:t>
+            </a:r>
+          </a:p>
+          <a:p>
+            <a:pPr fontAlgn="base"/>
+            <a:r>
+              <a:rPr lang="en-US" dirty="0"/>
+              <a:t>Have fun</a:t>
+            </a:r>
+          </a:p>
+          <a:p>
             <a:endParaRPr lang="en-US" dirty="0"/>
           </a:p>
         </p:txBody>
@@ -4468,7 +4760,7 @@
     </p:spTree>
     <p:extLst>
       <p:ext uri="{BB962C8B-B14F-4D97-AF65-F5344CB8AC3E}">
-        <p14:creationId xmlns:p14="http://schemas.microsoft.com/office/powerpoint/2010/main" val="2666580265"/>
+        <p14:creationId xmlns:p14="http://schemas.microsoft.com/office/powerpoint/2010/main" val="3634930489"/>
       </p:ext>
     </p:extLst>
   </p:cSld>
@@ -4524,7 +4816,7 @@
           <a:p>
             <a:r>
               <a:rPr lang="en-US" dirty="0" smtClean="0"/>
-              <a:t>How to Print?</a:t>
+              <a:t>Slicers</a:t>
             </a:r>
             <a:endParaRPr lang="en-US" dirty="0"/>
           </a:p>
@@ -4543,7 +4835,7 @@
         <p:spPr>
           <a:xfrm>
             <a:off x="437909" y="914400"/>
-            <a:ext cx="8229600" cy="1219200"/>
+            <a:ext cx="8229600" cy="4267200"/>
           </a:xfrm>
         </p:spPr>
         <p:txBody>
@@ -4554,7 +4846,7 @@
           <a:p>
             <a:r>
               <a:rPr lang="en-US" dirty="0" smtClean="0"/>
-              <a:t>3D printers use </a:t>
+              <a:t>Convert Models to </a:t>
             </a:r>
             <a:r>
               <a:rPr lang="en-US" dirty="0" err="1" smtClean="0"/>
@@ -4565,138 +4857,69 @@
           <a:p>
             <a:pPr lvl="1"/>
             <a:r>
-              <a:rPr lang="en-US" dirty="0" smtClean="0"/>
-              <a:t>Set of instructions (movement, speed, temp, </a:t>
-            </a:r>
-            <a:r>
               <a:rPr lang="en-US" dirty="0" err="1" smtClean="0"/>
-              <a:t>etc</a:t>
+              <a:t>Skeinforge</a:t>
+            </a:r>
+            <a:r>
+              <a:rPr lang="en-US" dirty="0" smtClean="0"/>
+              <a:t> used in </a:t>
+            </a:r>
+            <a:r>
+              <a:rPr lang="en-US" dirty="0" err="1" smtClean="0"/>
+              <a:t>ReplicatorG</a:t>
+            </a:r>
+            <a:r>
+              <a:rPr lang="en-US" dirty="0" smtClean="0"/>
+              <a:t> (oldie but a goodie)</a:t>
+            </a:r>
+          </a:p>
+          <a:p>
+            <a:pPr lvl="1"/>
+            <a:r>
+              <a:rPr lang="en-US" dirty="0" smtClean="0"/>
+              <a:t>Slic3r </a:t>
+            </a:r>
+          </a:p>
+          <a:p>
+            <a:pPr lvl="1"/>
+            <a:r>
+              <a:rPr lang="en-US" dirty="0" err="1" smtClean="0"/>
+              <a:t>KISSlicer</a:t>
+            </a:r>
+            <a:endParaRPr lang="en-US" dirty="0" smtClean="0"/>
+          </a:p>
+          <a:p>
+            <a:pPr lvl="1"/>
+            <a:r>
+              <a:rPr lang="en-US" dirty="0" err="1" smtClean="0"/>
+              <a:t>Makerware</a:t>
+            </a:r>
+            <a:r>
+              <a:rPr lang="en-US" dirty="0" smtClean="0"/>
+              <a:t> (</a:t>
+            </a:r>
+            <a:r>
+              <a:rPr lang="en-US" dirty="0" err="1" smtClean="0"/>
+              <a:t>Makerbot</a:t>
             </a:r>
             <a:r>
               <a:rPr lang="en-US" dirty="0" smtClean="0"/>
               <a:t>)</a:t>
             </a:r>
           </a:p>
-        </p:txBody>
-      </p:sp>
-      <p:sp>
-        <p:nvSpPr>
-          <p:cNvPr id="4" name="TextBox 3"/>
-          <p:cNvSpPr txBox="1"/>
-          <p:nvPr/>
-        </p:nvSpPr>
-        <p:spPr>
-          <a:xfrm>
-            <a:off x="514109" y="2057400"/>
-            <a:ext cx="8153400" cy="3693319"/>
-          </a:xfrm>
-          <a:prstGeom prst="rect">
-            <a:avLst/>
-          </a:prstGeom>
-          <a:noFill/>
-        </p:spPr>
-        <p:txBody>
-          <a:bodyPr wrap="square" rtlCol="0">
-            <a:spAutoFit/>
-          </a:bodyPr>
-          <a:lstStyle/>
-          <a:p>
-            <a:r>
-              <a:rPr lang="en-US" dirty="0" smtClean="0"/>
-              <a:t>(**** </a:t>
-            </a:r>
-            <a:r>
-              <a:rPr lang="en-US" dirty="0" err="1" smtClean="0"/>
-              <a:t>start.gcode</a:t>
-            </a:r>
-            <a:r>
-              <a:rPr lang="en-US" dirty="0" smtClean="0"/>
-              <a:t> for The Replicator, dual head ****)</a:t>
-            </a:r>
-          </a:p>
-          <a:p>
-            <a:r>
-              <a:rPr lang="en-US" dirty="0" smtClean="0"/>
-              <a:t>M103 (disable RPM)</a:t>
-            </a:r>
-          </a:p>
-          <a:p>
-            <a:r>
-              <a:rPr lang="en-US" dirty="0" smtClean="0"/>
-              <a:t>M73 P0 (enable build progress)</a:t>
-            </a:r>
-          </a:p>
-          <a:p>
-            <a:r>
-              <a:rPr lang="en-US" dirty="0" smtClean="0"/>
-              <a:t>G21 (set units to mm)</a:t>
-            </a:r>
-          </a:p>
-          <a:p>
-            <a:r>
-              <a:rPr lang="en-US" dirty="0" smtClean="0"/>
-              <a:t>G90 (set positioning to absolute)</a:t>
-            </a:r>
-          </a:p>
-          <a:p>
-            <a:r>
-              <a:rPr lang="en-US" dirty="0" smtClean="0"/>
-              <a:t>M109 S065 T0 (set HBP temperature)</a:t>
-            </a:r>
-          </a:p>
-          <a:p>
-            <a:r>
-              <a:rPr lang="en-US" dirty="0" smtClean="0"/>
-              <a:t>M104 S220 T0 (set extruder temperature) (temp updated by </a:t>
-            </a:r>
-            <a:r>
-              <a:rPr lang="en-US" dirty="0" err="1" smtClean="0"/>
-              <a:t>printOMatic</a:t>
-            </a:r>
-            <a:r>
-              <a:rPr lang="en-US" dirty="0" smtClean="0"/>
-              <a:t>)</a:t>
-            </a:r>
-          </a:p>
-          <a:p>
-            <a:r>
-              <a:rPr lang="en-US" dirty="0" smtClean="0"/>
-              <a:t>…</a:t>
-            </a:r>
-          </a:p>
-          <a:p>
-            <a:r>
-              <a:rPr lang="en-US" dirty="0" smtClean="0"/>
-              <a:t>G1 X-29.91 Y-29.91 Z0.1 F1080.0 E1.0</a:t>
-            </a:r>
-          </a:p>
-          <a:p>
-            <a:r>
-              <a:rPr lang="en-US" dirty="0" smtClean="0"/>
-              <a:t>G1 X-23.5 Y-35.17 Z0.1 F1080.0 E1.3</a:t>
-            </a:r>
-          </a:p>
-          <a:p>
-            <a:r>
-              <a:rPr lang="en-US" dirty="0" smtClean="0"/>
-              <a:t>G1 X-16.19 Y-39.08 Z0.1 F1080.0 E1.6</a:t>
-            </a:r>
-          </a:p>
-          <a:p>
-            <a:r>
-              <a:rPr lang="en-US" dirty="0" smtClean="0"/>
-              <a:t>G1 X-8.25 Y-41.49 Z0.1 F1080.0 E1.9</a:t>
-            </a:r>
-          </a:p>
-          <a:p>
-            <a:endParaRPr lang="en-US" dirty="0"/>
+          <a:p>
+            <a:pPr lvl="1"/>
+            <a:r>
+              <a:rPr lang="en-US" dirty="0" smtClean="0"/>
+              <a:t>Simplify3D ($$$)</a:t>
+            </a:r>
           </a:p>
         </p:txBody>
       </p:sp>
     </p:spTree>
     <p:extLst>
       <p:ext uri="{BB962C8B-B14F-4D97-AF65-F5344CB8AC3E}">
-        <p14:creationId xmlns:p14="http://schemas.microsoft.com/office/powerpoint/2010/main" val="2291998744"/>
+        <p14:creationId xmlns:p14="http://schemas.microsoft.com/office/powerpoint/2010/main" val="1490415496"/>
       </p:ext>
     </p:extLst>
   </p:cSld>
@@ -4752,7 +4975,7 @@
           <a:p>
             <a:r>
               <a:rPr lang="en-US" dirty="0" smtClean="0"/>
-              <a:t>Slicers</a:t>
+              <a:t>Terminology / Settings</a:t>
             </a:r>
             <a:endParaRPr lang="en-US" dirty="0"/>
           </a:p>
@@ -4770,8 +4993,8 @@
         </p:nvSpPr>
         <p:spPr>
           <a:xfrm>
-            <a:off x="437909" y="914400"/>
-            <a:ext cx="8229600" cy="4267200"/>
+            <a:off x="228600" y="914400"/>
+            <a:ext cx="8839200" cy="4267200"/>
           </a:xfrm>
         </p:spPr>
         <p:txBody>
@@ -4782,80 +5005,48 @@
           <a:p>
             <a:r>
               <a:rPr lang="en-US" dirty="0" smtClean="0"/>
-              <a:t>Convert Models to </a:t>
-            </a:r>
-            <a:r>
-              <a:rPr lang="en-US" dirty="0" err="1" smtClean="0"/>
-              <a:t>GCode</a:t>
-            </a:r>
+              <a:t>Layer Height - 0.1, 0.2, 0.3 mm (fine, med, coarse)</a:t>
+            </a:r>
+          </a:p>
+          <a:p>
+            <a:r>
+              <a:rPr lang="en-US" dirty="0" smtClean="0"/>
+              <a:t>Shells - 1,2,…? (2 is common, 4 or more extreme)</a:t>
+            </a:r>
+          </a:p>
+          <a:p>
+            <a:r>
+              <a:rPr lang="en-US" dirty="0" smtClean="0"/>
+              <a:t>Infill -10% - 100% (10% - 20% is common)</a:t>
+            </a:r>
+          </a:p>
+          <a:p>
+            <a:r>
+              <a:rPr lang="en-US" dirty="0" smtClean="0"/>
+              <a:t>Support</a:t>
+            </a:r>
+          </a:p>
+          <a:p>
+            <a:r>
+              <a:rPr lang="en-US" dirty="0" smtClean="0"/>
+              <a:t>Skirt (brim)</a:t>
+            </a:r>
+          </a:p>
+          <a:p>
+            <a:r>
+              <a:rPr lang="en-US" dirty="0" smtClean="0"/>
+              <a:t>Raft</a:t>
+            </a:r>
+          </a:p>
+          <a:p>
             <a:endParaRPr lang="en-US" dirty="0" smtClean="0"/>
-          </a:p>
-          <a:p>
-            <a:pPr lvl="1"/>
-            <a:r>
-              <a:rPr lang="en-US" dirty="0" err="1" smtClean="0"/>
-              <a:t>Skeinforge</a:t>
-            </a:r>
-            <a:r>
-              <a:rPr lang="en-US" dirty="0" smtClean="0"/>
-              <a:t> used in </a:t>
-            </a:r>
-            <a:r>
-              <a:rPr lang="en-US" dirty="0" err="1" smtClean="0"/>
-              <a:t>ReplicatorG</a:t>
-            </a:r>
-            <a:r>
-              <a:rPr lang="en-US" dirty="0" smtClean="0"/>
-              <a:t> (oldie but a goodie)</a:t>
-            </a:r>
-          </a:p>
-          <a:p>
-            <a:pPr lvl="1"/>
-            <a:r>
-              <a:rPr lang="en-US" dirty="0" smtClean="0"/>
-              <a:t>Slic3r </a:t>
-            </a:r>
-          </a:p>
-          <a:p>
-            <a:pPr lvl="1"/>
-            <a:r>
-              <a:rPr lang="en-US" dirty="0" err="1" smtClean="0"/>
-              <a:t>KISSlicer</a:t>
-            </a:r>
-            <a:endParaRPr lang="en-US" dirty="0" smtClean="0"/>
-          </a:p>
-          <a:p>
-            <a:pPr lvl="1"/>
-            <a:r>
-              <a:rPr lang="en-US" dirty="0" err="1" smtClean="0"/>
-              <a:t>Makerware</a:t>
-            </a:r>
-            <a:r>
-              <a:rPr lang="en-US" dirty="0" smtClean="0"/>
-              <a:t> (</a:t>
-            </a:r>
-            <a:r>
-              <a:rPr lang="en-US" dirty="0" err="1" smtClean="0"/>
-              <a:t>Makerbot</a:t>
-            </a:r>
-            <a:r>
-              <a:rPr lang="en-US" dirty="0" smtClean="0"/>
-              <a:t>)</a:t>
-            </a:r>
-          </a:p>
-          <a:p>
-            <a:pPr lvl="1"/>
-            <a:r>
-              <a:rPr lang="en-US" dirty="0" smtClean="0"/>
-              <a:t>Simplify3D ($$$)</a:t>
-            </a:r>
           </a:p>
         </p:txBody>
       </p:sp>
     </p:spTree>
     <p:extLst>
       <p:ext uri="{BB962C8B-B14F-4D97-AF65-F5344CB8AC3E}">
-        <p14:creationId xmlns:p14="http://schemas.microsoft.com/office/powerpoint/2010/main" val="1490415496"/>
+        <p14:creationId xmlns:p14="http://schemas.microsoft.com/office/powerpoint/2010/main" val="40754143"/>
       </p:ext>
     </p:extLst>
   </p:cSld>
@@ -4911,7 +5102,7 @@
           <a:p>
             <a:r>
               <a:rPr lang="en-US" dirty="0" smtClean="0"/>
-              <a:t>Terminology / Settings</a:t>
+              <a:t>Infill</a:t>
             </a:r>
             <a:endParaRPr lang="en-US" dirty="0"/>
           </a:p>
@@ -4919,70 +5110,127 @@
       </p:sp>
       <p:sp>
         <p:nvSpPr>
-          <p:cNvPr id="3" name="Content Placeholder 2"/>
-          <p:cNvSpPr>
-            <a:spLocks noGrp="1"/>
-          </p:cNvSpPr>
-          <p:nvPr>
-            <p:ph idx="1"/>
-          </p:nvPr>
-        </p:nvSpPr>
-        <p:spPr>
-          <a:xfrm>
-            <a:off x="228600" y="914400"/>
-            <a:ext cx="8839200" cy="4267200"/>
-          </a:xfrm>
-        </p:spPr>
-        <p:txBody>
-          <a:bodyPr>
-            <a:normAutofit/>
+          <p:cNvPr id="11" name="TextBox 10"/>
+          <p:cNvSpPr txBox="1"/>
+          <p:nvPr/>
+        </p:nvSpPr>
+        <p:spPr>
+          <a:xfrm>
+            <a:off x="1905000" y="4803523"/>
+            <a:ext cx="1028700" cy="523220"/>
+          </a:xfrm>
+          <a:prstGeom prst="rect">
+            <a:avLst/>
+          </a:prstGeom>
+          <a:noFill/>
+        </p:spPr>
+        <p:txBody>
+          <a:bodyPr wrap="square" rtlCol="0">
+            <a:spAutoFit/>
           </a:bodyPr>
           <a:lstStyle/>
           <a:p>
             <a:r>
-              <a:rPr lang="en-US" dirty="0" smtClean="0"/>
-              <a:t>Layer Height - 0.1, 0.2, 0.3 mm (fine, med, coarse)</a:t>
-            </a:r>
-          </a:p>
-          <a:p>
-            <a:r>
-              <a:rPr lang="en-US" dirty="0" smtClean="0"/>
-              <a:t>Shells - 1,2,…? (2 is common, 4 or more extreme)</a:t>
-            </a:r>
-          </a:p>
-          <a:p>
-            <a:r>
-              <a:rPr lang="en-US" dirty="0" smtClean="0"/>
-              <a:t>Infill -10% - 100% (10% - 20% is common)</a:t>
-            </a:r>
-          </a:p>
-          <a:p>
-            <a:r>
-              <a:rPr lang="en-US" dirty="0" smtClean="0"/>
-              <a:t>Support</a:t>
-            </a:r>
-          </a:p>
-          <a:p>
-            <a:r>
-              <a:rPr lang="en-US" dirty="0" smtClean="0"/>
-              <a:t>Skirt (brim)</a:t>
-            </a:r>
-          </a:p>
-          <a:p>
-            <a:r>
-              <a:rPr lang="en-US" dirty="0" smtClean="0"/>
-              <a:t>Raft</a:t>
-            </a:r>
-          </a:p>
-          <a:p>
-            <a:endParaRPr lang="en-US" dirty="0" smtClean="0"/>
-          </a:p>
-        </p:txBody>
-      </p:sp>
+              <a:rPr lang="en-US" sz="2800" dirty="0" smtClean="0"/>
+              <a:t>10%</a:t>
+            </a:r>
+            <a:endParaRPr lang="en-US" sz="2800" dirty="0"/>
+          </a:p>
+        </p:txBody>
+      </p:sp>
+      <p:sp>
+        <p:nvSpPr>
+          <p:cNvPr id="13" name="TextBox 12"/>
+          <p:cNvSpPr txBox="1"/>
+          <p:nvPr/>
+        </p:nvSpPr>
+        <p:spPr>
+          <a:xfrm>
+            <a:off x="6066064" y="4817332"/>
+            <a:ext cx="1447800" cy="523220"/>
+          </a:xfrm>
+          <a:prstGeom prst="rect">
+            <a:avLst/>
+          </a:prstGeom>
+          <a:noFill/>
+        </p:spPr>
+        <p:txBody>
+          <a:bodyPr wrap="square" rtlCol="0">
+            <a:spAutoFit/>
+          </a:bodyPr>
+          <a:lstStyle/>
+          <a:p>
+            <a:r>
+              <a:rPr lang="en-US" sz="2800" dirty="0" smtClean="0"/>
+              <a:t>40%</a:t>
+            </a:r>
+          </a:p>
+        </p:txBody>
+      </p:sp>
+      <p:pic>
+        <p:nvPicPr>
+          <p:cNvPr id="14" name="Picture 13"/>
+          <p:cNvPicPr>
+            <a:picLocks noChangeAspect="1"/>
+          </p:cNvPicPr>
+          <p:nvPr/>
+        </p:nvPicPr>
+        <p:blipFill>
+          <a:blip r:embed="rId2">
+            <a:extLst>
+              <a:ext uri="{28A0092B-C50C-407E-A947-70E740481C1C}">
+                <a14:useLocalDpi xmlns:a14="http://schemas.microsoft.com/office/drawing/2010/main" val="0"/>
+              </a:ext>
+            </a:extLst>
+          </a:blip>
+          <a:stretch>
+            <a:fillRect/>
+          </a:stretch>
+        </p:blipFill>
+        <p:spPr>
+          <a:xfrm>
+            <a:off x="457200" y="1143000"/>
+            <a:ext cx="4152900" cy="3451521"/>
+          </a:xfrm>
+          <a:prstGeom prst="rect">
+            <a:avLst/>
+          </a:prstGeom>
+        </p:spPr>
+      </p:pic>
+      <p:pic>
+        <p:nvPicPr>
+          <p:cNvPr id="15" name="Picture 14"/>
+          <p:cNvPicPr>
+            <a:picLocks noChangeAspect="1"/>
+          </p:cNvPicPr>
+          <p:nvPr/>
+        </p:nvPicPr>
+        <p:blipFill>
+          <a:blip r:embed="rId3">
+            <a:extLst>
+              <a:ext uri="{28A0092B-C50C-407E-A947-70E740481C1C}">
+                <a14:useLocalDpi xmlns:a14="http://schemas.microsoft.com/office/drawing/2010/main" val="0"/>
+              </a:ext>
+            </a:extLst>
+          </a:blip>
+          <a:stretch>
+            <a:fillRect/>
+          </a:stretch>
+        </p:blipFill>
+        <p:spPr>
+          <a:xfrm>
+            <a:off x="4800600" y="1143000"/>
+            <a:ext cx="3978729" cy="3470468"/>
+          </a:xfrm>
+          <a:prstGeom prst="rect">
+            <a:avLst/>
+          </a:prstGeom>
+        </p:spPr>
+      </p:pic>
     </p:spTree>
     <p:extLst>
       <p:ext uri="{BB962C8B-B14F-4D97-AF65-F5344CB8AC3E}">
-        <p14:creationId xmlns:p14="http://schemas.microsoft.com/office/powerpoint/2010/main" val="40754143"/>
+        <p14:creationId xmlns:p14="http://schemas.microsoft.com/office/powerpoint/2010/main" val="3078402184"/>
       </p:ext>
     </p:extLst>
   </p:cSld>
@@ -5038,7 +5286,7 @@
           <a:p>
             <a:r>
               <a:rPr lang="en-US" dirty="0" smtClean="0"/>
-              <a:t>Infill</a:t>
+              <a:t>Support</a:t>
             </a:r>
             <a:endParaRPr lang="en-US" dirty="0"/>
           </a:p>
@@ -5046,87 +5294,52 @@
       </p:sp>
       <p:sp>
         <p:nvSpPr>
-          <p:cNvPr id="11" name="TextBox 10"/>
-          <p:cNvSpPr txBox="1"/>
-          <p:nvPr/>
-        </p:nvSpPr>
-        <p:spPr>
-          <a:xfrm>
-            <a:off x="1905000" y="4803523"/>
-            <a:ext cx="1028700" cy="523220"/>
-          </a:xfrm>
-          <a:prstGeom prst="rect">
-            <a:avLst/>
-          </a:prstGeom>
-          <a:noFill/>
-        </p:spPr>
-        <p:txBody>
-          <a:bodyPr wrap="square" rtlCol="0">
-            <a:spAutoFit/>
+          <p:cNvPr id="3" name="Content Placeholder 2"/>
+          <p:cNvSpPr>
+            <a:spLocks noGrp="1"/>
+          </p:cNvSpPr>
+          <p:nvPr>
+            <p:ph idx="1"/>
+          </p:nvPr>
+        </p:nvSpPr>
+        <p:spPr>
+          <a:xfrm>
+            <a:off x="228600" y="914400"/>
+            <a:ext cx="8839200" cy="4267200"/>
+          </a:xfrm>
+        </p:spPr>
+        <p:txBody>
+          <a:bodyPr>
+            <a:normAutofit/>
           </a:bodyPr>
           <a:lstStyle/>
           <a:p>
             <a:r>
-              <a:rPr lang="en-US" sz="2800" dirty="0" smtClean="0"/>
-              <a:t>10%</a:t>
-            </a:r>
-            <a:endParaRPr lang="en-US" sz="2800" dirty="0"/>
-          </a:p>
-        </p:txBody>
-      </p:sp>
-      <p:sp>
-        <p:nvSpPr>
-          <p:cNvPr id="13" name="TextBox 12"/>
-          <p:cNvSpPr txBox="1"/>
-          <p:nvPr/>
-        </p:nvSpPr>
-        <p:spPr>
-          <a:xfrm>
-            <a:off x="6066064" y="4817332"/>
-            <a:ext cx="1447800" cy="523220"/>
-          </a:xfrm>
-          <a:prstGeom prst="rect">
-            <a:avLst/>
-          </a:prstGeom>
-          <a:noFill/>
-        </p:spPr>
-        <p:txBody>
-          <a:bodyPr wrap="square" rtlCol="0">
-            <a:spAutoFit/>
-          </a:bodyPr>
-          <a:lstStyle/>
-          <a:p>
-            <a:r>
-              <a:rPr lang="en-US" sz="2800" dirty="0" smtClean="0"/>
-              <a:t>40%</a:t>
-            </a:r>
+              <a:rPr lang="en-US" dirty="0" smtClean="0"/>
+              <a:t>Overhangs</a:t>
+            </a:r>
+          </a:p>
+          <a:p>
+            <a:endParaRPr lang="en-US" dirty="0" smtClean="0"/>
           </a:p>
         </p:txBody>
       </p:sp>
       <p:pic>
         <p:nvPicPr>
-          <p:cNvPr id="14" name="Picture 13"/>
-          <p:cNvPicPr>
-            <a:picLocks noChangeAspect="1"/>
-          </p:cNvPicPr>
+          <p:cNvPr id="4" name="Picture 3"/>
+          <p:cNvPicPr/>
           <p:nvPr/>
         </p:nvPicPr>
         <p:blipFill>
-          <a:blip r:embed="rId2">
-            <a:extLst>
-              <a:ext uri="{28A0092B-C50C-407E-A947-70E740481C1C}">
-                <a14:useLocalDpi xmlns:a14="http://schemas.microsoft.com/office/drawing/2010/main" val="0"/>
-              </a:ext>
-            </a:extLst>
-          </a:blip>
+          <a:blip r:embed="rId2"/>
           <a:stretch>
             <a:fillRect/>
           </a:stretch>
         </p:blipFill>
         <p:spPr>
           <a:xfrm>
-            <a:off x="457200" y="1143000"/>
-            <a:ext cx="4152900" cy="3451521"/>
+            <a:off x="567644" y="1600200"/>
+            <a:ext cx="3318556" cy="3485079"/>
           </a:xfrm>
           <a:prstGeom prst="rect">
             <a:avLst/>
@@ -5135,28 +5348,20 @@
       </p:pic>
       <p:pic>
         <p:nvPicPr>
-          <p:cNvPr id="15" name="Picture 14"/>
-          <p:cNvPicPr>
-            <a:picLocks noChangeAspect="1"/>
-          </p:cNvPicPr>
+          <p:cNvPr id="5" name="Picture 4"/>
+          <p:cNvPicPr/>
           <p:nvPr/>
         </p:nvPicPr>
         <p:blipFill>
-          <a:blip r:embed="rId3">
-            <a:extLst>
-              <a:ext uri="{28A0092B-C50C-407E-A947-70E740481C1C}">
-                <a14:useLocalDpi xmlns:a14="http://schemas.microsoft.com/office/drawing/2010/main" val="0"/>
-              </a:ext>
-            </a:extLst>
-          </a:blip>
+          <a:blip r:embed="rId3"/>
           <a:stretch>
             <a:fillRect/>
           </a:stretch>
         </p:blipFill>
         <p:spPr>
           <a:xfrm>
-            <a:off x="4800600" y="1143000"/>
-            <a:ext cx="3978729" cy="3470468"/>
+            <a:off x="4724400" y="1524000"/>
+            <a:ext cx="2971800" cy="3578047"/>
           </a:xfrm>
           <a:prstGeom prst="rect">
             <a:avLst/>
@@ -5166,7 +5371,7 @@
     </p:spTree>
     <p:extLst>
       <p:ext uri="{BB962C8B-B14F-4D97-AF65-F5344CB8AC3E}">
-        <p14:creationId xmlns:p14="http://schemas.microsoft.com/office/powerpoint/2010/main" val="3078402184"/>
+        <p14:creationId xmlns:p14="http://schemas.microsoft.com/office/powerpoint/2010/main" val="2809639533"/>
       </p:ext>
     </p:extLst>
   </p:cSld>
@@ -5222,7 +5427,7 @@
           <a:p>
             <a:r>
               <a:rPr lang="en-US" dirty="0" smtClean="0"/>
-              <a:t>Support</a:t>
+              <a:t>Skirt / Brim</a:t>
             </a:r>
             <a:endParaRPr lang="en-US" dirty="0"/>
           </a:p>
@@ -5230,52 +5435,88 @@
       </p:sp>
       <p:sp>
         <p:nvSpPr>
-          <p:cNvPr id="3" name="Content Placeholder 2"/>
-          <p:cNvSpPr>
-            <a:spLocks noGrp="1"/>
-          </p:cNvSpPr>
-          <p:nvPr>
-            <p:ph idx="1"/>
-          </p:nvPr>
-        </p:nvSpPr>
-        <p:spPr>
-          <a:xfrm>
-            <a:off x="228600" y="914400"/>
-            <a:ext cx="8839200" cy="4267200"/>
-          </a:xfrm>
-        </p:spPr>
-        <p:txBody>
-          <a:bodyPr>
-            <a:normAutofit/>
+          <p:cNvPr id="11" name="TextBox 10"/>
+          <p:cNvSpPr txBox="1"/>
+          <p:nvPr/>
+        </p:nvSpPr>
+        <p:spPr>
+          <a:xfrm>
+            <a:off x="1897743" y="5094162"/>
+            <a:ext cx="1028700" cy="523220"/>
+          </a:xfrm>
+          <a:prstGeom prst="rect">
+            <a:avLst/>
+          </a:prstGeom>
+          <a:noFill/>
+        </p:spPr>
+        <p:txBody>
+          <a:bodyPr wrap="square" rtlCol="0">
+            <a:spAutoFit/>
           </a:bodyPr>
           <a:lstStyle/>
           <a:p>
             <a:r>
-              <a:rPr lang="en-US" dirty="0" smtClean="0"/>
-              <a:t>Overhangs</a:t>
-            </a:r>
-          </a:p>
-          <a:p>
-            <a:endParaRPr lang="en-US" dirty="0" smtClean="0"/>
+              <a:rPr lang="en-US" sz="2800" dirty="0" smtClean="0"/>
+              <a:t>Top</a:t>
+            </a:r>
+            <a:endParaRPr lang="en-US" sz="2800" dirty="0"/>
+          </a:p>
+        </p:txBody>
+      </p:sp>
+      <p:sp>
+        <p:nvSpPr>
+          <p:cNvPr id="13" name="TextBox 12"/>
+          <p:cNvSpPr txBox="1"/>
+          <p:nvPr/>
+        </p:nvSpPr>
+        <p:spPr>
+          <a:xfrm>
+            <a:off x="5687805" y="5094162"/>
+            <a:ext cx="1447800" cy="523220"/>
+          </a:xfrm>
+          <a:prstGeom prst="rect">
+            <a:avLst/>
+          </a:prstGeom>
+          <a:noFill/>
+        </p:spPr>
+        <p:txBody>
+          <a:bodyPr wrap="square" rtlCol="0">
+            <a:spAutoFit/>
+          </a:bodyPr>
+          <a:lstStyle/>
+          <a:p>
+            <a:r>
+              <a:rPr lang="en-US" sz="2800" dirty="0" smtClean="0"/>
+              <a:t>Bottom</a:t>
+            </a:r>
+            <a:endParaRPr lang="en-US" sz="2800" dirty="0"/>
           </a:p>
         </p:txBody>
       </p:sp>
       <p:pic>
         <p:nvPicPr>
-          <p:cNvPr id="4" name="Picture 3"/>
-          <p:cNvPicPr/>
+          <p:cNvPr id="3" name="Picture 2"/>
+          <p:cNvPicPr>
+            <a:picLocks noChangeAspect="1"/>
+          </p:cNvPicPr>
           <p:nvPr/>
         </p:nvPicPr>
         <p:blipFill>
-          <a:blip r:embed="rId2"/>
+          <a:blip r:embed="rId2">
+            <a:extLst>
+              <a:ext uri="{28A0092B-C50C-407E-A947-70E740481C1C}">
+                <a14:useLocalDpi xmlns:a14="http://schemas.microsoft.com/office/drawing/2010/main" val="0"/>
+              </a:ext>
+            </a:extLst>
+          </a:blip>
           <a:stretch>
             <a:fillRect/>
           </a:stretch>
         </p:blipFill>
         <p:spPr>
           <a:xfrm>
-            <a:off x="567644" y="1600200"/>
-            <a:ext cx="3318556" cy="3485079"/>
+            <a:off x="21771" y="1219200"/>
+            <a:ext cx="4286250" cy="3604194"/>
           </a:xfrm>
           <a:prstGeom prst="rect">
             <a:avLst/>
@@ -5284,20 +5525,28 @@
       </p:pic>
       <p:pic>
         <p:nvPicPr>
-          <p:cNvPr id="5" name="Picture 4"/>
-          <p:cNvPicPr/>
+          <p:cNvPr id="4" name="Picture 3"/>
+          <p:cNvPicPr>
+            <a:picLocks noChangeAspect="1"/>
+          </p:cNvPicPr>
           <p:nvPr/>
         </p:nvPicPr>
         <p:blipFill>
-          <a:blip r:embed="rId3"/>
+          <a:blip r:embed="rId3">
+            <a:extLst>
+              <a:ext uri="{28A0092B-C50C-407E-A947-70E740481C1C}">
+                <a14:useLocalDpi xmlns:a14="http://schemas.microsoft.com/office/drawing/2010/main" val="0"/>
+              </a:ext>
+            </a:extLst>
+          </a:blip>
           <a:stretch>
             <a:fillRect/>
           </a:stretch>
         </p:blipFill>
         <p:spPr>
           <a:xfrm>
-            <a:off x="4724400" y="1524000"/>
-            <a:ext cx="2971800" cy="3578047"/>
+            <a:off x="4495800" y="1219200"/>
+            <a:ext cx="4510352" cy="3719286"/>
           </a:xfrm>
           <a:prstGeom prst="rect">
             <a:avLst/>
@@ -5307,7 +5556,7 @@
     </p:spTree>
     <p:extLst>
       <p:ext uri="{BB962C8B-B14F-4D97-AF65-F5344CB8AC3E}">
-        <p14:creationId xmlns:p14="http://schemas.microsoft.com/office/powerpoint/2010/main" val="2809639533"/>
+        <p14:creationId xmlns:p14="http://schemas.microsoft.com/office/powerpoint/2010/main" val="81158189"/>
       </p:ext>
     </p:extLst>
   </p:cSld>
@@ -5363,191 +5612,6 @@
           <a:p>
             <a:r>
               <a:rPr lang="en-US" dirty="0" smtClean="0"/>
-              <a:t>Skirt / Brim</a:t>
-            </a:r>
-            <a:endParaRPr lang="en-US" dirty="0"/>
-          </a:p>
-        </p:txBody>
-      </p:sp>
-      <p:sp>
-        <p:nvSpPr>
-          <p:cNvPr id="11" name="TextBox 10"/>
-          <p:cNvSpPr txBox="1"/>
-          <p:nvPr/>
-        </p:nvSpPr>
-        <p:spPr>
-          <a:xfrm>
-            <a:off x="1897743" y="5094162"/>
-            <a:ext cx="1028700" cy="523220"/>
-          </a:xfrm>
-          <a:prstGeom prst="rect">
-            <a:avLst/>
-          </a:prstGeom>
-          <a:noFill/>
-        </p:spPr>
-        <p:txBody>
-          <a:bodyPr wrap="square" rtlCol="0">
-            <a:spAutoFit/>
-          </a:bodyPr>
-          <a:lstStyle/>
-          <a:p>
-            <a:r>
-              <a:rPr lang="en-US" sz="2800" dirty="0" smtClean="0"/>
-              <a:t>Top</a:t>
-            </a:r>
-            <a:endParaRPr lang="en-US" sz="2800" dirty="0"/>
-          </a:p>
-        </p:txBody>
-      </p:sp>
-      <p:sp>
-        <p:nvSpPr>
-          <p:cNvPr id="13" name="TextBox 12"/>
-          <p:cNvSpPr txBox="1"/>
-          <p:nvPr/>
-        </p:nvSpPr>
-        <p:spPr>
-          <a:xfrm>
-            <a:off x="5687805" y="5094162"/>
-            <a:ext cx="1447800" cy="523220"/>
-          </a:xfrm>
-          <a:prstGeom prst="rect">
-            <a:avLst/>
-          </a:prstGeom>
-          <a:noFill/>
-        </p:spPr>
-        <p:txBody>
-          <a:bodyPr wrap="square" rtlCol="0">
-            <a:spAutoFit/>
-          </a:bodyPr>
-          <a:lstStyle/>
-          <a:p>
-            <a:r>
-              <a:rPr lang="en-US" sz="2800" dirty="0" smtClean="0"/>
-              <a:t>Bottom</a:t>
-            </a:r>
-            <a:endParaRPr lang="en-US" sz="2800" dirty="0"/>
-          </a:p>
-        </p:txBody>
-      </p:sp>
-      <p:pic>
-        <p:nvPicPr>
-          <p:cNvPr id="3" name="Picture 2"/>
-          <p:cNvPicPr>
-            <a:picLocks noChangeAspect="1"/>
-          </p:cNvPicPr>
-          <p:nvPr/>
-        </p:nvPicPr>
-        <p:blipFill>
-          <a:blip r:embed="rId2">
-            <a:extLst>
-              <a:ext uri="{28A0092B-C50C-407E-A947-70E740481C1C}">
-                <a14:useLocalDpi xmlns:a14="http://schemas.microsoft.com/office/drawing/2010/main" val="0"/>
-              </a:ext>
-            </a:extLst>
-          </a:blip>
-          <a:stretch>
-            <a:fillRect/>
-          </a:stretch>
-        </p:blipFill>
-        <p:spPr>
-          <a:xfrm>
-            <a:off x="21771" y="1219200"/>
-            <a:ext cx="4286250" cy="3604194"/>
-          </a:xfrm>
-          <a:prstGeom prst="rect">
-            <a:avLst/>
-          </a:prstGeom>
-        </p:spPr>
-      </p:pic>
-      <p:pic>
-        <p:nvPicPr>
-          <p:cNvPr id="4" name="Picture 3"/>
-          <p:cNvPicPr>
-            <a:picLocks noChangeAspect="1"/>
-          </p:cNvPicPr>
-          <p:nvPr/>
-        </p:nvPicPr>
-        <p:blipFill>
-          <a:blip r:embed="rId3">
-            <a:extLst>
-              <a:ext uri="{28A0092B-C50C-407E-A947-70E740481C1C}">
-                <a14:useLocalDpi xmlns:a14="http://schemas.microsoft.com/office/drawing/2010/main" val="0"/>
-              </a:ext>
-            </a:extLst>
-          </a:blip>
-          <a:stretch>
-            <a:fillRect/>
-          </a:stretch>
-        </p:blipFill>
-        <p:spPr>
-          <a:xfrm>
-            <a:off x="4495800" y="1219200"/>
-            <a:ext cx="4510352" cy="3719286"/>
-          </a:xfrm>
-          <a:prstGeom prst="rect">
-            <a:avLst/>
-          </a:prstGeom>
-        </p:spPr>
-      </p:pic>
-    </p:spTree>
-    <p:extLst>
-      <p:ext uri="{BB962C8B-B14F-4D97-AF65-F5344CB8AC3E}">
-        <p14:creationId xmlns:p14="http://schemas.microsoft.com/office/powerpoint/2010/main" val="81158189"/>
-      </p:ext>
-    </p:extLst>
-  </p:cSld>
-  <p:clrMapOvr>
-    <a:masterClrMapping/>
-  </p:clrMapOvr>
-  <p:timing>
-    <p:tnLst>
-      <p:par>
-        <p:cTn id="1" dur="indefinite" restart="never" nodeType="tmRoot"/>
-      </p:par>
-    </p:tnLst>
-  </p:timing>
-</p:sld>
-</file>
-
-<file path=ppt/slides/slide26.xml><?xml version="1.0" encoding="utf-8"?>
-<p:sld xmlns:a="http://schemas.openxmlformats.org/drawingml/2006/main" xmlns:r="http://schemas.openxmlformats.org/officeDocument/2006/relationships" xmlns:p="http://schemas.openxmlformats.org/presentationml/2006/main">
-  <p:cSld>
-    <p:spTree>
-      <p:nvGrpSpPr>
-        <p:cNvPr id="1" name=""/>
-        <p:cNvGrpSpPr/>
-        <p:nvPr/>
-      </p:nvGrpSpPr>
-      <p:grpSpPr>
-        <a:xfrm>
-          <a:off x="0" y="0"/>
-          <a:ext cx="0" cy="0"/>
-          <a:chOff x="0" y="0"/>
-          <a:chExt cx="0" cy="0"/>
-        </a:xfrm>
-      </p:grpSpPr>
-      <p:sp>
-        <p:nvSpPr>
-          <p:cNvPr id="2" name="Title 1"/>
-          <p:cNvSpPr>
-            <a:spLocks noGrp="1"/>
-          </p:cNvSpPr>
-          <p:nvPr>
-            <p:ph type="title"/>
-          </p:nvPr>
-        </p:nvSpPr>
-        <p:spPr>
-          <a:xfrm>
-            <a:off x="457200" y="0"/>
-            <a:ext cx="8229600" cy="1143000"/>
-          </a:xfrm>
-        </p:spPr>
-        <p:txBody>
-          <a:bodyPr/>
-          <a:lstStyle/>
-          <a:p>
-            <a:r>
-              <a:rPr lang="en-US" dirty="0" smtClean="0"/>
               <a:t>Raft</a:t>
             </a:r>
             <a:endParaRPr lang="en-US" dirty="0"/>
@@ -5694,7 +5758,7 @@
 </p:sld>
 </file>
 
-<file path=ppt/slides/slide27.xml><?xml version="1.0" encoding="utf-8"?>
+<file path=ppt/slides/slide26.xml><?xml version="1.0" encoding="utf-8"?>
 <p:sld xmlns:a="http://schemas.openxmlformats.org/drawingml/2006/main" xmlns:r="http://schemas.openxmlformats.org/officeDocument/2006/relationships" xmlns:p="http://schemas.openxmlformats.org/presentationml/2006/main">
   <p:cSld>
     <p:spTree>
@@ -6843,6 +6907,122 @@
 </p:sld>
 </file>
 
+<file path=ppt/slides/slide27.xml><?xml version="1.0" encoding="utf-8"?>
+<p:sld xmlns:a="http://schemas.openxmlformats.org/drawingml/2006/main" xmlns:r="http://schemas.openxmlformats.org/officeDocument/2006/relationships" xmlns:p="http://schemas.openxmlformats.org/presentationml/2006/main">
+  <p:cSld>
+    <p:spTree>
+      <p:nvGrpSpPr>
+        <p:cNvPr id="1" name=""/>
+        <p:cNvGrpSpPr/>
+        <p:nvPr/>
+      </p:nvGrpSpPr>
+      <p:grpSpPr>
+        <a:xfrm>
+          <a:off x="0" y="0"/>
+          <a:ext cx="0" cy="0"/>
+          <a:chOff x="0" y="0"/>
+          <a:chExt cx="0" cy="0"/>
+        </a:xfrm>
+      </p:grpSpPr>
+      <p:sp>
+        <p:nvSpPr>
+          <p:cNvPr id="2" name="Title 1"/>
+          <p:cNvSpPr>
+            <a:spLocks noGrp="1"/>
+          </p:cNvSpPr>
+          <p:nvPr>
+            <p:ph type="title"/>
+          </p:nvPr>
+        </p:nvSpPr>
+        <p:spPr>
+          <a:xfrm>
+            <a:off x="457200" y="0"/>
+            <a:ext cx="8229600" cy="1143000"/>
+          </a:xfrm>
+        </p:spPr>
+        <p:txBody>
+          <a:bodyPr/>
+          <a:lstStyle/>
+          <a:p>
+            <a:r>
+              <a:rPr lang="en-US" dirty="0" smtClean="0"/>
+              <a:t>Bed Leveling is Important</a:t>
+            </a:r>
+            <a:endParaRPr lang="en-US" dirty="0"/>
+          </a:p>
+        </p:txBody>
+      </p:sp>
+      <p:sp>
+        <p:nvSpPr>
+          <p:cNvPr id="3" name="Content Placeholder 2"/>
+          <p:cNvSpPr>
+            <a:spLocks noGrp="1"/>
+          </p:cNvSpPr>
+          <p:nvPr>
+            <p:ph idx="1"/>
+          </p:nvPr>
+        </p:nvSpPr>
+        <p:spPr>
+          <a:xfrm>
+            <a:off x="228600" y="914400"/>
+            <a:ext cx="8839200" cy="4267200"/>
+          </a:xfrm>
+        </p:spPr>
+        <p:txBody>
+          <a:bodyPr>
+            <a:normAutofit/>
+          </a:bodyPr>
+          <a:lstStyle/>
+          <a:p>
+            <a:r>
+              <a:rPr lang="en-US" dirty="0" smtClean="0"/>
+              <a:t>Layer height (0.1, 0.2, 0.3mm)</a:t>
+            </a:r>
+          </a:p>
+          <a:p>
+            <a:pPr lvl="1"/>
+            <a:r>
+              <a:rPr lang="en-US" dirty="0" smtClean="0"/>
+              <a:t>1/64” </a:t>
+            </a:r>
+            <a:r>
+              <a:rPr lang="en-US" dirty="0"/>
+              <a:t>=  </a:t>
+            </a:r>
+            <a:r>
+              <a:rPr lang="en-US" dirty="0" smtClean="0"/>
+              <a:t>0.3969mm </a:t>
+            </a:r>
+          </a:p>
+          <a:p>
+            <a:pPr lvl="1"/>
+            <a:r>
+              <a:rPr lang="en-US" dirty="0" smtClean="0"/>
+              <a:t>Sheet of paper is ~ 0.05mm thick</a:t>
+            </a:r>
+          </a:p>
+        </p:txBody>
+      </p:sp>
+    </p:spTree>
+    <p:extLst>
+      <p:ext uri="{BB962C8B-B14F-4D97-AF65-F5344CB8AC3E}">
+        <p14:creationId xmlns:p14="http://schemas.microsoft.com/office/powerpoint/2010/main" val="755014158"/>
+      </p:ext>
+    </p:extLst>
+  </p:cSld>
+  <p:clrMapOvr>
+    <a:masterClrMapping/>
+  </p:clrMapOvr>
+  <p:timing>
+    <p:tnLst>
+      <p:par>
+        <p:cTn id="1" dur="indefinite" restart="never" nodeType="tmRoot"/>
+      </p:par>
+    </p:tnLst>
+  </p:timing>
+</p:sld>
+</file>
+
 <file path=ppt/slides/slide28.xml><?xml version="1.0" encoding="utf-8"?>
 <p:sld xmlns:a="http://schemas.openxmlformats.org/drawingml/2006/main" xmlns:r="http://schemas.openxmlformats.org/officeDocument/2006/relationships" xmlns:p="http://schemas.openxmlformats.org/presentationml/2006/main">
   <p:cSld>
@@ -6882,7 +7062,7 @@
           <a:p>
             <a:r>
               <a:rPr lang="en-US" dirty="0" smtClean="0"/>
-              <a:t>Bed Leveling is Important</a:t>
+              <a:t>Stick It</a:t>
             </a:r>
             <a:endParaRPr lang="en-US" dirty="0"/>
           </a:p>
@@ -6912,38 +7092,53 @@
           <a:p>
             <a:r>
               <a:rPr lang="en-US" dirty="0" smtClean="0"/>
-              <a:t>Layer height (0.1, 0.2, 0.3mm)</a:t>
+              <a:t>First layer is the most important layer</a:t>
+            </a:r>
+          </a:p>
+          <a:p>
+            <a:r>
+              <a:rPr lang="en-US" dirty="0" smtClean="0"/>
+              <a:t>Getting the first layer to adhere to the print bed</a:t>
             </a:r>
           </a:p>
           <a:p>
             <a:pPr lvl="1"/>
             <a:r>
               <a:rPr lang="en-US" dirty="0" smtClean="0"/>
-              <a:t>1/64” </a:t>
-            </a:r>
-            <a:r>
-              <a:rPr lang="en-US" dirty="0"/>
-              <a:t>=  </a:t>
-            </a:r>
-            <a:r>
-              <a:rPr lang="en-US" dirty="0" smtClean="0"/>
-              <a:t>0.3969mm </a:t>
+              <a:t>Painters tape (blue tape) – PLA only</a:t>
             </a:r>
           </a:p>
           <a:p>
             <a:pPr lvl="1"/>
             <a:r>
               <a:rPr lang="en-US" dirty="0" smtClean="0"/>
-              <a:t>Sheet of paper is ~ 0.05mm thick</a:t>
-            </a:r>
-            <a:endParaRPr lang="en-US" dirty="0" smtClean="0"/>
+              <a:t>Glass with hairspray</a:t>
+            </a:r>
+          </a:p>
+          <a:p>
+            <a:pPr lvl="1"/>
+            <a:r>
+              <a:rPr lang="en-US" dirty="0" err="1" smtClean="0"/>
+              <a:t>Kapton</a:t>
+            </a:r>
+            <a:r>
+              <a:rPr lang="en-US" dirty="0" smtClean="0"/>
+              <a:t> tape</a:t>
+            </a:r>
+          </a:p>
+          <a:p>
+            <a:pPr lvl="1"/>
+            <a:r>
+              <a:rPr lang="en-US" dirty="0" smtClean="0"/>
+              <a:t>ABS juice (ABS and acetone)</a:t>
+            </a:r>
           </a:p>
         </p:txBody>
       </p:sp>
     </p:spTree>
     <p:extLst>
       <p:ext uri="{BB962C8B-B14F-4D97-AF65-F5344CB8AC3E}">
-        <p14:creationId xmlns:p14="http://schemas.microsoft.com/office/powerpoint/2010/main" val="755014158"/>
+        <p14:creationId xmlns:p14="http://schemas.microsoft.com/office/powerpoint/2010/main" val="2998333791"/>
       </p:ext>
     </p:extLst>
   </p:cSld>
@@ -6999,7 +7194,7 @@
           <a:p>
             <a:r>
               <a:rPr lang="en-US" dirty="0" smtClean="0"/>
-              <a:t>Stick It</a:t>
+              <a:t>How Many ‘x’ Can I Print?</a:t>
             </a:r>
             <a:endParaRPr lang="en-US" dirty="0"/>
           </a:p>
@@ -7029,54 +7224,56 @@
           <a:p>
             <a:r>
               <a:rPr lang="en-US" dirty="0" smtClean="0"/>
-              <a:t>First layer is the most important layer</a:t>
-            </a:r>
-          </a:p>
-          <a:p>
-            <a:r>
-              <a:rPr lang="en-US" dirty="0" smtClean="0"/>
-              <a:t>Getting the first layer to adhere to the print bed</a:t>
+              <a:t>Matter is neither created nor destroyed</a:t>
+            </a:r>
+          </a:p>
+          <a:p>
+            <a:r>
+              <a:rPr lang="en-US" dirty="0" smtClean="0"/>
+              <a:t>A standard spool of filament is 1kg (2.2 pounds)</a:t>
+            </a:r>
+          </a:p>
+          <a:p>
+            <a:r>
+              <a:rPr lang="en-US" dirty="0" smtClean="0"/>
+              <a:t>Ukulele weighs about </a:t>
+            </a:r>
+            <a:r>
+              <a:rPr lang="en-US" dirty="0"/>
+              <a:t>425g </a:t>
+            </a:r>
+            <a:r>
+              <a:rPr lang="en-US" dirty="0" smtClean="0"/>
+              <a:t>(</a:t>
+            </a:r>
+            <a:r>
+              <a:rPr lang="en-US" dirty="0"/>
+              <a:t>0.425kg</a:t>
+            </a:r>
+            <a:r>
+              <a:rPr lang="en-US" dirty="0" smtClean="0"/>
+              <a:t>) so it took just under half a spool of filament.</a:t>
+            </a:r>
+          </a:p>
+          <a:p>
+            <a:r>
+              <a:rPr lang="en-US" dirty="0" smtClean="0"/>
+              <a:t>A cookie cutter weighs &lt; 10g </a:t>
             </a:r>
           </a:p>
           <a:p>
             <a:pPr lvl="1"/>
             <a:r>
               <a:rPr lang="en-US" dirty="0" smtClean="0"/>
-              <a:t>Painters tape (blue tape) – PLA only</a:t>
-            </a:r>
-          </a:p>
-          <a:p>
-            <a:pPr lvl="1"/>
-            <a:r>
-              <a:rPr lang="en-US" dirty="0" smtClean="0"/>
-              <a:t>Glass with hairspray</a:t>
-            </a:r>
-          </a:p>
-          <a:p>
-            <a:pPr lvl="1"/>
-            <a:r>
-              <a:rPr lang="en-US" dirty="0" err="1" smtClean="0"/>
-              <a:t>Kapton</a:t>
-            </a:r>
-            <a:r>
-              <a:rPr lang="en-US" dirty="0" smtClean="0"/>
-              <a:t> tape</a:t>
-            </a:r>
-          </a:p>
-          <a:p>
-            <a:pPr lvl="1"/>
-            <a:r>
-              <a:rPr lang="en-US" dirty="0" smtClean="0"/>
-              <a:t>ABS juice (ABS and acetone)</a:t>
-            </a:r>
-            <a:endParaRPr lang="en-US" dirty="0" smtClean="0"/>
+              <a:t>1000g / 10 = 100 so you can print about 100 cookie cutters from a single 1kg (1000g) spool of filament.</a:t>
+            </a:r>
           </a:p>
         </p:txBody>
       </p:sp>
     </p:spTree>
     <p:extLst>
       <p:ext uri="{BB962C8B-B14F-4D97-AF65-F5344CB8AC3E}">
-        <p14:creationId xmlns:p14="http://schemas.microsoft.com/office/powerpoint/2010/main" val="2998333791"/>
+        <p14:creationId xmlns:p14="http://schemas.microsoft.com/office/powerpoint/2010/main" val="920553704"/>
       </p:ext>
     </p:extLst>
   </p:cSld>
@@ -7123,119 +7320,87 @@
         <p:spPr>
           <a:xfrm>
             <a:off x="457200" y="0"/>
-            <a:ext cx="8229600" cy="762000"/>
-          </a:xfrm>
-        </p:spPr>
-        <p:txBody>
-          <a:bodyPr>
-            <a:normAutofit/>
-          </a:bodyPr>
-          <a:lstStyle/>
-          <a:p>
-            <a:r>
-              <a:rPr lang="en-US" b="1" cap="all" dirty="0">
+            <a:ext cx="8229600" cy="1143000"/>
+          </a:xfrm>
+        </p:spPr>
+        <p:txBody>
+          <a:bodyPr/>
+          <a:lstStyle/>
+          <a:p>
+            <a:r>
+              <a:rPr lang="en-US" dirty="0" smtClean="0">
                 <a:solidFill>
-                  <a:srgbClr val="C00000"/>
+                  <a:srgbClr val="7030A0"/>
                 </a:solidFill>
               </a:rPr>
-              <a:t>WELCOME</a:t>
-            </a:r>
-            <a:r>
-              <a:rPr lang="en-US" b="1" cap="all" dirty="0" smtClean="0">
+              <a:t>Introductions</a:t>
+            </a:r>
+            <a:endParaRPr lang="en-US" dirty="0">
+              <a:solidFill>
+                <a:srgbClr val="7030A0"/>
+              </a:solidFill>
+            </a:endParaRPr>
+          </a:p>
+        </p:txBody>
+      </p:sp>
+      <p:sp>
+        <p:nvSpPr>
+          <p:cNvPr id="3" name="Content Placeholder 2"/>
+          <p:cNvSpPr>
+            <a:spLocks noGrp="1"/>
+          </p:cNvSpPr>
+          <p:nvPr>
+            <p:ph idx="1"/>
+          </p:nvPr>
+        </p:nvSpPr>
+        <p:spPr>
+          <a:xfrm>
+            <a:off x="457200" y="1066800"/>
+            <a:ext cx="8229600" cy="4525963"/>
+          </a:xfrm>
+        </p:spPr>
+        <p:txBody>
+          <a:bodyPr/>
+          <a:lstStyle/>
+          <a:p>
+            <a:r>
+              <a:rPr lang="en-US" dirty="0" smtClean="0">
                 <a:solidFill>
-                  <a:srgbClr val="C00000"/>
+                  <a:srgbClr val="7030A0"/>
                 </a:solidFill>
               </a:rPr>
-              <a:t>!</a:t>
+              <a:t>Name</a:t>
+            </a:r>
+          </a:p>
+          <a:p>
+            <a:r>
+              <a:rPr lang="en-US" dirty="0" smtClean="0">
+                <a:solidFill>
+                  <a:srgbClr val="7030A0"/>
+                </a:solidFill>
+              </a:rPr>
+              <a:t>Favorite ice cream </a:t>
+            </a:r>
+            <a:r>
+              <a:rPr lang="en-US" smtClean="0">
+                <a:solidFill>
+                  <a:srgbClr val="7030A0"/>
+                </a:solidFill>
+              </a:rPr>
+              <a:t>or desert</a:t>
             </a:r>
             <a:endParaRPr lang="en-US" dirty="0">
               <a:solidFill>
-                <a:srgbClr val="C00000"/>
+                <a:srgbClr val="7030A0"/>
               </a:solidFill>
             </a:endParaRPr>
-          </a:p>
-        </p:txBody>
-      </p:sp>
-      <p:sp>
-        <p:nvSpPr>
-          <p:cNvPr id="3" name="Content Placeholder 2"/>
-          <p:cNvSpPr>
-            <a:spLocks noGrp="1"/>
-          </p:cNvSpPr>
-          <p:nvPr>
-            <p:ph idx="1"/>
-          </p:nvPr>
-        </p:nvSpPr>
-        <p:spPr>
-          <a:xfrm>
-            <a:off x="457200" y="762000"/>
-            <a:ext cx="8229600" cy="4525963"/>
-          </a:xfrm>
-        </p:spPr>
-        <p:txBody>
-          <a:bodyPr>
-            <a:normAutofit/>
-          </a:bodyPr>
-          <a:lstStyle/>
-          <a:p>
-            <a:pPr marL="0" indent="0" fontAlgn="base">
-              <a:buNone/>
-            </a:pPr>
-            <a:r>
-              <a:rPr lang="en-US" dirty="0" smtClean="0"/>
-              <a:t>Girl </a:t>
-            </a:r>
-            <a:r>
-              <a:rPr lang="en-US" dirty="0"/>
-              <a:t>Develop It is here to provide affordable and accessible programs to learn software through mentorship and hands-on instruction.</a:t>
-            </a:r>
-          </a:p>
-          <a:p>
-            <a:pPr marL="0" indent="0" fontAlgn="base">
-              <a:buNone/>
-            </a:pPr>
-            <a:r>
-              <a:rPr lang="en-US" dirty="0"/>
-              <a:t>Some "rules"</a:t>
-            </a:r>
-          </a:p>
-          <a:p>
-            <a:pPr fontAlgn="base"/>
-            <a:r>
-              <a:rPr lang="en-US" dirty="0"/>
-              <a:t>We are here for you!</a:t>
-            </a:r>
-          </a:p>
-          <a:p>
-            <a:pPr fontAlgn="base"/>
-            <a:r>
-              <a:rPr lang="en-US" dirty="0"/>
-              <a:t>Every question is important</a:t>
-            </a:r>
-          </a:p>
-          <a:p>
-            <a:pPr fontAlgn="base"/>
-            <a:r>
-              <a:rPr lang="en-US" dirty="0"/>
-              <a:t>Help each other</a:t>
-            </a:r>
-          </a:p>
-          <a:p>
-            <a:pPr fontAlgn="base"/>
-            <a:r>
-              <a:rPr lang="en-US" dirty="0"/>
-              <a:t>Have fun</a:t>
-            </a:r>
-          </a:p>
-          <a:p>
-            <a:endParaRPr lang="en-US" dirty="0"/>
           </a:p>
         </p:txBody>
       </p:sp>
     </p:spTree>
     <p:extLst>
       <p:ext uri="{BB962C8B-B14F-4D97-AF65-F5344CB8AC3E}">
-        <p14:creationId xmlns:p14="http://schemas.microsoft.com/office/powerpoint/2010/main" val="3634930489"/>
+        <p14:creationId xmlns:p14="http://schemas.microsoft.com/office/powerpoint/2010/main" val="2301760329"/>
       </p:ext>
     </p:extLst>
   </p:cSld>
@@ -7281,7 +7446,7 @@
         </p:nvSpPr>
         <p:spPr>
           <a:xfrm>
-            <a:off x="457200" y="0"/>
+            <a:off x="381000" y="1447800"/>
             <a:ext cx="8229600" cy="1143000"/>
           </a:xfrm>
         </p:spPr>
@@ -7291,87 +7456,16 @@
           <a:p>
             <a:r>
               <a:rPr lang="en-US" dirty="0" smtClean="0"/>
-              <a:t>How Many ‘x’ Can I Print?</a:t>
+              <a:t>Questions!</a:t>
             </a:r>
             <a:endParaRPr lang="en-US" dirty="0"/>
-          </a:p>
-        </p:txBody>
-      </p:sp>
-      <p:sp>
-        <p:nvSpPr>
-          <p:cNvPr id="3" name="Content Placeholder 2"/>
-          <p:cNvSpPr>
-            <a:spLocks noGrp="1"/>
-          </p:cNvSpPr>
-          <p:nvPr>
-            <p:ph idx="1"/>
-          </p:nvPr>
-        </p:nvSpPr>
-        <p:spPr>
-          <a:xfrm>
-            <a:off x="228600" y="914400"/>
-            <a:ext cx="8839200" cy="4267200"/>
-          </a:xfrm>
-        </p:spPr>
-        <p:txBody>
-          <a:bodyPr>
-            <a:normAutofit/>
-          </a:bodyPr>
-          <a:lstStyle/>
-          <a:p>
-            <a:r>
-              <a:rPr lang="en-US" dirty="0" smtClean="0"/>
-              <a:t>Matter is neither created nor destroyed</a:t>
-            </a:r>
-          </a:p>
-          <a:p>
-            <a:r>
-              <a:rPr lang="en-US" dirty="0" smtClean="0"/>
-              <a:t>A standard spool of filament is 1kg (2.2 pounds)</a:t>
-            </a:r>
-          </a:p>
-          <a:p>
-            <a:r>
-              <a:rPr lang="en-US" dirty="0" smtClean="0"/>
-              <a:t>Ukulele weighs about </a:t>
-            </a:r>
-            <a:r>
-              <a:rPr lang="en-US" dirty="0"/>
-              <a:t>425g </a:t>
-            </a:r>
-            <a:r>
-              <a:rPr lang="en-US" dirty="0" smtClean="0"/>
-              <a:t>(</a:t>
-            </a:r>
-            <a:r>
-              <a:rPr lang="en-US" dirty="0"/>
-              <a:t>0.425kg</a:t>
-            </a:r>
-            <a:r>
-              <a:rPr lang="en-US" dirty="0" smtClean="0"/>
-              <a:t>) so it took just under half a spool of filament.</a:t>
-            </a:r>
-          </a:p>
-          <a:p>
-            <a:r>
-              <a:rPr lang="en-US" dirty="0" smtClean="0"/>
-              <a:t>A cookie cutter weighs &lt; 10g </a:t>
-            </a:r>
-          </a:p>
-          <a:p>
-            <a:pPr lvl="1"/>
-            <a:r>
-              <a:rPr lang="en-US" dirty="0" smtClean="0"/>
-              <a:t>1000g / 10 = 100 so you can print about 100 cookie cutters from a single 1kg (1000g) spool of filament.</a:t>
-            </a:r>
-            <a:endParaRPr lang="en-US" dirty="0" smtClean="0"/>
           </a:p>
         </p:txBody>
       </p:sp>
     </p:spTree>
     <p:extLst>
       <p:ext uri="{BB962C8B-B14F-4D97-AF65-F5344CB8AC3E}">
-        <p14:creationId xmlns:p14="http://schemas.microsoft.com/office/powerpoint/2010/main" val="920553704"/>
+        <p14:creationId xmlns:p14="http://schemas.microsoft.com/office/powerpoint/2010/main" val="1954581026"/>
       </p:ext>
     </p:extLst>
   </p:cSld>
@@ -7426,24 +7520,16 @@
           <a:lstStyle/>
           <a:p>
             <a:r>
-              <a:rPr lang="en-US" dirty="0" smtClean="0">
-                <a:solidFill>
-                  <a:srgbClr val="7030A0"/>
-                </a:solidFill>
-              </a:rPr>
-              <a:t>Introductions</a:t>
-            </a:r>
-            <a:endParaRPr lang="en-US" dirty="0">
-              <a:solidFill>
-                <a:srgbClr val="7030A0"/>
-              </a:solidFill>
-            </a:endParaRPr>
-          </a:p>
-        </p:txBody>
-      </p:sp>
-      <p:sp>
-        <p:nvSpPr>
-          <p:cNvPr id="3" name="Content Placeholder 2"/>
+              <a:rPr lang="en-US" dirty="0" smtClean="0"/>
+              <a:t>What is 3D Printing</a:t>
+            </a:r>
+            <a:endParaRPr lang="en-US" dirty="0"/>
+          </a:p>
+        </p:txBody>
+      </p:sp>
+      <p:sp>
+        <p:nvSpPr>
+          <p:cNvPr id="12" name="Content Placeholder 11"/>
           <p:cNvSpPr>
             <a:spLocks noGrp="1"/>
           </p:cNvSpPr>
@@ -7453,52 +7539,54 @@
         </p:nvSpPr>
         <p:spPr>
           <a:xfrm>
-            <a:off x="457200" y="1066800"/>
-            <a:ext cx="8229600" cy="4525963"/>
-          </a:xfrm>
-        </p:spPr>
-        <p:txBody>
-          <a:bodyPr/>
-          <a:lstStyle/>
-          <a:p>
-            <a:r>
-              <a:rPr lang="en-US" dirty="0" smtClean="0">
-                <a:solidFill>
-                  <a:srgbClr val="7030A0"/>
-                </a:solidFill>
-              </a:rPr>
-              <a:t>Name</a:t>
-            </a:r>
-          </a:p>
-          <a:p>
-            <a:r>
-              <a:rPr lang="en-US" dirty="0" smtClean="0">
-                <a:solidFill>
-                  <a:srgbClr val="7030A0"/>
-                </a:solidFill>
-              </a:rPr>
-              <a:t>Favorite ice cream </a:t>
-            </a:r>
-            <a:r>
-              <a:rPr lang="en-US" smtClean="0">
-                <a:solidFill>
-                  <a:srgbClr val="7030A0"/>
-                </a:solidFill>
-              </a:rPr>
-              <a:t>or desert</a:t>
-            </a:r>
-            <a:endParaRPr lang="en-US" dirty="0">
-              <a:solidFill>
-                <a:srgbClr val="7030A0"/>
-              </a:solidFill>
-            </a:endParaRPr>
+            <a:off x="228600" y="1066800"/>
+            <a:ext cx="8686800" cy="3810000"/>
+          </a:xfrm>
+        </p:spPr>
+        <p:txBody>
+          <a:bodyPr>
+            <a:normAutofit/>
+          </a:bodyPr>
+          <a:lstStyle/>
+          <a:p>
+            <a:r>
+              <a:rPr lang="en-US" dirty="0" smtClean="0"/>
+              <a:t>Additive Manufacturing (Legos)</a:t>
+            </a:r>
+          </a:p>
+          <a:p>
+            <a:pPr lvl="1"/>
+            <a:r>
+              <a:rPr lang="en-US" dirty="0" smtClean="0"/>
+              <a:t>Subtractive (carving, milling)</a:t>
+            </a:r>
+          </a:p>
+          <a:p>
+            <a:r>
+              <a:rPr lang="en-US" dirty="0" smtClean="0"/>
+              <a:t>Material is pushed through a nozzle (extruded)</a:t>
+            </a:r>
+          </a:p>
+          <a:p>
+            <a:pPr lvl="1"/>
+            <a:r>
+              <a:rPr lang="en-US" dirty="0" smtClean="0"/>
+              <a:t>Filament is heated to allow this to happen</a:t>
+            </a:r>
+          </a:p>
+          <a:p>
+            <a:pPr lvl="1"/>
+            <a:r>
+              <a:rPr lang="en-US" dirty="0" smtClean="0"/>
+              <a:t>Icing or pastry bag</a:t>
+            </a:r>
           </a:p>
         </p:txBody>
       </p:sp>
     </p:spTree>
     <p:extLst>
       <p:ext uri="{BB962C8B-B14F-4D97-AF65-F5344CB8AC3E}">
-        <p14:creationId xmlns:p14="http://schemas.microsoft.com/office/powerpoint/2010/main" val="2301760329"/>
+        <p14:creationId xmlns:p14="http://schemas.microsoft.com/office/powerpoint/2010/main" val="1275583038"/>
       </p:ext>
     </p:extLst>
   </p:cSld>
@@ -7554,7 +7642,7 @@
           <a:p>
             <a:r>
               <a:rPr lang="en-US" dirty="0" smtClean="0"/>
-              <a:t>What is 3D Printing</a:t>
+              <a:t>Uses for 3D Printers</a:t>
             </a:r>
             <a:endParaRPr lang="en-US" dirty="0"/>
           </a:p>
@@ -7572,60 +7660,50 @@
         </p:nvSpPr>
         <p:spPr>
           <a:xfrm>
-            <a:off x="228600" y="1066800"/>
-            <a:ext cx="8686800" cy="3810000"/>
-          </a:xfrm>
-        </p:spPr>
-        <p:txBody>
-          <a:bodyPr>
-            <a:normAutofit/>
-          </a:bodyPr>
-          <a:lstStyle/>
-          <a:p>
-            <a:r>
-              <a:rPr lang="en-US" dirty="0" smtClean="0"/>
-              <a:t>Additive Manufacturing (Legos)</a:t>
-            </a:r>
-          </a:p>
-          <a:p>
-            <a:pPr lvl="1"/>
-            <a:r>
-              <a:rPr lang="en-US" dirty="0" smtClean="0"/>
-              <a:t>Subtractive (carving, milling)</a:t>
-            </a:r>
-            <a:endParaRPr lang="en-US" dirty="0" smtClean="0"/>
-          </a:p>
-          <a:p>
-            <a:r>
-              <a:rPr lang="en-US" dirty="0" smtClean="0"/>
-              <a:t>Material is</a:t>
-            </a:r>
-            <a:r>
-              <a:rPr lang="en-US" dirty="0" smtClean="0"/>
-              <a:t> pushed through a nozzle (extruded)</a:t>
-            </a:r>
-          </a:p>
-          <a:p>
-            <a:pPr lvl="1"/>
-            <a:r>
-              <a:rPr lang="en-US" dirty="0" smtClean="0"/>
-              <a:t>Filament is heated to allow this to happen</a:t>
-            </a:r>
-          </a:p>
-          <a:p>
-            <a:pPr lvl="1"/>
-            <a:r>
-              <a:rPr lang="en-US" dirty="0" smtClean="0"/>
-              <a:t>Icing or pastry bag</a:t>
-            </a:r>
-            <a:endParaRPr lang="en-US" dirty="0" smtClean="0"/>
+            <a:off x="457200" y="1066800"/>
+            <a:ext cx="8229600" cy="3810000"/>
+          </a:xfrm>
+        </p:spPr>
+        <p:txBody>
+          <a:bodyPr/>
+          <a:lstStyle/>
+          <a:p>
+            <a:r>
+              <a:rPr lang="en-US" dirty="0" smtClean="0"/>
+              <a:t>Prototyping</a:t>
+            </a:r>
+          </a:p>
+          <a:p>
+            <a:r>
+              <a:rPr lang="en-US" dirty="0" smtClean="0"/>
+              <a:t>Small lot manufacturing (cookie cutters)</a:t>
+            </a:r>
+          </a:p>
+          <a:p>
+            <a:r>
+              <a:rPr lang="en-US" dirty="0" smtClean="0"/>
+              <a:t>Specialized or hard to find items (car parts)</a:t>
+            </a:r>
+          </a:p>
+          <a:p>
+            <a:r>
+              <a:rPr lang="en-US" dirty="0" smtClean="0"/>
+              <a:t>Education (music, animals)</a:t>
+            </a:r>
+          </a:p>
+          <a:p>
+            <a:r>
+              <a:rPr lang="en-US" dirty="0" smtClean="0"/>
+              <a:t>To be determined!</a:t>
+            </a:r>
+            <a:endParaRPr lang="en-US" dirty="0"/>
           </a:p>
         </p:txBody>
       </p:sp>
     </p:spTree>
     <p:extLst>
       <p:ext uri="{BB962C8B-B14F-4D97-AF65-F5344CB8AC3E}">
-        <p14:creationId xmlns:p14="http://schemas.microsoft.com/office/powerpoint/2010/main" val="1275583038"/>
+        <p14:creationId xmlns:p14="http://schemas.microsoft.com/office/powerpoint/2010/main" val="3814718168"/>
       </p:ext>
     </p:extLst>
   </p:cSld>
@@ -7681,7 +7759,7 @@
           <a:p>
             <a:r>
               <a:rPr lang="en-US" dirty="0" smtClean="0"/>
-              <a:t>Uses for 3D Printers</a:t>
+              <a:t>My Favorite Thing</a:t>
             </a:r>
             <a:endParaRPr lang="en-US" dirty="0"/>
           </a:p>
@@ -7699,8 +7777,8 @@
         </p:nvSpPr>
         <p:spPr>
           <a:xfrm>
-            <a:off x="457200" y="1066800"/>
-            <a:ext cx="8229600" cy="3810000"/>
+            <a:off x="457200" y="1600201"/>
+            <a:ext cx="8229600" cy="1600200"/>
           </a:xfrm>
         </p:spPr>
         <p:txBody>
@@ -7709,31 +7787,7 @@
           <a:p>
             <a:r>
               <a:rPr lang="en-US" dirty="0" smtClean="0"/>
-              <a:t>Prototyping</a:t>
-            </a:r>
-          </a:p>
-          <a:p>
-            <a:r>
-              <a:rPr lang="en-US" dirty="0" smtClean="0"/>
-              <a:t>Small lot manufacturing (cookie cutters)</a:t>
-            </a:r>
-          </a:p>
-          <a:p>
-            <a:r>
-              <a:rPr lang="en-US" dirty="0" smtClean="0"/>
-              <a:t>Specialized or hard to find items (car parts)</a:t>
-            </a:r>
-          </a:p>
-          <a:p>
-            <a:r>
-              <a:rPr lang="en-US" dirty="0" smtClean="0"/>
-              <a:t>Education (music, animals)</a:t>
-            </a:r>
-          </a:p>
-          <a:p>
-            <a:r>
-              <a:rPr lang="en-US" dirty="0" smtClean="0"/>
-              <a:t>To be determined!</a:t>
+              <a:t>It was a Saturday morning….</a:t>
             </a:r>
             <a:endParaRPr lang="en-US" dirty="0"/>
           </a:p>
@@ -7742,7 +7796,7 @@
     </p:spTree>
     <p:extLst>
       <p:ext uri="{BB962C8B-B14F-4D97-AF65-F5344CB8AC3E}">
-        <p14:creationId xmlns:p14="http://schemas.microsoft.com/office/powerpoint/2010/main" val="3814718168"/>
+        <p14:creationId xmlns:p14="http://schemas.microsoft.com/office/powerpoint/2010/main" val="4239267716"/>
       </p:ext>
     </p:extLst>
   </p:cSld>
@@ -7798,44 +7852,195 @@
           <a:p>
             <a:r>
               <a:rPr lang="en-US" dirty="0" smtClean="0"/>
-              <a:t>My Favorite Thing</a:t>
+              <a:t>3D Pinter Types</a:t>
             </a:r>
             <a:endParaRPr lang="en-US" dirty="0"/>
           </a:p>
         </p:txBody>
       </p:sp>
-      <p:sp>
-        <p:nvSpPr>
-          <p:cNvPr id="12" name="Content Placeholder 11"/>
-          <p:cNvSpPr>
-            <a:spLocks noGrp="1"/>
-          </p:cNvSpPr>
+      <p:pic>
+        <p:nvPicPr>
+          <p:cNvPr id="6" name="Content Placeholder 5"/>
+          <p:cNvPicPr>
+            <a:picLocks noGrp="1" noChangeAspect="1"/>
+          </p:cNvPicPr>
           <p:nvPr>
             <p:ph idx="1"/>
           </p:nvPr>
-        </p:nvSpPr>
-        <p:spPr>
-          <a:xfrm>
-            <a:off x="457200" y="1600201"/>
-            <a:ext cx="8229600" cy="1600200"/>
-          </a:xfrm>
-        </p:spPr>
-        <p:txBody>
-          <a:bodyPr/>
-          <a:lstStyle/>
-          <a:p>
-            <a:r>
-              <a:rPr lang="en-US" dirty="0" smtClean="0"/>
-              <a:t>It was a Saturday morning….</a:t>
-            </a:r>
-            <a:endParaRPr lang="en-US" dirty="0"/>
+        </p:nvPicPr>
+        <p:blipFill>
+          <a:blip r:embed="rId2">
+            <a:extLst>
+              <a:ext uri="{28A0092B-C50C-407E-A947-70E740481C1C}">
+                <a14:useLocalDpi xmlns:a14="http://schemas.microsoft.com/office/drawing/2010/main" val="0"/>
+              </a:ext>
+            </a:extLst>
+          </a:blip>
+          <a:stretch>
+            <a:fillRect/>
+          </a:stretch>
+        </p:blipFill>
+        <p:spPr>
+          <a:xfrm>
+            <a:off x="228600" y="1066800"/>
+            <a:ext cx="2949060" cy="2133600"/>
+          </a:xfrm>
+        </p:spPr>
+      </p:pic>
+      <p:pic>
+        <p:nvPicPr>
+          <p:cNvPr id="7" name="Picture 6"/>
+          <p:cNvPicPr>
+            <a:picLocks noChangeAspect="1"/>
+          </p:cNvPicPr>
+          <p:nvPr/>
+        </p:nvPicPr>
+        <p:blipFill>
+          <a:blip r:embed="rId3">
+            <a:extLst>
+              <a:ext uri="{28A0092B-C50C-407E-A947-70E740481C1C}">
+                <a14:useLocalDpi xmlns:a14="http://schemas.microsoft.com/office/drawing/2010/main" val="0"/>
+              </a:ext>
+            </a:extLst>
+          </a:blip>
+          <a:stretch>
+            <a:fillRect/>
+          </a:stretch>
+        </p:blipFill>
+        <p:spPr>
+          <a:xfrm>
+            <a:off x="3276600" y="1066800"/>
+            <a:ext cx="2316753" cy="2286000"/>
+          </a:xfrm>
+          <a:prstGeom prst="rect">
+            <a:avLst/>
+          </a:prstGeom>
+        </p:spPr>
+      </p:pic>
+      <p:pic>
+        <p:nvPicPr>
+          <p:cNvPr id="8" name="Picture 7"/>
+          <p:cNvPicPr>
+            <a:picLocks noChangeAspect="1"/>
+          </p:cNvPicPr>
+          <p:nvPr/>
+        </p:nvPicPr>
+        <p:blipFill>
+          <a:blip r:embed="rId4">
+            <a:extLst>
+              <a:ext uri="{28A0092B-C50C-407E-A947-70E740481C1C}">
+                <a14:useLocalDpi xmlns:a14="http://schemas.microsoft.com/office/drawing/2010/main" val="0"/>
+              </a:ext>
+            </a:extLst>
+          </a:blip>
+          <a:stretch>
+            <a:fillRect/>
+          </a:stretch>
+        </p:blipFill>
+        <p:spPr>
+          <a:xfrm>
+            <a:off x="5664200" y="1066800"/>
+            <a:ext cx="2794000" cy="1676400"/>
+          </a:xfrm>
+          <a:prstGeom prst="rect">
+            <a:avLst/>
+          </a:prstGeom>
+        </p:spPr>
+      </p:pic>
+      <p:sp>
+        <p:nvSpPr>
+          <p:cNvPr id="9" name="TextBox 8"/>
+          <p:cNvSpPr txBox="1"/>
+          <p:nvPr/>
+        </p:nvSpPr>
+        <p:spPr>
+          <a:xfrm>
+            <a:off x="457199" y="3657600"/>
+            <a:ext cx="1941429" cy="646331"/>
+          </a:xfrm>
+          <a:prstGeom prst="rect">
+            <a:avLst/>
+          </a:prstGeom>
+          <a:noFill/>
+        </p:spPr>
+        <p:txBody>
+          <a:bodyPr wrap="none" rtlCol="0">
+            <a:spAutoFit/>
+          </a:bodyPr>
+          <a:lstStyle/>
+          <a:p>
+            <a:r>
+              <a:rPr lang="en-US" sz="3600" dirty="0" smtClean="0"/>
+              <a:t>Cartesian</a:t>
+            </a:r>
+            <a:endParaRPr lang="en-US" sz="3600" dirty="0"/>
+          </a:p>
+        </p:txBody>
+      </p:sp>
+      <p:sp>
+        <p:nvSpPr>
+          <p:cNvPr id="10" name="TextBox 9"/>
+          <p:cNvSpPr txBox="1"/>
+          <p:nvPr/>
+        </p:nvSpPr>
+        <p:spPr>
+          <a:xfrm>
+            <a:off x="3900714" y="3657600"/>
+            <a:ext cx="1172885" cy="646331"/>
+          </a:xfrm>
+          <a:prstGeom prst="rect">
+            <a:avLst/>
+          </a:prstGeom>
+          <a:noFill/>
+        </p:spPr>
+        <p:txBody>
+          <a:bodyPr wrap="none" rtlCol="0">
+            <a:spAutoFit/>
+          </a:bodyPr>
+          <a:lstStyle/>
+          <a:p>
+            <a:r>
+              <a:rPr lang="en-US" sz="3600" dirty="0" smtClean="0"/>
+              <a:t>Delta</a:t>
+            </a:r>
+            <a:endParaRPr lang="en-US" sz="3600" dirty="0"/>
+          </a:p>
+        </p:txBody>
+      </p:sp>
+      <p:sp>
+        <p:nvSpPr>
+          <p:cNvPr id="11" name="TextBox 10"/>
+          <p:cNvSpPr txBox="1"/>
+          <p:nvPr/>
+        </p:nvSpPr>
+        <p:spPr>
+          <a:xfrm>
+            <a:off x="6400800" y="3643732"/>
+            <a:ext cx="901209" cy="646331"/>
+          </a:xfrm>
+          <a:prstGeom prst="rect">
+            <a:avLst/>
+          </a:prstGeom>
+          <a:noFill/>
+        </p:spPr>
+        <p:txBody>
+          <a:bodyPr wrap="none" rtlCol="0">
+            <a:spAutoFit/>
+          </a:bodyPr>
+          <a:lstStyle/>
+          <a:p>
+            <a:r>
+              <a:rPr lang="en-US" sz="3600" dirty="0" smtClean="0"/>
+              <a:t>DLP</a:t>
+            </a:r>
+            <a:endParaRPr lang="en-US" sz="3600" dirty="0"/>
           </a:p>
         </p:txBody>
       </p:sp>
     </p:spTree>
     <p:extLst>
       <p:ext uri="{BB962C8B-B14F-4D97-AF65-F5344CB8AC3E}">
-        <p14:creationId xmlns:p14="http://schemas.microsoft.com/office/powerpoint/2010/main" val="4239267716"/>
+        <p14:creationId xmlns:p14="http://schemas.microsoft.com/office/powerpoint/2010/main" val="382462538"/>
       </p:ext>
     </p:extLst>
   </p:cSld>
@@ -7891,7 +8096,7 @@
           <a:p>
             <a:r>
               <a:rPr lang="en-US" dirty="0" smtClean="0"/>
-              <a:t>3D Pinter Types</a:t>
+              <a:t>Cartesian</a:t>
             </a:r>
             <a:endParaRPr lang="en-US" dirty="0"/>
           </a:p>
@@ -7921,14 +8126,14 @@
         </p:blipFill>
         <p:spPr>
           <a:xfrm>
-            <a:off x="228600" y="1066800"/>
-            <a:ext cx="2949060" cy="2133600"/>
+            <a:off x="58580" y="990600"/>
+            <a:ext cx="3896972" cy="2819400"/>
           </a:xfrm>
         </p:spPr>
       </p:pic>
       <p:pic>
         <p:nvPicPr>
-          <p:cNvPr id="7" name="Picture 6"/>
+          <p:cNvPr id="3" name="Picture 2"/>
           <p:cNvPicPr>
             <a:picLocks noChangeAspect="1"/>
           </p:cNvPicPr>
@@ -7948,138 +8153,18 @@
         </p:blipFill>
         <p:spPr>
           <a:xfrm>
-            <a:off x="3276600" y="1066800"/>
-            <a:ext cx="2316753" cy="2286000"/>
+            <a:off x="4114800" y="990600"/>
+            <a:ext cx="4800600" cy="3360420"/>
           </a:xfrm>
           <a:prstGeom prst="rect">
             <a:avLst/>
           </a:prstGeom>
         </p:spPr>
       </p:pic>
-      <p:pic>
-        <p:nvPicPr>
-          <p:cNvPr id="8" name="Picture 7"/>
-          <p:cNvPicPr>
-            <a:picLocks noChangeAspect="1"/>
-          </p:cNvPicPr>
-          <p:nvPr/>
-        </p:nvPicPr>
-        <p:blipFill>
-          <a:blip r:embed="rId4">
-            <a:extLst>
-              <a:ext uri="{28A0092B-C50C-407E-A947-70E740481C1C}">
-                <a14:useLocalDpi xmlns:a14="http://schemas.microsoft.com/office/drawing/2010/main" val="0"/>
-              </a:ext>
-            </a:extLst>
-          </a:blip>
-          <a:stretch>
-            <a:fillRect/>
-          </a:stretch>
-        </p:blipFill>
-        <p:spPr>
-          <a:xfrm>
-            <a:off x="5664200" y="1066800"/>
-            <a:ext cx="2794000" cy="1676400"/>
-          </a:xfrm>
-          <a:prstGeom prst="rect">
-            <a:avLst/>
-          </a:prstGeom>
-        </p:spPr>
-      </p:pic>
-      <p:sp>
-        <p:nvSpPr>
-          <p:cNvPr id="9" name="TextBox 8"/>
-          <p:cNvSpPr txBox="1"/>
-          <p:nvPr/>
-        </p:nvSpPr>
-        <p:spPr>
-          <a:xfrm>
-            <a:off x="457199" y="3657600"/>
-            <a:ext cx="1941429" cy="646331"/>
-          </a:xfrm>
-          <a:prstGeom prst="rect">
-            <a:avLst/>
-          </a:prstGeom>
-          <a:noFill/>
-        </p:spPr>
-        <p:txBody>
-          <a:bodyPr wrap="none" rtlCol="0">
-            <a:spAutoFit/>
-          </a:bodyPr>
-          <a:lstStyle/>
-          <a:p>
-            <a:r>
-              <a:rPr lang="en-US" sz="3600" dirty="0" smtClean="0"/>
-              <a:t>Cartesian</a:t>
-            </a:r>
-            <a:endParaRPr lang="en-US" sz="3600" dirty="0"/>
-          </a:p>
-        </p:txBody>
-      </p:sp>
-      <p:sp>
-        <p:nvSpPr>
-          <p:cNvPr id="10" name="TextBox 9"/>
-          <p:cNvSpPr txBox="1"/>
-          <p:nvPr/>
-        </p:nvSpPr>
-        <p:spPr>
-          <a:xfrm>
-            <a:off x="3900714" y="3657600"/>
-            <a:ext cx="1172885" cy="646331"/>
-          </a:xfrm>
-          <a:prstGeom prst="rect">
-            <a:avLst/>
-          </a:prstGeom>
-          <a:noFill/>
-        </p:spPr>
-        <p:txBody>
-          <a:bodyPr wrap="none" rtlCol="0">
-            <a:spAutoFit/>
-          </a:bodyPr>
-          <a:lstStyle/>
-          <a:p>
-            <a:r>
-              <a:rPr lang="en-US" sz="3600" dirty="0" smtClean="0"/>
-              <a:t>Delta</a:t>
-            </a:r>
-            <a:endParaRPr lang="en-US" sz="3600" dirty="0"/>
-          </a:p>
-        </p:txBody>
-      </p:sp>
-      <p:sp>
-        <p:nvSpPr>
-          <p:cNvPr id="11" name="TextBox 10"/>
-          <p:cNvSpPr txBox="1"/>
-          <p:nvPr/>
-        </p:nvSpPr>
-        <p:spPr>
-          <a:xfrm>
-            <a:off x="6400800" y="3643732"/>
-            <a:ext cx="901209" cy="646331"/>
-          </a:xfrm>
-          <a:prstGeom prst="rect">
-            <a:avLst/>
-          </a:prstGeom>
-          <a:noFill/>
-        </p:spPr>
-        <p:txBody>
-          <a:bodyPr wrap="none" rtlCol="0">
-            <a:spAutoFit/>
-          </a:bodyPr>
-          <a:lstStyle/>
-          <a:p>
-            <a:r>
-              <a:rPr lang="en-US" sz="3600" dirty="0" smtClean="0"/>
-              <a:t>DLP</a:t>
-            </a:r>
-            <a:endParaRPr lang="en-US" sz="3600" dirty="0"/>
-          </a:p>
-        </p:txBody>
-      </p:sp>
     </p:spTree>
     <p:extLst>
       <p:ext uri="{BB962C8B-B14F-4D97-AF65-F5344CB8AC3E}">
-        <p14:creationId xmlns:p14="http://schemas.microsoft.com/office/powerpoint/2010/main" val="382462538"/>
+        <p14:creationId xmlns:p14="http://schemas.microsoft.com/office/powerpoint/2010/main" val="1874514647"/>
       </p:ext>
     </p:extLst>
   </p:cSld>
@@ -8135,7 +8220,7 @@
           <a:p>
             <a:r>
               <a:rPr lang="en-US" dirty="0" smtClean="0"/>
-              <a:t>Cartesian</a:t>
+              <a:t>Delta</a:t>
             </a:r>
             <a:endParaRPr lang="en-US" dirty="0"/>
           </a:p>
@@ -8143,13 +8228,11 @@
       </p:sp>
       <p:pic>
         <p:nvPicPr>
-          <p:cNvPr id="6" name="Content Placeholder 5"/>
+          <p:cNvPr id="7" name="Picture 6"/>
           <p:cNvPicPr>
-            <a:picLocks noGrp="1" noChangeAspect="1"/>
+            <a:picLocks noChangeAspect="1"/>
           </p:cNvPicPr>
-          <p:nvPr>
-            <p:ph idx="1"/>
-          </p:nvPr>
+          <p:nvPr/>
         </p:nvPicPr>
         <p:blipFill>
           <a:blip r:embed="rId2">
@@ -8165,35 +8248,8 @@
         </p:blipFill>
         <p:spPr>
           <a:xfrm>
-            <a:off x="58580" y="990600"/>
-            <a:ext cx="3896972" cy="2819400"/>
-          </a:xfrm>
-        </p:spPr>
-      </p:pic>
-      <p:pic>
-        <p:nvPicPr>
-          <p:cNvPr id="3" name="Picture 2"/>
-          <p:cNvPicPr>
-            <a:picLocks noChangeAspect="1"/>
-          </p:cNvPicPr>
-          <p:nvPr/>
-        </p:nvPicPr>
-        <p:blipFill>
-          <a:blip r:embed="rId3">
-            <a:extLst>
-              <a:ext uri="{28A0092B-C50C-407E-A947-70E740481C1C}">
-                <a14:useLocalDpi xmlns:a14="http://schemas.microsoft.com/office/drawing/2010/main" val="0"/>
-              </a:ext>
-            </a:extLst>
-          </a:blip>
-          <a:stretch>
-            <a:fillRect/>
-          </a:stretch>
-        </p:blipFill>
-        <p:spPr>
-          <a:xfrm>
-            <a:off x="4114800" y="990600"/>
-            <a:ext cx="4800600" cy="3360420"/>
+            <a:off x="2057400" y="1047108"/>
+            <a:ext cx="4710731" cy="4648200"/>
           </a:xfrm>
           <a:prstGeom prst="rect">
             <a:avLst/>
@@ -8203,7 +8259,7 @@
     </p:spTree>
     <p:extLst>
       <p:ext uri="{BB962C8B-B14F-4D97-AF65-F5344CB8AC3E}">
-        <p14:creationId xmlns:p14="http://schemas.microsoft.com/office/powerpoint/2010/main" val="1874514647"/>
+        <p14:creationId xmlns:p14="http://schemas.microsoft.com/office/powerpoint/2010/main" val="838563812"/>
       </p:ext>
     </p:extLst>
   </p:cSld>

</xml_diff>